<commit_message>
Added intro to trees
</commit_message>
<xml_diff>
--- a/presentation/pptx/03-Classification_methods_part2_SVMs_and_Cross_Validation.pptx
+++ b/presentation/pptx/03-Classification_methods_part2_SVMs_and_Cross_Validation.pptx
@@ -5,7 +5,7 @@
     <p:sldMasterId id="2147483840" r:id="rId1"/>
   </p:sldMasterIdLst>
   <p:notesMasterIdLst>
-    <p:notesMasterId r:id="rId24"/>
+    <p:notesMasterId r:id="rId27"/>
   </p:notesMasterIdLst>
   <p:sldIdLst>
     <p:sldId id="256" r:id="rId2"/>
@@ -30,6 +30,9 @@
     <p:sldId id="287" r:id="rId21"/>
     <p:sldId id="293" r:id="rId22"/>
     <p:sldId id="294" r:id="rId23"/>
+    <p:sldId id="295" r:id="rId24"/>
+    <p:sldId id="296" r:id="rId25"/>
+    <p:sldId id="297" r:id="rId26"/>
   </p:sldIdLst>
   <p:sldSz cx="12192000" cy="6858000"/>
   <p:notesSz cx="6858000" cy="9144000"/>
@@ -974,6 +977,94 @@
     <p:extLst>
       <p:ext uri="{BB962C8B-B14F-4D97-AF65-F5344CB8AC3E}">
         <p14:creationId xmlns:p14="http://schemas.microsoft.com/office/powerpoint/2010/main" val="2463563639"/>
+      </p:ext>
+    </p:extLst>
+  </p:cSld>
+  <p:clrMapOvr>
+    <a:masterClrMapping/>
+  </p:clrMapOvr>
+</p:notes>
+</file>
+
+<file path=ppt/notesSlides/notesSlide6.xml><?xml version="1.0" encoding="utf-8"?>
+<p:notes xmlns:a="http://schemas.openxmlformats.org/drawingml/2006/main" xmlns:r="http://schemas.openxmlformats.org/officeDocument/2006/relationships" xmlns:p="http://schemas.openxmlformats.org/presentationml/2006/main">
+  <p:cSld>
+    <p:spTree>
+      <p:nvGrpSpPr>
+        <p:cNvPr id="1" name=""/>
+        <p:cNvGrpSpPr/>
+        <p:nvPr/>
+      </p:nvGrpSpPr>
+      <p:grpSpPr>
+        <a:xfrm>
+          <a:off x="0" y="0"/>
+          <a:ext cx="0" cy="0"/>
+          <a:chOff x="0" y="0"/>
+          <a:chExt cx="0" cy="0"/>
+        </a:xfrm>
+      </p:grpSpPr>
+      <p:sp>
+        <p:nvSpPr>
+          <p:cNvPr id="2" name="Slide Image Placeholder 1"/>
+          <p:cNvSpPr>
+            <a:spLocks noGrp="1" noRot="1" noChangeAspect="1"/>
+          </p:cNvSpPr>
+          <p:nvPr>
+            <p:ph type="sldImg"/>
+          </p:nvPr>
+        </p:nvSpPr>
+        <p:spPr/>
+      </p:sp>
+      <p:sp>
+        <p:nvSpPr>
+          <p:cNvPr id="3" name="Notes Placeholder 2"/>
+          <p:cNvSpPr>
+            <a:spLocks noGrp="1"/>
+          </p:cNvSpPr>
+          <p:nvPr>
+            <p:ph type="body" idx="1"/>
+          </p:nvPr>
+        </p:nvSpPr>
+        <p:spPr/>
+        <p:txBody>
+          <a:bodyPr/>
+          <a:lstStyle/>
+          <a:p>
+            <a:r>
+              <a:rPr lang="en-US" dirty="0"/>
+              <a:t>For details about measures and why misclassification is not that advised, see ESLII pages 309-310.</a:t>
+            </a:r>
+            <a:endParaRPr lang="en-IL" dirty="0"/>
+          </a:p>
+        </p:txBody>
+      </p:sp>
+      <p:sp>
+        <p:nvSpPr>
+          <p:cNvPr id="4" name="Slide Number Placeholder 3"/>
+          <p:cNvSpPr>
+            <a:spLocks noGrp="1"/>
+          </p:cNvSpPr>
+          <p:nvPr>
+            <p:ph type="sldNum" sz="quarter" idx="5"/>
+          </p:nvPr>
+        </p:nvSpPr>
+        <p:spPr/>
+        <p:txBody>
+          <a:bodyPr/>
+          <a:lstStyle/>
+          <a:p>
+            <a:fld id="{C4276747-8356-4D8F-84BF-3C530C5DAF39}" type="slidenum">
+              <a:rPr lang="he-IL" smtClean="0"/>
+              <a:t>25</a:t>
+            </a:fld>
+            <a:endParaRPr lang="he-IL"/>
+          </a:p>
+        </p:txBody>
+      </p:sp>
+    </p:spTree>
+    <p:extLst>
+      <p:ext uri="{BB962C8B-B14F-4D97-AF65-F5344CB8AC3E}">
+        <p14:creationId xmlns:p14="http://schemas.microsoft.com/office/powerpoint/2010/main" val="3900918535"/>
       </p:ext>
     </p:extLst>
   </p:cSld>
@@ -11385,7 +11476,7 @@
             </a:pPr>
             <a:r>
               <a:rPr lang="en-US" dirty="0"/>
-              <a:t>Caution, flexibility = can be easily abused into over-fitting.</a:t>
+              <a:t>Caution, flexibility = very high bias = can be easily abused into over-fitting.</a:t>
             </a:r>
           </a:p>
         </p:txBody>
@@ -16174,6 +16265,2273 @@
 </p:sld>
 </file>
 
+<file path=ppt/slides/slide23.xml><?xml version="1.0" encoding="utf-8"?>
+<p:sld xmlns:a="http://schemas.openxmlformats.org/drawingml/2006/main" xmlns:r="http://schemas.openxmlformats.org/officeDocument/2006/relationships" xmlns:p="http://schemas.openxmlformats.org/presentationml/2006/main">
+  <p:cSld>
+    <p:spTree>
+      <p:nvGrpSpPr>
+        <p:cNvPr id="1" name=""/>
+        <p:cNvGrpSpPr/>
+        <p:nvPr/>
+      </p:nvGrpSpPr>
+      <p:grpSpPr>
+        <a:xfrm>
+          <a:off x="0" y="0"/>
+          <a:ext cx="0" cy="0"/>
+          <a:chOff x="0" y="0"/>
+          <a:chExt cx="0" cy="0"/>
+        </a:xfrm>
+      </p:grpSpPr>
+      <p:sp>
+        <p:nvSpPr>
+          <p:cNvPr id="2" name="Title 1">
+            <a:extLst>
+              <a:ext uri="{FF2B5EF4-FFF2-40B4-BE49-F238E27FC236}">
+                <a16:creationId xmlns:a16="http://schemas.microsoft.com/office/drawing/2014/main" id="{69C02056-5B20-4641-9849-83AEA12BB707}"/>
+              </a:ext>
+            </a:extLst>
+          </p:cNvPr>
+          <p:cNvSpPr>
+            <a:spLocks noGrp="1"/>
+          </p:cNvSpPr>
+          <p:nvPr>
+            <p:ph type="title"/>
+          </p:nvPr>
+        </p:nvSpPr>
+        <p:spPr/>
+        <p:txBody>
+          <a:bodyPr/>
+          <a:lstStyle/>
+          <a:p>
+            <a:r>
+              <a:rPr lang="en-US" dirty="0"/>
+              <a:t>How a Tree is Grown?</a:t>
+            </a:r>
+            <a:endParaRPr lang="en-IL" dirty="0"/>
+          </a:p>
+        </p:txBody>
+      </p:sp>
+      <mc:AlternateContent xmlns:mc="http://schemas.openxmlformats.org/markup-compatibility/2006">
+        <mc:Choice xmlns:a14="http://schemas.microsoft.com/office/drawing/2010/main" Requires="a14">
+          <p:sp>
+            <p:nvSpPr>
+              <p:cNvPr id="3" name="Content Placeholder 2">
+                <a:extLst>
+                  <a:ext uri="{FF2B5EF4-FFF2-40B4-BE49-F238E27FC236}">
+                    <a16:creationId xmlns:a16="http://schemas.microsoft.com/office/drawing/2014/main" id="{31AE4E9F-EACB-472F-B605-A431EA5EC19F}"/>
+                  </a:ext>
+                </a:extLst>
+              </p:cNvPr>
+              <p:cNvSpPr>
+                <a:spLocks noGrp="1"/>
+              </p:cNvSpPr>
+              <p:nvPr>
+                <p:ph idx="1"/>
+              </p:nvPr>
+            </p:nvSpPr>
+            <p:spPr/>
+            <p:txBody>
+              <a:bodyPr/>
+              <a:lstStyle/>
+              <a:p>
+                <a:pPr>
+                  <a:lnSpc>
+                    <a:spcPct val="100000"/>
+                  </a:lnSpc>
+                </a:pPr>
+                <a:r>
+                  <a:rPr lang="en-US" dirty="0"/>
+                  <a:t>(Regression tree)</a:t>
+                </a:r>
+              </a:p>
+              <a:p>
+                <a:pPr>
+                  <a:lnSpc>
+                    <a:spcPct val="100000"/>
+                  </a:lnSpc>
+                </a:pPr>
+                <a:r>
+                  <a:rPr lang="en-US" dirty="0"/>
+                  <a:t>The goal: find “boxes” which divide the plane and minimize:</a:t>
+                </a:r>
+              </a:p>
+              <a:p>
+                <a:pPr marL="0" indent="0" algn="ctr">
+                  <a:lnSpc>
+                    <a:spcPct val="100000"/>
+                  </a:lnSpc>
+                  <a:buNone/>
+                </a:pPr>
+                <a14:m>
+                  <m:oMathPara xmlns:m="http://schemas.openxmlformats.org/officeDocument/2006/math">
+                    <m:oMathParaPr>
+                      <m:jc m:val="centerGroup"/>
+                    </m:oMathParaPr>
+                    <m:oMath xmlns:m="http://schemas.openxmlformats.org/officeDocument/2006/math">
+                      <m:nary>
+                        <m:naryPr>
+                          <m:chr m:val="∑"/>
+                          <m:ctrlPr>
+                            <a:rPr lang="en-US" b="0" i="1" smtClean="0">
+                              <a:latin typeface="Cambria Math" panose="02040503050406030204" pitchFamily="18" charset="0"/>
+                            </a:rPr>
+                          </m:ctrlPr>
+                        </m:naryPr>
+                        <m:sub>
+                          <m:r>
+                            <a:rPr lang="en-US" b="0" i="1" smtClean="0">
+                              <a:latin typeface="Cambria Math" panose="02040503050406030204" pitchFamily="18" charset="0"/>
+                            </a:rPr>
+                            <m:t>𝑗</m:t>
+                          </m:r>
+                          <m:r>
+                            <a:rPr lang="en-US" b="0" i="1" smtClean="0">
+                              <a:latin typeface="Cambria Math" panose="02040503050406030204" pitchFamily="18" charset="0"/>
+                            </a:rPr>
+                            <m:t>=</m:t>
+                          </m:r>
+                          <m:r>
+                            <a:rPr lang="en-US" b="0" i="1" smtClean="0">
+                              <a:latin typeface="Cambria Math" panose="02040503050406030204" pitchFamily="18" charset="0"/>
+                            </a:rPr>
+                            <m:t>1</m:t>
+                          </m:r>
+                        </m:sub>
+                        <m:sup>
+                          <m:r>
+                            <a:rPr lang="en-US" b="0" i="1" smtClean="0">
+                              <a:latin typeface="Cambria Math" panose="02040503050406030204" pitchFamily="18" charset="0"/>
+                            </a:rPr>
+                            <m:t>𝐽</m:t>
+                          </m:r>
+                        </m:sup>
+                        <m:e>
+                          <m:nary>
+                            <m:naryPr>
+                              <m:chr m:val="∑"/>
+                              <m:supHide m:val="on"/>
+                              <m:ctrlPr>
+                                <a:rPr lang="en-US" b="0" i="1" smtClean="0">
+                                  <a:latin typeface="Cambria Math" panose="02040503050406030204" pitchFamily="18" charset="0"/>
+                                </a:rPr>
+                              </m:ctrlPr>
+                            </m:naryPr>
+                            <m:sub>
+                              <m:r>
+                                <a:rPr lang="en-US" b="0" i="1" smtClean="0">
+                                  <a:latin typeface="Cambria Math" panose="02040503050406030204" pitchFamily="18" charset="0"/>
+                                </a:rPr>
+                                <m:t>𝑖</m:t>
+                              </m:r>
+                              <m:r>
+                                <a:rPr lang="en-US" b="0" i="1" smtClean="0">
+                                  <a:latin typeface="Cambria Math" panose="02040503050406030204" pitchFamily="18" charset="0"/>
+                                </a:rPr>
+                                <m:t>∈</m:t>
+                              </m:r>
+                              <m:sSub>
+                                <m:sSubPr>
+                                  <m:ctrlPr>
+                                    <a:rPr lang="en-US" b="0" i="1" smtClean="0">
+                                      <a:latin typeface="Cambria Math" panose="02040503050406030204" pitchFamily="18" charset="0"/>
+                                    </a:rPr>
+                                  </m:ctrlPr>
+                                </m:sSubPr>
+                                <m:e>
+                                  <m:r>
+                                    <a:rPr lang="en-US" b="0" i="1" smtClean="0">
+                                      <a:latin typeface="Cambria Math" panose="02040503050406030204" pitchFamily="18" charset="0"/>
+                                    </a:rPr>
+                                    <m:t>𝑅</m:t>
+                                  </m:r>
+                                </m:e>
+                                <m:sub>
+                                  <m:r>
+                                    <a:rPr lang="en-US" b="0" i="1" smtClean="0">
+                                      <a:latin typeface="Cambria Math" panose="02040503050406030204" pitchFamily="18" charset="0"/>
+                                    </a:rPr>
+                                    <m:t>𝑗</m:t>
+                                  </m:r>
+                                </m:sub>
+                              </m:sSub>
+                            </m:sub>
+                            <m:sup/>
+                            <m:e>
+                              <m:sSup>
+                                <m:sSupPr>
+                                  <m:ctrlPr>
+                                    <a:rPr lang="en-US" b="0" i="1" smtClean="0">
+                                      <a:latin typeface="Cambria Math" panose="02040503050406030204" pitchFamily="18" charset="0"/>
+                                    </a:rPr>
+                                  </m:ctrlPr>
+                                </m:sSupPr>
+                                <m:e>
+                                  <m:d>
+                                    <m:dPr>
+                                      <m:ctrlPr>
+                                        <a:rPr lang="en-US" b="0" i="1" smtClean="0">
+                                          <a:latin typeface="Cambria Math" panose="02040503050406030204" pitchFamily="18" charset="0"/>
+                                        </a:rPr>
+                                      </m:ctrlPr>
+                                    </m:dPr>
+                                    <m:e>
+                                      <m:sSub>
+                                        <m:sSubPr>
+                                          <m:ctrlPr>
+                                            <a:rPr lang="en-US" b="0" i="1" smtClean="0">
+                                              <a:latin typeface="Cambria Math" panose="02040503050406030204" pitchFamily="18" charset="0"/>
+                                            </a:rPr>
+                                          </m:ctrlPr>
+                                        </m:sSubPr>
+                                        <m:e>
+                                          <m:r>
+                                            <a:rPr lang="en-US" b="0" i="1" smtClean="0">
+                                              <a:latin typeface="Cambria Math" panose="02040503050406030204" pitchFamily="18" charset="0"/>
+                                            </a:rPr>
+                                            <m:t>𝑦</m:t>
+                                          </m:r>
+                                        </m:e>
+                                        <m:sub>
+                                          <m:r>
+                                            <a:rPr lang="en-US" b="0" i="1" smtClean="0">
+                                              <a:latin typeface="Cambria Math" panose="02040503050406030204" pitchFamily="18" charset="0"/>
+                                            </a:rPr>
+                                            <m:t>𝑖</m:t>
+                                          </m:r>
+                                        </m:sub>
+                                      </m:sSub>
+                                      <m:r>
+                                        <a:rPr lang="en-US" b="0" i="1" smtClean="0">
+                                          <a:latin typeface="Cambria Math" panose="02040503050406030204" pitchFamily="18" charset="0"/>
+                                        </a:rPr>
+                                        <m:t>−</m:t>
+                                      </m:r>
+                                      <m:sSub>
+                                        <m:sSubPr>
+                                          <m:ctrlPr>
+                                            <a:rPr lang="en-US" b="0" i="1" smtClean="0">
+                                              <a:latin typeface="Cambria Math" panose="02040503050406030204" pitchFamily="18" charset="0"/>
+                                            </a:rPr>
+                                          </m:ctrlPr>
+                                        </m:sSubPr>
+                                        <m:e>
+                                          <m:acc>
+                                            <m:accPr>
+                                              <m:chr m:val="̂"/>
+                                              <m:ctrlPr>
+                                                <a:rPr lang="en-US" b="0" i="1" smtClean="0">
+                                                  <a:latin typeface="Cambria Math" panose="02040503050406030204" pitchFamily="18" charset="0"/>
+                                                </a:rPr>
+                                              </m:ctrlPr>
+                                            </m:accPr>
+                                            <m:e>
+                                              <m:r>
+                                                <a:rPr lang="en-US" b="0" i="1" smtClean="0">
+                                                  <a:latin typeface="Cambria Math" panose="02040503050406030204" pitchFamily="18" charset="0"/>
+                                                </a:rPr>
+                                                <m:t>𝑦</m:t>
+                                              </m:r>
+                                            </m:e>
+                                          </m:acc>
+                                        </m:e>
+                                        <m:sub>
+                                          <m:sSub>
+                                            <m:sSubPr>
+                                              <m:ctrlPr>
+                                                <a:rPr lang="en-US" b="0" i="1" smtClean="0">
+                                                  <a:latin typeface="Cambria Math" panose="02040503050406030204" pitchFamily="18" charset="0"/>
+                                                </a:rPr>
+                                              </m:ctrlPr>
+                                            </m:sSubPr>
+                                            <m:e>
+                                              <m:r>
+                                                <a:rPr lang="en-US" b="0" i="1" smtClean="0">
+                                                  <a:latin typeface="Cambria Math" panose="02040503050406030204" pitchFamily="18" charset="0"/>
+                                                </a:rPr>
+                                                <m:t>𝑅</m:t>
+                                              </m:r>
+                                            </m:e>
+                                            <m:sub>
+                                              <m:r>
+                                                <a:rPr lang="en-US" b="0" i="1" smtClean="0">
+                                                  <a:latin typeface="Cambria Math" panose="02040503050406030204" pitchFamily="18" charset="0"/>
+                                                </a:rPr>
+                                                <m:t>𝑗</m:t>
+                                              </m:r>
+                                            </m:sub>
+                                          </m:sSub>
+                                        </m:sub>
+                                      </m:sSub>
+                                    </m:e>
+                                  </m:d>
+                                </m:e>
+                                <m:sup>
+                                  <m:r>
+                                    <a:rPr lang="en-US" b="0" i="1" smtClean="0">
+                                      <a:latin typeface="Cambria Math" panose="02040503050406030204" pitchFamily="18" charset="0"/>
+                                    </a:rPr>
+                                    <m:t>2</m:t>
+                                  </m:r>
+                                </m:sup>
+                              </m:sSup>
+                            </m:e>
+                          </m:nary>
+                        </m:e>
+                      </m:nary>
+                    </m:oMath>
+                  </m:oMathPara>
+                </a14:m>
+                <a:endParaRPr lang="en-US" dirty="0"/>
+              </a:p>
+              <a:p>
+                <a:pPr marL="0" indent="0">
+                  <a:lnSpc>
+                    <a:spcPct val="100000"/>
+                  </a:lnSpc>
+                  <a:buNone/>
+                </a:pPr>
+                <a:r>
+                  <a:rPr lang="en-US" dirty="0"/>
+                  <a:t>(the residual sum of squares; prediction = average of points in box)</a:t>
+                </a:r>
+              </a:p>
+              <a:p>
+                <a:pPr>
+                  <a:lnSpc>
+                    <a:spcPct val="100000"/>
+                  </a:lnSpc>
+                </a:pPr>
+                <a:r>
+                  <a:rPr lang="en-US" dirty="0"/>
+                  <a:t>Greedy approach. at each step find </a:t>
+                </a:r>
+                <a14:m>
+                  <m:oMath xmlns:m="http://schemas.openxmlformats.org/officeDocument/2006/math">
+                    <m:r>
+                      <a:rPr lang="en-US" b="0" i="1" smtClean="0">
+                        <a:latin typeface="Cambria Math" panose="02040503050406030204" pitchFamily="18" charset="0"/>
+                      </a:rPr>
+                      <m:t>𝑗</m:t>
+                    </m:r>
+                    <m:r>
+                      <a:rPr lang="en-US" b="0" i="1" smtClean="0">
+                        <a:latin typeface="Cambria Math" panose="02040503050406030204" pitchFamily="18" charset="0"/>
+                      </a:rPr>
+                      <m:t>,</m:t>
+                    </m:r>
+                    <m:r>
+                      <a:rPr lang="en-US" b="0" i="1" smtClean="0">
+                        <a:latin typeface="Cambria Math" panose="02040503050406030204" pitchFamily="18" charset="0"/>
+                      </a:rPr>
+                      <m:t>𝑠</m:t>
+                    </m:r>
+                  </m:oMath>
+                </a14:m>
+                <a:r>
+                  <a:rPr lang="en-US" dirty="0"/>
+                  <a:t> for splitting </a:t>
+                </a:r>
+                <a14:m>
+                  <m:oMath xmlns:m="http://schemas.openxmlformats.org/officeDocument/2006/math">
+                    <m:sSub>
+                      <m:sSubPr>
+                        <m:ctrlPr>
+                          <a:rPr lang="en-US" b="0" i="1" smtClean="0">
+                            <a:latin typeface="Cambria Math" panose="02040503050406030204" pitchFamily="18" charset="0"/>
+                          </a:rPr>
+                        </m:ctrlPr>
+                      </m:sSubPr>
+                      <m:e>
+                        <m:r>
+                          <a:rPr lang="en-US" b="0" i="1" smtClean="0">
+                            <a:latin typeface="Cambria Math" panose="02040503050406030204" pitchFamily="18" charset="0"/>
+                          </a:rPr>
+                          <m:t>𝑋</m:t>
+                        </m:r>
+                      </m:e>
+                      <m:sub>
+                        <m:r>
+                          <a:rPr lang="en-US" b="0" i="1" smtClean="0">
+                            <a:latin typeface="Cambria Math" panose="02040503050406030204" pitchFamily="18" charset="0"/>
+                          </a:rPr>
+                          <m:t>𝑗</m:t>
+                        </m:r>
+                      </m:sub>
+                    </m:sSub>
+                    <m:r>
+                      <a:rPr lang="en-US" b="0" i="1" smtClean="0">
+                        <a:latin typeface="Cambria Math" panose="02040503050406030204" pitchFamily="18" charset="0"/>
+                      </a:rPr>
+                      <m:t>&lt;</m:t>
+                    </m:r>
+                    <m:r>
+                      <a:rPr lang="en-US" b="0" i="1" smtClean="0">
+                        <a:latin typeface="Cambria Math" panose="02040503050406030204" pitchFamily="18" charset="0"/>
+                      </a:rPr>
+                      <m:t>𝑠</m:t>
+                    </m:r>
+                  </m:oMath>
+                </a14:m>
+                <a:r>
+                  <a:rPr lang="en-US" dirty="0"/>
+                  <a:t> versus </a:t>
+                </a:r>
+                <a14:m>
+                  <m:oMath xmlns:m="http://schemas.openxmlformats.org/officeDocument/2006/math">
+                    <m:sSub>
+                      <m:sSubPr>
+                        <m:ctrlPr>
+                          <a:rPr lang="en-US" b="0" i="1" smtClean="0">
+                            <a:latin typeface="Cambria Math" panose="02040503050406030204" pitchFamily="18" charset="0"/>
+                          </a:rPr>
+                        </m:ctrlPr>
+                      </m:sSubPr>
+                      <m:e>
+                        <m:r>
+                          <a:rPr lang="en-US" b="0" i="1" smtClean="0">
+                            <a:latin typeface="Cambria Math" panose="02040503050406030204" pitchFamily="18" charset="0"/>
+                          </a:rPr>
+                          <m:t>𝑋</m:t>
+                        </m:r>
+                      </m:e>
+                      <m:sub>
+                        <m:r>
+                          <a:rPr lang="en-US" b="0" i="1" smtClean="0">
+                            <a:latin typeface="Cambria Math" panose="02040503050406030204" pitchFamily="18" charset="0"/>
+                          </a:rPr>
+                          <m:t>𝑗</m:t>
+                        </m:r>
+                      </m:sub>
+                    </m:sSub>
+                    <m:r>
+                      <a:rPr lang="en-US" b="0" i="1" smtClean="0">
+                        <a:latin typeface="Cambria Math" panose="02040503050406030204" pitchFamily="18" charset="0"/>
+                      </a:rPr>
+                      <m:t>≥</m:t>
+                    </m:r>
+                    <m:r>
+                      <a:rPr lang="en-US" b="0" i="1" smtClean="0">
+                        <a:latin typeface="Cambria Math" panose="02040503050406030204" pitchFamily="18" charset="0"/>
+                      </a:rPr>
+                      <m:t>𝑠</m:t>
+                    </m:r>
+                  </m:oMath>
+                </a14:m>
+                <a:r>
+                  <a:rPr lang="en-US" dirty="0"/>
+                  <a:t>, </a:t>
+                </a:r>
+                <a:br>
+                  <a:rPr lang="en-US" dirty="0"/>
+                </a:br>
+                <a:r>
+                  <a:rPr lang="en-US" dirty="0"/>
+                  <a:t>which minimize:</a:t>
+                </a:r>
+              </a:p>
+              <a:p>
+                <a:pPr marL="274320" lvl="1" indent="0">
+                  <a:lnSpc>
+                    <a:spcPct val="100000"/>
+                  </a:lnSpc>
+                  <a:buNone/>
+                </a:pPr>
+                <a14:m>
+                  <m:oMathPara xmlns:m="http://schemas.openxmlformats.org/officeDocument/2006/math">
+                    <m:oMathParaPr>
+                      <m:jc m:val="centerGroup"/>
+                    </m:oMathParaPr>
+                    <m:oMath xmlns:m="http://schemas.openxmlformats.org/officeDocument/2006/math">
+                      <m:nary>
+                        <m:naryPr>
+                          <m:chr m:val="∑"/>
+                          <m:supHide m:val="on"/>
+                          <m:ctrlPr>
+                            <a:rPr lang="en-US" b="0" i="1" smtClean="0">
+                              <a:latin typeface="Cambria Math" panose="02040503050406030204" pitchFamily="18" charset="0"/>
+                            </a:rPr>
+                          </m:ctrlPr>
+                        </m:naryPr>
+                        <m:sub>
+                          <m:r>
+                            <a:rPr lang="en-US" b="0" i="1" smtClean="0">
+                              <a:latin typeface="Cambria Math" panose="02040503050406030204" pitchFamily="18" charset="0"/>
+                            </a:rPr>
+                            <m:t>𝑖</m:t>
+                          </m:r>
+                          <m:r>
+                            <a:rPr lang="en-US" b="0" i="1" smtClean="0">
+                              <a:latin typeface="Cambria Math" panose="02040503050406030204" pitchFamily="18" charset="0"/>
+                            </a:rPr>
+                            <m:t>:</m:t>
+                          </m:r>
+                          <m:sSub>
+                            <m:sSubPr>
+                              <m:ctrlPr>
+                                <a:rPr lang="en-US" b="0" i="1" smtClean="0">
+                                  <a:latin typeface="Cambria Math" panose="02040503050406030204" pitchFamily="18" charset="0"/>
+                                </a:rPr>
+                              </m:ctrlPr>
+                            </m:sSubPr>
+                            <m:e>
+                              <m:r>
+                                <a:rPr lang="en-US" b="0" i="1" smtClean="0">
+                                  <a:latin typeface="Cambria Math" panose="02040503050406030204" pitchFamily="18" charset="0"/>
+                                </a:rPr>
+                                <m:t>𝑥</m:t>
+                              </m:r>
+                            </m:e>
+                            <m:sub>
+                              <m:r>
+                                <a:rPr lang="en-US" b="0" i="1" smtClean="0">
+                                  <a:latin typeface="Cambria Math" panose="02040503050406030204" pitchFamily="18" charset="0"/>
+                                </a:rPr>
+                                <m:t>𝑖</m:t>
+                              </m:r>
+                            </m:sub>
+                          </m:sSub>
+                          <m:r>
+                            <a:rPr lang="en-US" b="0" i="1" smtClean="0">
+                              <a:latin typeface="Cambria Math" panose="02040503050406030204" pitchFamily="18" charset="0"/>
+                            </a:rPr>
+                            <m:t>∈</m:t>
+                          </m:r>
+                          <m:sSub>
+                            <m:sSubPr>
+                              <m:ctrlPr>
+                                <a:rPr lang="en-US" b="0" i="1" smtClean="0">
+                                  <a:latin typeface="Cambria Math" panose="02040503050406030204" pitchFamily="18" charset="0"/>
+                                </a:rPr>
+                              </m:ctrlPr>
+                            </m:sSubPr>
+                            <m:e>
+                              <m:r>
+                                <a:rPr lang="en-US" b="0" i="1" smtClean="0">
+                                  <a:latin typeface="Cambria Math" panose="02040503050406030204" pitchFamily="18" charset="0"/>
+                                </a:rPr>
+                                <m:t>𝑅</m:t>
+                              </m:r>
+                            </m:e>
+                            <m:sub>
+                              <m:r>
+                                <a:rPr lang="en-US" b="0" i="1" smtClean="0">
+                                  <a:latin typeface="Cambria Math" panose="02040503050406030204" pitchFamily="18" charset="0"/>
+                                </a:rPr>
+                                <m:t>1</m:t>
+                              </m:r>
+                            </m:sub>
+                          </m:sSub>
+                          <m:d>
+                            <m:dPr>
+                              <m:ctrlPr>
+                                <a:rPr lang="en-US" b="0" i="1" smtClean="0">
+                                  <a:latin typeface="Cambria Math" panose="02040503050406030204" pitchFamily="18" charset="0"/>
+                                </a:rPr>
+                              </m:ctrlPr>
+                            </m:dPr>
+                            <m:e>
+                              <m:r>
+                                <a:rPr lang="en-US" b="0" i="1" smtClean="0">
+                                  <a:latin typeface="Cambria Math" panose="02040503050406030204" pitchFamily="18" charset="0"/>
+                                </a:rPr>
+                                <m:t>𝑗</m:t>
+                              </m:r>
+                              <m:r>
+                                <a:rPr lang="en-US" b="0" i="1" smtClean="0">
+                                  <a:latin typeface="Cambria Math" panose="02040503050406030204" pitchFamily="18" charset="0"/>
+                                </a:rPr>
+                                <m:t>,</m:t>
+                              </m:r>
+                              <m:r>
+                                <a:rPr lang="en-US" b="0" i="1" smtClean="0">
+                                  <a:latin typeface="Cambria Math" panose="02040503050406030204" pitchFamily="18" charset="0"/>
+                                </a:rPr>
+                                <m:t>𝑠</m:t>
+                              </m:r>
+                            </m:e>
+                          </m:d>
+                        </m:sub>
+                        <m:sup/>
+                        <m:e>
+                          <m:sSup>
+                            <m:sSupPr>
+                              <m:ctrlPr>
+                                <a:rPr lang="en-US" b="0" i="1" smtClean="0">
+                                  <a:latin typeface="Cambria Math" panose="02040503050406030204" pitchFamily="18" charset="0"/>
+                                </a:rPr>
+                              </m:ctrlPr>
+                            </m:sSupPr>
+                            <m:e>
+                              <m:d>
+                                <m:dPr>
+                                  <m:ctrlPr>
+                                    <a:rPr lang="en-US" b="0" i="1" smtClean="0">
+                                      <a:latin typeface="Cambria Math" panose="02040503050406030204" pitchFamily="18" charset="0"/>
+                                    </a:rPr>
+                                  </m:ctrlPr>
+                                </m:dPr>
+                                <m:e>
+                                  <m:sSub>
+                                    <m:sSubPr>
+                                      <m:ctrlPr>
+                                        <a:rPr lang="en-US" b="0" i="1" smtClean="0">
+                                          <a:latin typeface="Cambria Math" panose="02040503050406030204" pitchFamily="18" charset="0"/>
+                                        </a:rPr>
+                                      </m:ctrlPr>
+                                    </m:sSubPr>
+                                    <m:e>
+                                      <m:r>
+                                        <a:rPr lang="en-US" b="0" i="1" smtClean="0">
+                                          <a:latin typeface="Cambria Math" panose="02040503050406030204" pitchFamily="18" charset="0"/>
+                                        </a:rPr>
+                                        <m:t>𝑦</m:t>
+                                      </m:r>
+                                    </m:e>
+                                    <m:sub>
+                                      <m:r>
+                                        <a:rPr lang="en-US" b="0" i="1" smtClean="0">
+                                          <a:latin typeface="Cambria Math" panose="02040503050406030204" pitchFamily="18" charset="0"/>
+                                        </a:rPr>
+                                        <m:t>𝑖</m:t>
+                                      </m:r>
+                                    </m:sub>
+                                  </m:sSub>
+                                  <m:r>
+                                    <a:rPr lang="en-US" b="0" i="1" smtClean="0">
+                                      <a:latin typeface="Cambria Math" panose="02040503050406030204" pitchFamily="18" charset="0"/>
+                                    </a:rPr>
+                                    <m:t>−</m:t>
+                                  </m:r>
+                                  <m:sSub>
+                                    <m:sSubPr>
+                                      <m:ctrlPr>
+                                        <a:rPr lang="en-US" b="0" i="1" smtClean="0">
+                                          <a:latin typeface="Cambria Math" panose="02040503050406030204" pitchFamily="18" charset="0"/>
+                                        </a:rPr>
+                                      </m:ctrlPr>
+                                    </m:sSubPr>
+                                    <m:e>
+                                      <m:acc>
+                                        <m:accPr>
+                                          <m:chr m:val="̂"/>
+                                          <m:ctrlPr>
+                                            <a:rPr lang="en-US" b="0" i="1" smtClean="0">
+                                              <a:latin typeface="Cambria Math" panose="02040503050406030204" pitchFamily="18" charset="0"/>
+                                            </a:rPr>
+                                          </m:ctrlPr>
+                                        </m:accPr>
+                                        <m:e>
+                                          <m:r>
+                                            <a:rPr lang="en-US" b="0" i="1" smtClean="0">
+                                              <a:latin typeface="Cambria Math" panose="02040503050406030204" pitchFamily="18" charset="0"/>
+                                            </a:rPr>
+                                            <m:t>𝑦</m:t>
+                                          </m:r>
+                                        </m:e>
+                                      </m:acc>
+                                    </m:e>
+                                    <m:sub>
+                                      <m:sSub>
+                                        <m:sSubPr>
+                                          <m:ctrlPr>
+                                            <a:rPr lang="en-US" b="0" i="1" smtClean="0">
+                                              <a:latin typeface="Cambria Math" panose="02040503050406030204" pitchFamily="18" charset="0"/>
+                                            </a:rPr>
+                                          </m:ctrlPr>
+                                        </m:sSubPr>
+                                        <m:e>
+                                          <m:r>
+                                            <a:rPr lang="en-US" b="0" i="1" smtClean="0">
+                                              <a:latin typeface="Cambria Math" panose="02040503050406030204" pitchFamily="18" charset="0"/>
+                                            </a:rPr>
+                                            <m:t>𝑅</m:t>
+                                          </m:r>
+                                        </m:e>
+                                        <m:sub>
+                                          <m:r>
+                                            <a:rPr lang="en-US" b="0" i="1" smtClean="0">
+                                              <a:latin typeface="Cambria Math" panose="02040503050406030204" pitchFamily="18" charset="0"/>
+                                            </a:rPr>
+                                            <m:t>1</m:t>
+                                          </m:r>
+                                        </m:sub>
+                                      </m:sSub>
+                                    </m:sub>
+                                  </m:sSub>
+                                </m:e>
+                              </m:d>
+                            </m:e>
+                            <m:sup>
+                              <m:r>
+                                <a:rPr lang="en-US" b="0" i="1" smtClean="0">
+                                  <a:latin typeface="Cambria Math" panose="02040503050406030204" pitchFamily="18" charset="0"/>
+                                </a:rPr>
+                                <m:t>2</m:t>
+                              </m:r>
+                            </m:sup>
+                          </m:sSup>
+                        </m:e>
+                      </m:nary>
+                      <m:r>
+                        <a:rPr lang="en-US" b="0" i="1" smtClean="0">
+                          <a:latin typeface="Cambria Math" panose="02040503050406030204" pitchFamily="18" charset="0"/>
+                        </a:rPr>
+                        <m:t>+</m:t>
+                      </m:r>
+                      <m:nary>
+                        <m:naryPr>
+                          <m:chr m:val="∑"/>
+                          <m:supHide m:val="on"/>
+                          <m:ctrlPr>
+                            <a:rPr lang="en-US" i="1">
+                              <a:latin typeface="Cambria Math" panose="02040503050406030204" pitchFamily="18" charset="0"/>
+                            </a:rPr>
+                          </m:ctrlPr>
+                        </m:naryPr>
+                        <m:sub>
+                          <m:r>
+                            <a:rPr lang="en-US" i="1">
+                              <a:latin typeface="Cambria Math" panose="02040503050406030204" pitchFamily="18" charset="0"/>
+                            </a:rPr>
+                            <m:t>𝑖</m:t>
+                          </m:r>
+                          <m:r>
+                            <a:rPr lang="en-US" i="1">
+                              <a:latin typeface="Cambria Math" panose="02040503050406030204" pitchFamily="18" charset="0"/>
+                            </a:rPr>
+                            <m:t>:</m:t>
+                          </m:r>
+                          <m:sSub>
+                            <m:sSubPr>
+                              <m:ctrlPr>
+                                <a:rPr lang="en-US" i="1">
+                                  <a:latin typeface="Cambria Math" panose="02040503050406030204" pitchFamily="18" charset="0"/>
+                                </a:rPr>
+                              </m:ctrlPr>
+                            </m:sSubPr>
+                            <m:e>
+                              <m:r>
+                                <a:rPr lang="en-US" i="1">
+                                  <a:latin typeface="Cambria Math" panose="02040503050406030204" pitchFamily="18" charset="0"/>
+                                </a:rPr>
+                                <m:t>𝑥</m:t>
+                              </m:r>
+                            </m:e>
+                            <m:sub>
+                              <m:r>
+                                <a:rPr lang="en-US" i="1">
+                                  <a:latin typeface="Cambria Math" panose="02040503050406030204" pitchFamily="18" charset="0"/>
+                                </a:rPr>
+                                <m:t>𝑖</m:t>
+                              </m:r>
+                            </m:sub>
+                          </m:sSub>
+                          <m:r>
+                            <a:rPr lang="en-US" i="1">
+                              <a:latin typeface="Cambria Math" panose="02040503050406030204" pitchFamily="18" charset="0"/>
+                            </a:rPr>
+                            <m:t>∈</m:t>
+                          </m:r>
+                          <m:sSub>
+                            <m:sSubPr>
+                              <m:ctrlPr>
+                                <a:rPr lang="en-US" i="1">
+                                  <a:latin typeface="Cambria Math" panose="02040503050406030204" pitchFamily="18" charset="0"/>
+                                </a:rPr>
+                              </m:ctrlPr>
+                            </m:sSubPr>
+                            <m:e>
+                              <m:r>
+                                <a:rPr lang="en-US" i="1">
+                                  <a:latin typeface="Cambria Math" panose="02040503050406030204" pitchFamily="18" charset="0"/>
+                                </a:rPr>
+                                <m:t>𝑅</m:t>
+                              </m:r>
+                            </m:e>
+                            <m:sub>
+                              <m:r>
+                                <a:rPr lang="en-US" b="0" i="1" smtClean="0">
+                                  <a:latin typeface="Cambria Math" panose="02040503050406030204" pitchFamily="18" charset="0"/>
+                                </a:rPr>
+                                <m:t>2</m:t>
+                              </m:r>
+                            </m:sub>
+                          </m:sSub>
+                          <m:d>
+                            <m:dPr>
+                              <m:ctrlPr>
+                                <a:rPr lang="en-US" i="1">
+                                  <a:latin typeface="Cambria Math" panose="02040503050406030204" pitchFamily="18" charset="0"/>
+                                </a:rPr>
+                              </m:ctrlPr>
+                            </m:dPr>
+                            <m:e>
+                              <m:r>
+                                <a:rPr lang="en-US" i="1">
+                                  <a:latin typeface="Cambria Math" panose="02040503050406030204" pitchFamily="18" charset="0"/>
+                                </a:rPr>
+                                <m:t>𝑗</m:t>
+                              </m:r>
+                              <m:r>
+                                <a:rPr lang="en-US" i="1">
+                                  <a:latin typeface="Cambria Math" panose="02040503050406030204" pitchFamily="18" charset="0"/>
+                                </a:rPr>
+                                <m:t>,</m:t>
+                              </m:r>
+                              <m:r>
+                                <a:rPr lang="en-US" i="1">
+                                  <a:latin typeface="Cambria Math" panose="02040503050406030204" pitchFamily="18" charset="0"/>
+                                </a:rPr>
+                                <m:t>𝑠</m:t>
+                              </m:r>
+                            </m:e>
+                          </m:d>
+                        </m:sub>
+                        <m:sup/>
+                        <m:e>
+                          <m:sSup>
+                            <m:sSupPr>
+                              <m:ctrlPr>
+                                <a:rPr lang="en-US" i="1">
+                                  <a:latin typeface="Cambria Math" panose="02040503050406030204" pitchFamily="18" charset="0"/>
+                                </a:rPr>
+                              </m:ctrlPr>
+                            </m:sSupPr>
+                            <m:e>
+                              <m:d>
+                                <m:dPr>
+                                  <m:ctrlPr>
+                                    <a:rPr lang="en-US" i="1">
+                                      <a:latin typeface="Cambria Math" panose="02040503050406030204" pitchFamily="18" charset="0"/>
+                                    </a:rPr>
+                                  </m:ctrlPr>
+                                </m:dPr>
+                                <m:e>
+                                  <m:sSub>
+                                    <m:sSubPr>
+                                      <m:ctrlPr>
+                                        <a:rPr lang="en-US" i="1">
+                                          <a:latin typeface="Cambria Math" panose="02040503050406030204" pitchFamily="18" charset="0"/>
+                                        </a:rPr>
+                                      </m:ctrlPr>
+                                    </m:sSubPr>
+                                    <m:e>
+                                      <m:r>
+                                        <a:rPr lang="en-US" i="1">
+                                          <a:latin typeface="Cambria Math" panose="02040503050406030204" pitchFamily="18" charset="0"/>
+                                        </a:rPr>
+                                        <m:t>𝑦</m:t>
+                                      </m:r>
+                                    </m:e>
+                                    <m:sub>
+                                      <m:r>
+                                        <a:rPr lang="en-US" i="1">
+                                          <a:latin typeface="Cambria Math" panose="02040503050406030204" pitchFamily="18" charset="0"/>
+                                        </a:rPr>
+                                        <m:t>𝑖</m:t>
+                                      </m:r>
+                                    </m:sub>
+                                  </m:sSub>
+                                  <m:r>
+                                    <a:rPr lang="en-US" i="1">
+                                      <a:latin typeface="Cambria Math" panose="02040503050406030204" pitchFamily="18" charset="0"/>
+                                    </a:rPr>
+                                    <m:t>−</m:t>
+                                  </m:r>
+                                  <m:sSub>
+                                    <m:sSubPr>
+                                      <m:ctrlPr>
+                                        <a:rPr lang="en-US" i="1">
+                                          <a:latin typeface="Cambria Math" panose="02040503050406030204" pitchFamily="18" charset="0"/>
+                                        </a:rPr>
+                                      </m:ctrlPr>
+                                    </m:sSubPr>
+                                    <m:e>
+                                      <m:acc>
+                                        <m:accPr>
+                                          <m:chr m:val="̂"/>
+                                          <m:ctrlPr>
+                                            <a:rPr lang="en-US" i="1">
+                                              <a:latin typeface="Cambria Math" panose="02040503050406030204" pitchFamily="18" charset="0"/>
+                                            </a:rPr>
+                                          </m:ctrlPr>
+                                        </m:accPr>
+                                        <m:e>
+                                          <m:r>
+                                            <a:rPr lang="en-US" i="1">
+                                              <a:latin typeface="Cambria Math" panose="02040503050406030204" pitchFamily="18" charset="0"/>
+                                            </a:rPr>
+                                            <m:t>𝑦</m:t>
+                                          </m:r>
+                                        </m:e>
+                                      </m:acc>
+                                    </m:e>
+                                    <m:sub>
+                                      <m:sSub>
+                                        <m:sSubPr>
+                                          <m:ctrlPr>
+                                            <a:rPr lang="en-US" i="1">
+                                              <a:latin typeface="Cambria Math" panose="02040503050406030204" pitchFamily="18" charset="0"/>
+                                            </a:rPr>
+                                          </m:ctrlPr>
+                                        </m:sSubPr>
+                                        <m:e>
+                                          <m:r>
+                                            <a:rPr lang="en-US" i="1">
+                                              <a:latin typeface="Cambria Math" panose="02040503050406030204" pitchFamily="18" charset="0"/>
+                                            </a:rPr>
+                                            <m:t>𝑅</m:t>
+                                          </m:r>
+                                        </m:e>
+                                        <m:sub>
+                                          <m:r>
+                                            <a:rPr lang="en-US" b="0" i="1" smtClean="0">
+                                              <a:latin typeface="Cambria Math" panose="02040503050406030204" pitchFamily="18" charset="0"/>
+                                            </a:rPr>
+                                            <m:t>2</m:t>
+                                          </m:r>
+                                        </m:sub>
+                                      </m:sSub>
+                                    </m:sub>
+                                  </m:sSub>
+                                </m:e>
+                              </m:d>
+                            </m:e>
+                            <m:sup>
+                              <m:r>
+                                <a:rPr lang="en-US" i="1">
+                                  <a:latin typeface="Cambria Math" panose="02040503050406030204" pitchFamily="18" charset="0"/>
+                                </a:rPr>
+                                <m:t>2</m:t>
+                              </m:r>
+                            </m:sup>
+                          </m:sSup>
+                        </m:e>
+                      </m:nary>
+                    </m:oMath>
+                  </m:oMathPara>
+                </a14:m>
+                <a:endParaRPr lang="en-US" dirty="0"/>
+              </a:p>
+            </p:txBody>
+          </p:sp>
+        </mc:Choice>
+        <mc:Fallback>
+          <p:sp>
+            <p:nvSpPr>
+              <p:cNvPr id="3" name="Content Placeholder 2">
+                <a:extLst>
+                  <a:ext uri="{FF2B5EF4-FFF2-40B4-BE49-F238E27FC236}">
+                    <a16:creationId xmlns:a16="http://schemas.microsoft.com/office/drawing/2014/main" id="{31AE4E9F-EACB-472F-B605-A431EA5EC19F}"/>
+                  </a:ext>
+                </a:extLst>
+              </p:cNvPr>
+              <p:cNvSpPr>
+                <a:spLocks noGrp="1" noRot="1" noChangeAspect="1" noMove="1" noResize="1" noEditPoints="1" noAdjustHandles="1" noChangeArrowheads="1" noChangeShapeType="1" noTextEdit="1"/>
+              </p:cNvSpPr>
+              <p:nvPr>
+                <p:ph idx="1"/>
+              </p:nvPr>
+            </p:nvSpPr>
+            <p:spPr>
+              <a:blipFill>
+                <a:blip r:embed="rId2"/>
+                <a:stretch>
+                  <a:fillRect l="-667" t="-752"/>
+                </a:stretch>
+              </a:blipFill>
+            </p:spPr>
+            <p:txBody>
+              <a:bodyPr/>
+              <a:lstStyle/>
+              <a:p>
+                <a:r>
+                  <a:rPr lang="en-IL">
+                    <a:noFill/>
+                  </a:rPr>
+                  <a:t> </a:t>
+                </a:r>
+              </a:p>
+            </p:txBody>
+          </p:sp>
+        </mc:Fallback>
+      </mc:AlternateContent>
+      <p:sp>
+        <p:nvSpPr>
+          <p:cNvPr id="4" name="Footer Placeholder 3">
+            <a:extLst>
+              <a:ext uri="{FF2B5EF4-FFF2-40B4-BE49-F238E27FC236}">
+                <a16:creationId xmlns:a16="http://schemas.microsoft.com/office/drawing/2014/main" id="{46221B2F-4990-45E5-A855-30F725B6A5C0}"/>
+              </a:ext>
+            </a:extLst>
+          </p:cNvPr>
+          <p:cNvSpPr>
+            <a:spLocks noGrp="1"/>
+          </p:cNvSpPr>
+          <p:nvPr>
+            <p:ph type="ftr" sz="quarter" idx="11"/>
+          </p:nvPr>
+        </p:nvSpPr>
+        <p:spPr/>
+        <p:txBody>
+          <a:bodyPr/>
+          <a:lstStyle/>
+          <a:p>
+            <a:r>
+              <a:rPr lang="en-US"/>
+              <a:t>Materials by Adi Sarid https://adisarid.github.io and http://www.sarid-ins.com</a:t>
+            </a:r>
+            <a:endParaRPr lang="en-US" dirty="0"/>
+          </a:p>
+        </p:txBody>
+      </p:sp>
+      <p:sp>
+        <p:nvSpPr>
+          <p:cNvPr id="5" name="Slide Number Placeholder 4">
+            <a:extLst>
+              <a:ext uri="{FF2B5EF4-FFF2-40B4-BE49-F238E27FC236}">
+                <a16:creationId xmlns:a16="http://schemas.microsoft.com/office/drawing/2014/main" id="{D1994322-5282-4E85-86EF-C1E4616EBADF}"/>
+              </a:ext>
+            </a:extLst>
+          </p:cNvPr>
+          <p:cNvSpPr>
+            <a:spLocks noGrp="1"/>
+          </p:cNvSpPr>
+          <p:nvPr>
+            <p:ph type="sldNum" sz="quarter" idx="12"/>
+          </p:nvPr>
+        </p:nvSpPr>
+        <p:spPr/>
+        <p:txBody>
+          <a:bodyPr/>
+          <a:lstStyle/>
+          <a:p>
+            <a:fld id="{4FAB73BC-B049-4115-A692-8D63A059BFB8}" type="slidenum">
+              <a:rPr lang="en-US" smtClean="0"/>
+              <a:t>23</a:t>
+            </a:fld>
+            <a:endParaRPr lang="en-US" dirty="0"/>
+          </a:p>
+        </p:txBody>
+      </p:sp>
+      <p:grpSp>
+        <p:nvGrpSpPr>
+          <p:cNvPr id="10" name="Group 9">
+            <a:extLst>
+              <a:ext uri="{FF2B5EF4-FFF2-40B4-BE49-F238E27FC236}">
+                <a16:creationId xmlns:a16="http://schemas.microsoft.com/office/drawing/2014/main" id="{F16D40CF-F300-4998-9510-538697AD845D}"/>
+              </a:ext>
+            </a:extLst>
+          </p:cNvPr>
+          <p:cNvGrpSpPr/>
+          <p:nvPr/>
+        </p:nvGrpSpPr>
+        <p:grpSpPr>
+          <a:xfrm>
+            <a:off x="8686802" y="5422604"/>
+            <a:ext cx="3387504" cy="396765"/>
+            <a:chOff x="8665536" y="5433237"/>
+            <a:chExt cx="3387504" cy="396765"/>
+          </a:xfrm>
+        </p:grpSpPr>
+        <p:cxnSp>
+          <p:nvCxnSpPr>
+            <p:cNvPr id="7" name="Straight Arrow Connector 6">
+              <a:extLst>
+                <a:ext uri="{FF2B5EF4-FFF2-40B4-BE49-F238E27FC236}">
+                  <a16:creationId xmlns:a16="http://schemas.microsoft.com/office/drawing/2014/main" id="{EB810A04-7B34-4B2A-8082-5AFFC708998F}"/>
+                </a:ext>
+              </a:extLst>
+            </p:cNvPr>
+            <p:cNvCxnSpPr>
+              <a:cxnSpLocks/>
+            </p:cNvCxnSpPr>
+            <p:nvPr/>
+          </p:nvCxnSpPr>
+          <p:spPr>
+            <a:xfrm flipH="1">
+              <a:off x="8665536" y="5433237"/>
+              <a:ext cx="3285672" cy="0"/>
+            </a:xfrm>
+            <a:prstGeom prst="straightConnector1">
+              <a:avLst/>
+            </a:prstGeom>
+            <a:ln>
+              <a:tailEnd type="triangle"/>
+            </a:ln>
+          </p:spPr>
+          <p:style>
+            <a:lnRef idx="1">
+              <a:schemeClr val="accent1"/>
+            </a:lnRef>
+            <a:fillRef idx="0">
+              <a:schemeClr val="accent1"/>
+            </a:fillRef>
+            <a:effectRef idx="0">
+              <a:schemeClr val="accent1"/>
+            </a:effectRef>
+            <a:fontRef idx="minor">
+              <a:schemeClr val="tx1"/>
+            </a:fontRef>
+          </p:style>
+        </p:cxnSp>
+        <p:sp>
+          <p:nvSpPr>
+            <p:cNvPr id="8" name="TextBox 7">
+              <a:extLst>
+                <a:ext uri="{FF2B5EF4-FFF2-40B4-BE49-F238E27FC236}">
+                  <a16:creationId xmlns:a16="http://schemas.microsoft.com/office/drawing/2014/main" id="{93B8ABDF-A2D6-4612-90B2-EE0C4A35D317}"/>
+                </a:ext>
+              </a:extLst>
+            </p:cNvPr>
+            <p:cNvSpPr txBox="1"/>
+            <p:nvPr/>
+          </p:nvSpPr>
+          <p:spPr>
+            <a:xfrm>
+              <a:off x="8978159" y="5460670"/>
+              <a:ext cx="3074881" cy="369332"/>
+            </a:xfrm>
+            <a:prstGeom prst="rect">
+              <a:avLst/>
+            </a:prstGeom>
+            <a:noFill/>
+          </p:spPr>
+          <p:txBody>
+            <a:bodyPr wrap="none" rtlCol="0">
+              <a:spAutoFit/>
+            </a:bodyPr>
+            <a:lstStyle/>
+            <a:p>
+              <a:r>
+                <a:rPr lang="en-US" dirty="0"/>
+                <a:t>Recursive binary splitting</a:t>
+              </a:r>
+              <a:endParaRPr lang="en-IL" dirty="0"/>
+            </a:p>
+          </p:txBody>
+        </p:sp>
+      </p:grpSp>
+    </p:spTree>
+    <p:extLst>
+      <p:ext uri="{BB962C8B-B14F-4D97-AF65-F5344CB8AC3E}">
+        <p14:creationId xmlns:p14="http://schemas.microsoft.com/office/powerpoint/2010/main" val="1921675993"/>
+      </p:ext>
+    </p:extLst>
+  </p:cSld>
+  <p:clrMapOvr>
+    <a:masterClrMapping/>
+  </p:clrMapOvr>
+</p:sld>
+</file>
+
+<file path=ppt/slides/slide24.xml><?xml version="1.0" encoding="utf-8"?>
+<p:sld xmlns:a="http://schemas.openxmlformats.org/drawingml/2006/main" xmlns:r="http://schemas.openxmlformats.org/officeDocument/2006/relationships" xmlns:p="http://schemas.openxmlformats.org/presentationml/2006/main">
+  <p:cSld>
+    <p:spTree>
+      <p:nvGrpSpPr>
+        <p:cNvPr id="1" name=""/>
+        <p:cNvGrpSpPr/>
+        <p:nvPr/>
+      </p:nvGrpSpPr>
+      <p:grpSpPr>
+        <a:xfrm>
+          <a:off x="0" y="0"/>
+          <a:ext cx="0" cy="0"/>
+          <a:chOff x="0" y="0"/>
+          <a:chExt cx="0" cy="0"/>
+        </a:xfrm>
+      </p:grpSpPr>
+      <p:sp>
+        <p:nvSpPr>
+          <p:cNvPr id="2" name="Title 1">
+            <a:extLst>
+              <a:ext uri="{FF2B5EF4-FFF2-40B4-BE49-F238E27FC236}">
+                <a16:creationId xmlns:a16="http://schemas.microsoft.com/office/drawing/2014/main" id="{CDE5994E-D75A-4232-BB36-6C43CBF9AAE0}"/>
+              </a:ext>
+            </a:extLst>
+          </p:cNvPr>
+          <p:cNvSpPr>
+            <a:spLocks noGrp="1"/>
+          </p:cNvSpPr>
+          <p:nvPr>
+            <p:ph type="title"/>
+          </p:nvPr>
+        </p:nvSpPr>
+        <p:spPr/>
+        <p:txBody>
+          <a:bodyPr/>
+          <a:lstStyle/>
+          <a:p>
+            <a:r>
+              <a:rPr lang="en-US" dirty="0"/>
+              <a:t>Tree Pruning</a:t>
+            </a:r>
+            <a:endParaRPr lang="en-IL" dirty="0"/>
+          </a:p>
+        </p:txBody>
+      </p:sp>
+      <mc:AlternateContent xmlns:mc="http://schemas.openxmlformats.org/markup-compatibility/2006">
+        <mc:Choice xmlns:a14="http://schemas.microsoft.com/office/drawing/2010/main" Requires="a14">
+          <p:sp>
+            <p:nvSpPr>
+              <p:cNvPr id="3" name="Content Placeholder 2">
+                <a:extLst>
+                  <a:ext uri="{FF2B5EF4-FFF2-40B4-BE49-F238E27FC236}">
+                    <a16:creationId xmlns:a16="http://schemas.microsoft.com/office/drawing/2014/main" id="{C4BFC5BA-A395-468E-A705-079FD5AF7ADB}"/>
+                  </a:ext>
+                </a:extLst>
+              </p:cNvPr>
+              <p:cNvSpPr>
+                <a:spLocks noGrp="1"/>
+              </p:cNvSpPr>
+              <p:nvPr>
+                <p:ph idx="1"/>
+              </p:nvPr>
+            </p:nvSpPr>
+            <p:spPr/>
+            <p:txBody>
+              <a:bodyPr>
+                <a:normAutofit fontScale="85000" lnSpcReduction="10000"/>
+              </a:bodyPr>
+              <a:lstStyle/>
+              <a:p>
+                <a:pPr>
+                  <a:lnSpc>
+                    <a:spcPct val="150000"/>
+                  </a:lnSpc>
+                </a:pPr>
+                <a:r>
+                  <a:rPr lang="en-US" dirty="0"/>
+                  <a:t>Grow a very large tree (which will probably be extremely over-fitted)</a:t>
+                </a:r>
+              </a:p>
+              <a:p>
+                <a:pPr>
+                  <a:lnSpc>
+                    <a:spcPct val="150000"/>
+                  </a:lnSpc>
+                </a:pPr>
+                <a:r>
+                  <a:rPr lang="en-US" dirty="0"/>
+                  <a:t>Use a “cost complexity” parameter, </a:t>
+                </a:r>
+                <a14:m>
+                  <m:oMath xmlns:m="http://schemas.openxmlformats.org/officeDocument/2006/math">
+                    <m:r>
+                      <a:rPr lang="en-US" b="0" i="1" smtClean="0">
+                        <a:latin typeface="Cambria Math" panose="02040503050406030204" pitchFamily="18" charset="0"/>
+                      </a:rPr>
+                      <m:t>𝛼</m:t>
+                    </m:r>
+                  </m:oMath>
+                </a14:m>
+                <a:r>
+                  <a:rPr lang="en-US" dirty="0"/>
+                  <a:t>, to prune the leaves and branches into subtrees, i.e., by minimizing:</a:t>
+                </a:r>
+              </a:p>
+              <a:p>
+                <a:pPr marL="0" indent="0" algn="ctr">
+                  <a:lnSpc>
+                    <a:spcPct val="150000"/>
+                  </a:lnSpc>
+                  <a:buNone/>
+                </a:pPr>
+                <a14:m>
+                  <m:oMathPara xmlns:m="http://schemas.openxmlformats.org/officeDocument/2006/math">
+                    <m:oMathParaPr>
+                      <m:jc m:val="centerGroup"/>
+                    </m:oMathParaPr>
+                    <m:oMath xmlns:m="http://schemas.openxmlformats.org/officeDocument/2006/math">
+                      <m:nary>
+                        <m:naryPr>
+                          <m:chr m:val="∑"/>
+                          <m:ctrlPr>
+                            <a:rPr lang="en-US" b="0" i="1" smtClean="0">
+                              <a:latin typeface="Cambria Math" panose="02040503050406030204" pitchFamily="18" charset="0"/>
+                            </a:rPr>
+                          </m:ctrlPr>
+                        </m:naryPr>
+                        <m:sub>
+                          <m:r>
+                            <a:rPr lang="en-US" b="0" i="1" smtClean="0">
+                              <a:latin typeface="Cambria Math" panose="02040503050406030204" pitchFamily="18" charset="0"/>
+                            </a:rPr>
+                            <m:t>𝑚</m:t>
+                          </m:r>
+                          <m:r>
+                            <a:rPr lang="en-US" b="0" i="1" smtClean="0">
+                              <a:latin typeface="Cambria Math" panose="02040503050406030204" pitchFamily="18" charset="0"/>
+                            </a:rPr>
+                            <m:t>=</m:t>
+                          </m:r>
+                          <m:r>
+                            <a:rPr lang="en-US" b="0" i="1" smtClean="0">
+                              <a:latin typeface="Cambria Math" panose="02040503050406030204" pitchFamily="18" charset="0"/>
+                            </a:rPr>
+                            <m:t>1</m:t>
+                          </m:r>
+                        </m:sub>
+                        <m:sup>
+                          <m:d>
+                            <m:dPr>
+                              <m:begChr m:val="|"/>
+                              <m:endChr m:val="|"/>
+                              <m:ctrlPr>
+                                <a:rPr lang="en-US" b="0" i="1" smtClean="0">
+                                  <a:latin typeface="Cambria Math" panose="02040503050406030204" pitchFamily="18" charset="0"/>
+                                </a:rPr>
+                              </m:ctrlPr>
+                            </m:dPr>
+                            <m:e>
+                              <m:r>
+                                <a:rPr lang="en-US" b="0" i="1" smtClean="0">
+                                  <a:latin typeface="Cambria Math" panose="02040503050406030204" pitchFamily="18" charset="0"/>
+                                </a:rPr>
+                                <m:t>𝑇</m:t>
+                              </m:r>
+                            </m:e>
+                          </m:d>
+                        </m:sup>
+                        <m:e>
+                          <m:nary>
+                            <m:naryPr>
+                              <m:chr m:val="∑"/>
+                              <m:supHide m:val="on"/>
+                              <m:ctrlPr>
+                                <a:rPr lang="en-US" b="0" i="1" smtClean="0">
+                                  <a:latin typeface="Cambria Math" panose="02040503050406030204" pitchFamily="18" charset="0"/>
+                                </a:rPr>
+                              </m:ctrlPr>
+                            </m:naryPr>
+                            <m:sub>
+                              <m:r>
+                                <a:rPr lang="en-US" b="0" i="1" smtClean="0">
+                                  <a:latin typeface="Cambria Math" panose="02040503050406030204" pitchFamily="18" charset="0"/>
+                                </a:rPr>
+                                <m:t>𝑥</m:t>
+                              </m:r>
+                              <m:r>
+                                <a:rPr lang="en-US" b="0" i="1" smtClean="0">
+                                  <a:latin typeface="Cambria Math" panose="02040503050406030204" pitchFamily="18" charset="0"/>
+                                </a:rPr>
+                                <m:t>∈</m:t>
+                              </m:r>
+                              <m:sSub>
+                                <m:sSubPr>
+                                  <m:ctrlPr>
+                                    <a:rPr lang="en-US" b="0" i="1" smtClean="0">
+                                      <a:latin typeface="Cambria Math" panose="02040503050406030204" pitchFamily="18" charset="0"/>
+                                    </a:rPr>
+                                  </m:ctrlPr>
+                                </m:sSubPr>
+                                <m:e>
+                                  <m:r>
+                                    <a:rPr lang="en-US" b="0" i="1" smtClean="0">
+                                      <a:latin typeface="Cambria Math" panose="02040503050406030204" pitchFamily="18" charset="0"/>
+                                    </a:rPr>
+                                    <m:t>𝑅</m:t>
+                                  </m:r>
+                                </m:e>
+                                <m:sub>
+                                  <m:r>
+                                    <a:rPr lang="en-US" b="0" i="1" smtClean="0">
+                                      <a:latin typeface="Cambria Math" panose="02040503050406030204" pitchFamily="18" charset="0"/>
+                                    </a:rPr>
+                                    <m:t>𝑚</m:t>
+                                  </m:r>
+                                </m:sub>
+                              </m:sSub>
+                            </m:sub>
+                            <m:sup/>
+                            <m:e>
+                              <m:sSup>
+                                <m:sSupPr>
+                                  <m:ctrlPr>
+                                    <a:rPr lang="en-US" b="0" i="1" smtClean="0">
+                                      <a:latin typeface="Cambria Math" panose="02040503050406030204" pitchFamily="18" charset="0"/>
+                                    </a:rPr>
+                                  </m:ctrlPr>
+                                </m:sSupPr>
+                                <m:e>
+                                  <m:d>
+                                    <m:dPr>
+                                      <m:ctrlPr>
+                                        <a:rPr lang="en-US" b="0" i="1" smtClean="0">
+                                          <a:latin typeface="Cambria Math" panose="02040503050406030204" pitchFamily="18" charset="0"/>
+                                        </a:rPr>
+                                      </m:ctrlPr>
+                                    </m:dPr>
+                                    <m:e>
+                                      <m:sSub>
+                                        <m:sSubPr>
+                                          <m:ctrlPr>
+                                            <a:rPr lang="en-US" b="0" i="1" smtClean="0">
+                                              <a:latin typeface="Cambria Math" panose="02040503050406030204" pitchFamily="18" charset="0"/>
+                                            </a:rPr>
+                                          </m:ctrlPr>
+                                        </m:sSubPr>
+                                        <m:e>
+                                          <m:r>
+                                            <a:rPr lang="en-US" b="0" i="1" smtClean="0">
+                                              <a:latin typeface="Cambria Math" panose="02040503050406030204" pitchFamily="18" charset="0"/>
+                                            </a:rPr>
+                                            <m:t>𝑦</m:t>
+                                          </m:r>
+                                        </m:e>
+                                        <m:sub>
+                                          <m:r>
+                                            <a:rPr lang="en-US" b="0" i="1" smtClean="0">
+                                              <a:latin typeface="Cambria Math" panose="02040503050406030204" pitchFamily="18" charset="0"/>
+                                            </a:rPr>
+                                            <m:t>𝑖</m:t>
+                                          </m:r>
+                                        </m:sub>
+                                      </m:sSub>
+                                      <m:r>
+                                        <a:rPr lang="en-US" b="0" i="1" smtClean="0">
+                                          <a:latin typeface="Cambria Math" panose="02040503050406030204" pitchFamily="18" charset="0"/>
+                                        </a:rPr>
+                                        <m:t>−</m:t>
+                                      </m:r>
+                                      <m:sSub>
+                                        <m:sSubPr>
+                                          <m:ctrlPr>
+                                            <a:rPr lang="en-US" b="0" i="1" smtClean="0">
+                                              <a:latin typeface="Cambria Math" panose="02040503050406030204" pitchFamily="18" charset="0"/>
+                                            </a:rPr>
+                                          </m:ctrlPr>
+                                        </m:sSubPr>
+                                        <m:e>
+                                          <m:acc>
+                                            <m:accPr>
+                                              <m:chr m:val="̂"/>
+                                              <m:ctrlPr>
+                                                <a:rPr lang="en-US" b="0" i="1" smtClean="0">
+                                                  <a:latin typeface="Cambria Math" panose="02040503050406030204" pitchFamily="18" charset="0"/>
+                                                </a:rPr>
+                                              </m:ctrlPr>
+                                            </m:accPr>
+                                            <m:e>
+                                              <m:r>
+                                                <a:rPr lang="en-US" b="0" i="1" smtClean="0">
+                                                  <a:latin typeface="Cambria Math" panose="02040503050406030204" pitchFamily="18" charset="0"/>
+                                                </a:rPr>
+                                                <m:t>𝑦</m:t>
+                                              </m:r>
+                                            </m:e>
+                                          </m:acc>
+                                        </m:e>
+                                        <m:sub>
+                                          <m:sSub>
+                                            <m:sSubPr>
+                                              <m:ctrlPr>
+                                                <a:rPr lang="en-US" b="0" i="1" smtClean="0">
+                                                  <a:latin typeface="Cambria Math" panose="02040503050406030204" pitchFamily="18" charset="0"/>
+                                                </a:rPr>
+                                              </m:ctrlPr>
+                                            </m:sSubPr>
+                                            <m:e>
+                                              <m:r>
+                                                <a:rPr lang="en-US" b="0" i="1" smtClean="0">
+                                                  <a:latin typeface="Cambria Math" panose="02040503050406030204" pitchFamily="18" charset="0"/>
+                                                </a:rPr>
+                                                <m:t>𝑅</m:t>
+                                              </m:r>
+                                            </m:e>
+                                            <m:sub>
+                                              <m:r>
+                                                <a:rPr lang="en-US" b="0" i="1" smtClean="0">
+                                                  <a:latin typeface="Cambria Math" panose="02040503050406030204" pitchFamily="18" charset="0"/>
+                                                </a:rPr>
+                                                <m:t>𝑚</m:t>
+                                              </m:r>
+                                            </m:sub>
+                                          </m:sSub>
+                                        </m:sub>
+                                      </m:sSub>
+                                    </m:e>
+                                  </m:d>
+                                </m:e>
+                                <m:sup>
+                                  <m:r>
+                                    <a:rPr lang="en-US" b="0" i="1" smtClean="0">
+                                      <a:latin typeface="Cambria Math" panose="02040503050406030204" pitchFamily="18" charset="0"/>
+                                    </a:rPr>
+                                    <m:t>2</m:t>
+                                  </m:r>
+                                </m:sup>
+                              </m:sSup>
+                              <m:r>
+                                <a:rPr lang="en-US" b="0" i="1" smtClean="0">
+                                  <a:latin typeface="Cambria Math" panose="02040503050406030204" pitchFamily="18" charset="0"/>
+                                </a:rPr>
+                                <m:t>+</m:t>
+                              </m:r>
+                              <m:r>
+                                <a:rPr lang="en-US" b="0" i="1" smtClean="0">
+                                  <a:latin typeface="Cambria Math" panose="02040503050406030204" pitchFamily="18" charset="0"/>
+                                </a:rPr>
+                                <m:t>𝛼</m:t>
+                              </m:r>
+                              <m:d>
+                                <m:dPr>
+                                  <m:begChr m:val="|"/>
+                                  <m:endChr m:val="|"/>
+                                  <m:ctrlPr>
+                                    <a:rPr lang="en-US" b="0" i="1" smtClean="0">
+                                      <a:latin typeface="Cambria Math" panose="02040503050406030204" pitchFamily="18" charset="0"/>
+                                    </a:rPr>
+                                  </m:ctrlPr>
+                                </m:dPr>
+                                <m:e>
+                                  <m:r>
+                                    <a:rPr lang="en-US" b="0" i="1" smtClean="0">
+                                      <a:latin typeface="Cambria Math" panose="02040503050406030204" pitchFamily="18" charset="0"/>
+                                    </a:rPr>
+                                    <m:t>𝑇</m:t>
+                                  </m:r>
+                                </m:e>
+                              </m:d>
+                            </m:e>
+                          </m:nary>
+                        </m:e>
+                      </m:nary>
+                    </m:oMath>
+                  </m:oMathPara>
+                </a14:m>
+                <a:endParaRPr lang="en-US" dirty="0"/>
+              </a:p>
+              <a:p>
+                <a:pPr>
+                  <a:lnSpc>
+                    <a:spcPct val="150000"/>
+                  </a:lnSpc>
+                </a:pPr>
+                <a:r>
+                  <a:rPr lang="en-US" dirty="0"/>
+                  <a:t>Where </a:t>
+                </a:r>
+                <a14:m>
+                  <m:oMath xmlns:m="http://schemas.openxmlformats.org/officeDocument/2006/math">
+                    <m:d>
+                      <m:dPr>
+                        <m:begChr m:val="|"/>
+                        <m:endChr m:val="|"/>
+                        <m:ctrlPr>
+                          <a:rPr lang="en-US" b="0" i="1" smtClean="0">
+                            <a:latin typeface="Cambria Math" panose="02040503050406030204" pitchFamily="18" charset="0"/>
+                          </a:rPr>
+                        </m:ctrlPr>
+                      </m:dPr>
+                      <m:e>
+                        <m:r>
+                          <a:rPr lang="en-US" b="0" i="1" smtClean="0">
+                            <a:latin typeface="Cambria Math" panose="02040503050406030204" pitchFamily="18" charset="0"/>
+                          </a:rPr>
+                          <m:t>𝑇</m:t>
+                        </m:r>
+                      </m:e>
+                    </m:d>
+                  </m:oMath>
+                </a14:m>
+                <a:r>
+                  <a:rPr lang="en-US" dirty="0"/>
+                  <a:t> is the number of terminal nodes (see the resemblance to </a:t>
+                </a:r>
+                <a:r>
+                  <a:rPr lang="en-US" b="1" dirty="0"/>
+                  <a:t>lasso?</a:t>
+                </a:r>
+                <a:r>
+                  <a:rPr lang="en-US" dirty="0"/>
+                  <a:t>)</a:t>
+                </a:r>
+              </a:p>
+              <a:p>
+                <a:pPr>
+                  <a:lnSpc>
+                    <a:spcPct val="150000"/>
+                  </a:lnSpc>
+                </a:pPr>
+                <a:r>
+                  <a:rPr lang="en-US" dirty="0"/>
+                  <a:t>Using cross-validation, examine the error as a function of the cost complexity</a:t>
+                </a:r>
+              </a:p>
+              <a:p>
+                <a:pPr>
+                  <a:lnSpc>
+                    <a:spcPct val="150000"/>
+                  </a:lnSpc>
+                </a:pPr>
+                <a:r>
+                  <a:rPr lang="en-US" dirty="0"/>
+                  <a:t>Choose optimal cost complexity </a:t>
+                </a:r>
+                <a:endParaRPr lang="en-IL" dirty="0"/>
+              </a:p>
+            </p:txBody>
+          </p:sp>
+        </mc:Choice>
+        <mc:Fallback>
+          <p:sp>
+            <p:nvSpPr>
+              <p:cNvPr id="3" name="Content Placeholder 2">
+                <a:extLst>
+                  <a:ext uri="{FF2B5EF4-FFF2-40B4-BE49-F238E27FC236}">
+                    <a16:creationId xmlns:a16="http://schemas.microsoft.com/office/drawing/2014/main" id="{C4BFC5BA-A395-468E-A705-079FD5AF7ADB}"/>
+                  </a:ext>
+                </a:extLst>
+              </p:cNvPr>
+              <p:cNvSpPr>
+                <a:spLocks noGrp="1" noRot="1" noChangeAspect="1" noMove="1" noResize="1" noEditPoints="1" noAdjustHandles="1" noChangeArrowheads="1" noChangeShapeType="1" noTextEdit="1"/>
+              </p:cNvSpPr>
+              <p:nvPr>
+                <p:ph idx="1"/>
+              </p:nvPr>
+            </p:nvSpPr>
+            <p:spPr>
+              <a:blipFill>
+                <a:blip r:embed="rId2"/>
+                <a:stretch>
+                  <a:fillRect l="-121" b="-902"/>
+                </a:stretch>
+              </a:blipFill>
+            </p:spPr>
+            <p:txBody>
+              <a:bodyPr/>
+              <a:lstStyle/>
+              <a:p>
+                <a:r>
+                  <a:rPr lang="en-IL">
+                    <a:noFill/>
+                  </a:rPr>
+                  <a:t> </a:t>
+                </a:r>
+              </a:p>
+            </p:txBody>
+          </p:sp>
+        </mc:Fallback>
+      </mc:AlternateContent>
+      <p:sp>
+        <p:nvSpPr>
+          <p:cNvPr id="4" name="Footer Placeholder 3">
+            <a:extLst>
+              <a:ext uri="{FF2B5EF4-FFF2-40B4-BE49-F238E27FC236}">
+                <a16:creationId xmlns:a16="http://schemas.microsoft.com/office/drawing/2014/main" id="{D5D8BD24-FAEE-4B2B-A0DF-27B857B64B82}"/>
+              </a:ext>
+            </a:extLst>
+          </p:cNvPr>
+          <p:cNvSpPr>
+            <a:spLocks noGrp="1"/>
+          </p:cNvSpPr>
+          <p:nvPr>
+            <p:ph type="ftr" sz="quarter" idx="11"/>
+          </p:nvPr>
+        </p:nvSpPr>
+        <p:spPr/>
+        <p:txBody>
+          <a:bodyPr/>
+          <a:lstStyle/>
+          <a:p>
+            <a:r>
+              <a:rPr lang="en-US"/>
+              <a:t>Materials by Adi Sarid https://adisarid.github.io and http://www.sarid-ins.com</a:t>
+            </a:r>
+            <a:endParaRPr lang="en-US" dirty="0"/>
+          </a:p>
+        </p:txBody>
+      </p:sp>
+      <p:sp>
+        <p:nvSpPr>
+          <p:cNvPr id="5" name="Slide Number Placeholder 4">
+            <a:extLst>
+              <a:ext uri="{FF2B5EF4-FFF2-40B4-BE49-F238E27FC236}">
+                <a16:creationId xmlns:a16="http://schemas.microsoft.com/office/drawing/2014/main" id="{9025BDA3-2C28-41E9-AB48-A131E6075B13}"/>
+              </a:ext>
+            </a:extLst>
+          </p:cNvPr>
+          <p:cNvSpPr>
+            <a:spLocks noGrp="1"/>
+          </p:cNvSpPr>
+          <p:nvPr>
+            <p:ph type="sldNum" sz="quarter" idx="12"/>
+          </p:nvPr>
+        </p:nvSpPr>
+        <p:spPr/>
+        <p:txBody>
+          <a:bodyPr/>
+          <a:lstStyle/>
+          <a:p>
+            <a:fld id="{4FAB73BC-B049-4115-A692-8D63A059BFB8}" type="slidenum">
+              <a:rPr lang="en-US" smtClean="0"/>
+              <a:t>24</a:t>
+            </a:fld>
+            <a:endParaRPr lang="en-US" dirty="0"/>
+          </a:p>
+        </p:txBody>
+      </p:sp>
+    </p:spTree>
+    <p:extLst>
+      <p:ext uri="{BB962C8B-B14F-4D97-AF65-F5344CB8AC3E}">
+        <p14:creationId xmlns:p14="http://schemas.microsoft.com/office/powerpoint/2010/main" val="2921911641"/>
+      </p:ext>
+    </p:extLst>
+  </p:cSld>
+  <p:clrMapOvr>
+    <a:masterClrMapping/>
+  </p:clrMapOvr>
+</p:sld>
+</file>
+
+<file path=ppt/slides/slide25.xml><?xml version="1.0" encoding="utf-8"?>
+<p:sld xmlns:a="http://schemas.openxmlformats.org/drawingml/2006/main" xmlns:r="http://schemas.openxmlformats.org/officeDocument/2006/relationships" xmlns:p="http://schemas.openxmlformats.org/presentationml/2006/main">
+  <p:cSld>
+    <p:spTree>
+      <p:nvGrpSpPr>
+        <p:cNvPr id="1" name=""/>
+        <p:cNvGrpSpPr/>
+        <p:nvPr/>
+      </p:nvGrpSpPr>
+      <p:grpSpPr>
+        <a:xfrm>
+          <a:off x="0" y="0"/>
+          <a:ext cx="0" cy="0"/>
+          <a:chOff x="0" y="0"/>
+          <a:chExt cx="0" cy="0"/>
+        </a:xfrm>
+      </p:grpSpPr>
+      <p:sp>
+        <p:nvSpPr>
+          <p:cNvPr id="2" name="Title 1">
+            <a:extLst>
+              <a:ext uri="{FF2B5EF4-FFF2-40B4-BE49-F238E27FC236}">
+                <a16:creationId xmlns:a16="http://schemas.microsoft.com/office/drawing/2014/main" id="{7FCFE64C-42AC-48F8-9CC4-A848469D1EFB}"/>
+              </a:ext>
+            </a:extLst>
+          </p:cNvPr>
+          <p:cNvSpPr>
+            <a:spLocks noGrp="1"/>
+          </p:cNvSpPr>
+          <p:nvPr>
+            <p:ph type="title"/>
+          </p:nvPr>
+        </p:nvSpPr>
+        <p:spPr/>
+        <p:txBody>
+          <a:bodyPr/>
+          <a:lstStyle/>
+          <a:p>
+            <a:r>
+              <a:rPr lang="en-US" dirty="0"/>
+              <a:t>Classification Trees</a:t>
+            </a:r>
+            <a:endParaRPr lang="en-IL" dirty="0"/>
+          </a:p>
+        </p:txBody>
+      </p:sp>
+      <mc:AlternateContent xmlns:mc="http://schemas.openxmlformats.org/markup-compatibility/2006">
+        <mc:Choice xmlns:a14="http://schemas.microsoft.com/office/drawing/2010/main" Requires="a14">
+          <p:sp>
+            <p:nvSpPr>
+              <p:cNvPr id="3" name="Content Placeholder 2">
+                <a:extLst>
+                  <a:ext uri="{FF2B5EF4-FFF2-40B4-BE49-F238E27FC236}">
+                    <a16:creationId xmlns:a16="http://schemas.microsoft.com/office/drawing/2014/main" id="{BF915407-7AC9-4664-B0FC-070C03A344DA}"/>
+                  </a:ext>
+                </a:extLst>
+              </p:cNvPr>
+              <p:cNvSpPr>
+                <a:spLocks noGrp="1"/>
+              </p:cNvSpPr>
+              <p:nvPr>
+                <p:ph idx="1"/>
+              </p:nvPr>
+            </p:nvSpPr>
+            <p:spPr/>
+            <p:txBody>
+              <a:bodyPr/>
+              <a:lstStyle/>
+              <a:p>
+                <a:pPr marL="0" indent="0">
+                  <a:lnSpc>
+                    <a:spcPct val="150000"/>
+                  </a:lnSpc>
+                  <a:buNone/>
+                </a:pPr>
+                <a:r>
+                  <a:rPr lang="en-US" dirty="0"/>
+                  <a:t>When a classification tree is built, we use either </a:t>
+                </a:r>
+              </a:p>
+              <a:p>
+                <a:pPr>
+                  <a:lnSpc>
+                    <a:spcPct val="150000"/>
+                  </a:lnSpc>
+                </a:pPr>
+                <a:r>
+                  <a:rPr lang="en-US" dirty="0"/>
+                  <a:t>The Gini index for node </a:t>
+                </a:r>
+                <a14:m>
+                  <m:oMath xmlns:m="http://schemas.openxmlformats.org/officeDocument/2006/math">
+                    <m:r>
+                      <a:rPr lang="en-US" b="0" i="1" smtClean="0">
+                        <a:latin typeface="Cambria Math" panose="02040503050406030204" pitchFamily="18" charset="0"/>
+                      </a:rPr>
+                      <m:t>𝑚</m:t>
+                    </m:r>
+                  </m:oMath>
+                </a14:m>
+                <a:r>
+                  <a:rPr lang="en-US" dirty="0"/>
+                  <a:t>:</a:t>
+                </a:r>
+              </a:p>
+              <a:p>
+                <a:pPr lvl="1">
+                  <a:lnSpc>
+                    <a:spcPct val="150000"/>
+                  </a:lnSpc>
+                </a:pPr>
+                <a14:m>
+                  <m:oMath xmlns:m="http://schemas.openxmlformats.org/officeDocument/2006/math">
+                    <m:nary>
+                      <m:naryPr>
+                        <m:chr m:val="∑"/>
+                        <m:ctrlPr>
+                          <a:rPr lang="en-US" b="0" i="1" smtClean="0">
+                            <a:latin typeface="Cambria Math" panose="02040503050406030204" pitchFamily="18" charset="0"/>
+                          </a:rPr>
+                        </m:ctrlPr>
+                      </m:naryPr>
+                      <m:sub>
+                        <m:r>
+                          <a:rPr lang="en-US" b="0" i="1" smtClean="0">
+                            <a:latin typeface="Cambria Math" panose="02040503050406030204" pitchFamily="18" charset="0"/>
+                          </a:rPr>
+                          <m:t>𝑘</m:t>
+                        </m:r>
+                      </m:sub>
+                      <m:sup>
+                        <m:r>
+                          <a:rPr lang="en-US" b="0" i="1" smtClean="0">
+                            <a:latin typeface="Cambria Math" panose="02040503050406030204" pitchFamily="18" charset="0"/>
+                          </a:rPr>
+                          <m:t>𝐾</m:t>
+                        </m:r>
+                      </m:sup>
+                      <m:e>
+                        <m:sSub>
+                          <m:sSubPr>
+                            <m:ctrlPr>
+                              <a:rPr lang="en-US" b="0" i="1" dirty="0" smtClean="0">
+                                <a:latin typeface="Cambria Math" panose="02040503050406030204" pitchFamily="18" charset="0"/>
+                              </a:rPr>
+                            </m:ctrlPr>
+                          </m:sSubPr>
+                          <m:e>
+                            <m:acc>
+                              <m:accPr>
+                                <m:chr m:val="̂"/>
+                                <m:ctrlPr>
+                                  <a:rPr lang="en-US" b="0" i="1" smtClean="0">
+                                    <a:latin typeface="Cambria Math" panose="02040503050406030204" pitchFamily="18" charset="0"/>
+                                  </a:rPr>
+                                </m:ctrlPr>
+                              </m:accPr>
+                              <m:e>
+                                <m:r>
+                                  <a:rPr lang="en-US" b="0" i="1" smtClean="0">
+                                    <a:latin typeface="Cambria Math" panose="02040503050406030204" pitchFamily="18" charset="0"/>
+                                  </a:rPr>
+                                  <m:t>𝑝</m:t>
+                                </m:r>
+                              </m:e>
+                            </m:acc>
+                          </m:e>
+                          <m:sub>
+                            <m:r>
+                              <a:rPr lang="en-US" b="0" i="1" dirty="0" smtClean="0">
+                                <a:latin typeface="Cambria Math" panose="02040503050406030204" pitchFamily="18" charset="0"/>
+                              </a:rPr>
+                              <m:t>𝑚𝑘</m:t>
+                            </m:r>
+                          </m:sub>
+                        </m:sSub>
+                        <m:d>
+                          <m:dPr>
+                            <m:ctrlPr>
+                              <a:rPr lang="en-US" b="0" i="1" dirty="0" smtClean="0">
+                                <a:latin typeface="Cambria Math" panose="02040503050406030204" pitchFamily="18" charset="0"/>
+                              </a:rPr>
+                            </m:ctrlPr>
+                          </m:dPr>
+                          <m:e>
+                            <m:r>
+                              <a:rPr lang="en-US" b="0" i="1" dirty="0" smtClean="0">
+                                <a:latin typeface="Cambria Math" panose="02040503050406030204" pitchFamily="18" charset="0"/>
+                              </a:rPr>
+                              <m:t>1</m:t>
+                            </m:r>
+                            <m:r>
+                              <a:rPr lang="en-US" b="0" i="1" dirty="0" smtClean="0">
+                                <a:latin typeface="Cambria Math" panose="02040503050406030204" pitchFamily="18" charset="0"/>
+                              </a:rPr>
+                              <m:t>−</m:t>
+                            </m:r>
+                            <m:sSub>
+                              <m:sSubPr>
+                                <m:ctrlPr>
+                                  <a:rPr lang="en-US" b="0" i="1" dirty="0" smtClean="0">
+                                    <a:latin typeface="Cambria Math" panose="02040503050406030204" pitchFamily="18" charset="0"/>
+                                  </a:rPr>
+                                </m:ctrlPr>
+                              </m:sSubPr>
+                              <m:e>
+                                <m:acc>
+                                  <m:accPr>
+                                    <m:chr m:val="̂"/>
+                                    <m:ctrlPr>
+                                      <a:rPr lang="en-US" b="0" i="1" dirty="0" smtClean="0">
+                                        <a:latin typeface="Cambria Math" panose="02040503050406030204" pitchFamily="18" charset="0"/>
+                                      </a:rPr>
+                                    </m:ctrlPr>
+                                  </m:accPr>
+                                  <m:e>
+                                    <m:r>
+                                      <a:rPr lang="en-US" b="0" i="1" dirty="0" smtClean="0">
+                                        <a:latin typeface="Cambria Math" panose="02040503050406030204" pitchFamily="18" charset="0"/>
+                                      </a:rPr>
+                                      <m:t>𝑝</m:t>
+                                    </m:r>
+                                  </m:e>
+                                </m:acc>
+                              </m:e>
+                              <m:sub>
+                                <m:r>
+                                  <a:rPr lang="en-US" b="0" i="1" dirty="0" smtClean="0">
+                                    <a:latin typeface="Cambria Math" panose="02040503050406030204" pitchFamily="18" charset="0"/>
+                                  </a:rPr>
+                                  <m:t>𝑚𝑘</m:t>
+                                </m:r>
+                              </m:sub>
+                            </m:sSub>
+                          </m:e>
+                        </m:d>
+                      </m:e>
+                    </m:nary>
+                  </m:oMath>
+                </a14:m>
+                <a:endParaRPr lang="en-US" dirty="0"/>
+              </a:p>
+              <a:p>
+                <a:pPr>
+                  <a:lnSpc>
+                    <a:spcPct val="150000"/>
+                  </a:lnSpc>
+                </a:pPr>
+                <a:r>
+                  <a:rPr lang="en-US" dirty="0"/>
+                  <a:t>The Cross-entropy or deviance for node </a:t>
+                </a:r>
+                <a14:m>
+                  <m:oMath xmlns:m="http://schemas.openxmlformats.org/officeDocument/2006/math">
+                    <m:r>
+                      <a:rPr lang="en-US" b="0" i="1" smtClean="0">
+                        <a:latin typeface="Cambria Math" panose="02040503050406030204" pitchFamily="18" charset="0"/>
+                      </a:rPr>
+                      <m:t>𝑚</m:t>
+                    </m:r>
+                  </m:oMath>
+                </a14:m>
+                <a:r>
+                  <a:rPr lang="en-US" dirty="0"/>
+                  <a:t>:</a:t>
+                </a:r>
+              </a:p>
+              <a:p>
+                <a:pPr lvl="1">
+                  <a:lnSpc>
+                    <a:spcPct val="150000"/>
+                  </a:lnSpc>
+                </a:pPr>
+                <a14:m>
+                  <m:oMath xmlns:m="http://schemas.openxmlformats.org/officeDocument/2006/math">
+                    <m:r>
+                      <a:rPr lang="en-US" b="0" i="1" smtClean="0">
+                        <a:latin typeface="Cambria Math" panose="02040503050406030204" pitchFamily="18" charset="0"/>
+                      </a:rPr>
+                      <m:t>−</m:t>
+                    </m:r>
+                    <m:nary>
+                      <m:naryPr>
+                        <m:chr m:val="∑"/>
+                        <m:ctrlPr>
+                          <a:rPr lang="en-US" b="0" i="1" smtClean="0">
+                            <a:latin typeface="Cambria Math" panose="02040503050406030204" pitchFamily="18" charset="0"/>
+                          </a:rPr>
+                        </m:ctrlPr>
+                      </m:naryPr>
+                      <m:sub>
+                        <m:r>
+                          <a:rPr lang="en-US" b="0" i="1" smtClean="0">
+                            <a:latin typeface="Cambria Math" panose="02040503050406030204" pitchFamily="18" charset="0"/>
+                          </a:rPr>
+                          <m:t>𝑘</m:t>
+                        </m:r>
+                        <m:r>
+                          <a:rPr lang="en-US" b="0" i="1" smtClean="0">
+                            <a:latin typeface="Cambria Math" panose="02040503050406030204" pitchFamily="18" charset="0"/>
+                          </a:rPr>
+                          <m:t>=</m:t>
+                        </m:r>
+                        <m:r>
+                          <a:rPr lang="en-US" b="0" i="1" smtClean="0">
+                            <a:latin typeface="Cambria Math" panose="02040503050406030204" pitchFamily="18" charset="0"/>
+                          </a:rPr>
+                          <m:t>1</m:t>
+                        </m:r>
+                      </m:sub>
+                      <m:sup>
+                        <m:r>
+                          <a:rPr lang="en-US" b="0" i="1" smtClean="0">
+                            <a:latin typeface="Cambria Math" panose="02040503050406030204" pitchFamily="18" charset="0"/>
+                          </a:rPr>
+                          <m:t>𝐾</m:t>
+                        </m:r>
+                      </m:sup>
+                      <m:e>
+                        <m:sSub>
+                          <m:sSubPr>
+                            <m:ctrlPr>
+                              <a:rPr lang="en-US" b="0" i="1" dirty="0" smtClean="0">
+                                <a:latin typeface="Cambria Math" panose="02040503050406030204" pitchFamily="18" charset="0"/>
+                              </a:rPr>
+                            </m:ctrlPr>
+                          </m:sSubPr>
+                          <m:e>
+                            <m:acc>
+                              <m:accPr>
+                                <m:chr m:val="̂"/>
+                                <m:ctrlPr>
+                                  <a:rPr lang="en-US" b="0" i="1" smtClean="0">
+                                    <a:latin typeface="Cambria Math" panose="02040503050406030204" pitchFamily="18" charset="0"/>
+                                  </a:rPr>
+                                </m:ctrlPr>
+                              </m:accPr>
+                              <m:e>
+                                <m:r>
+                                  <a:rPr lang="en-US" b="0" i="1" smtClean="0">
+                                    <a:latin typeface="Cambria Math" panose="02040503050406030204" pitchFamily="18" charset="0"/>
+                                  </a:rPr>
+                                  <m:t>𝑝</m:t>
+                                </m:r>
+                              </m:e>
+                            </m:acc>
+                          </m:e>
+                          <m:sub>
+                            <m:r>
+                              <a:rPr lang="en-US" b="0" i="1" dirty="0" smtClean="0">
+                                <a:latin typeface="Cambria Math" panose="02040503050406030204" pitchFamily="18" charset="0"/>
+                              </a:rPr>
+                              <m:t>𝑚𝑘</m:t>
+                            </m:r>
+                          </m:sub>
+                        </m:sSub>
+                        <m:func>
+                          <m:funcPr>
+                            <m:ctrlPr>
+                              <a:rPr lang="en-US" b="0" i="1" dirty="0" smtClean="0">
+                                <a:latin typeface="Cambria Math" panose="02040503050406030204" pitchFamily="18" charset="0"/>
+                              </a:rPr>
+                            </m:ctrlPr>
+                          </m:funcPr>
+                          <m:fName>
+                            <m:r>
+                              <m:rPr>
+                                <m:sty m:val="p"/>
+                              </m:rPr>
+                              <a:rPr lang="en-US" b="0" i="0" dirty="0" smtClean="0">
+                                <a:latin typeface="Cambria Math" panose="02040503050406030204" pitchFamily="18" charset="0"/>
+                              </a:rPr>
+                              <m:t>log</m:t>
+                            </m:r>
+                          </m:fName>
+                          <m:e>
+                            <m:sSub>
+                              <m:sSubPr>
+                                <m:ctrlPr>
+                                  <a:rPr lang="en-US" b="0" i="1" dirty="0" smtClean="0">
+                                    <a:latin typeface="Cambria Math" panose="02040503050406030204" pitchFamily="18" charset="0"/>
+                                  </a:rPr>
+                                </m:ctrlPr>
+                              </m:sSubPr>
+                              <m:e>
+                                <m:acc>
+                                  <m:accPr>
+                                    <m:chr m:val="̂"/>
+                                    <m:ctrlPr>
+                                      <a:rPr lang="en-US" b="0" i="1" dirty="0" smtClean="0">
+                                        <a:latin typeface="Cambria Math" panose="02040503050406030204" pitchFamily="18" charset="0"/>
+                                      </a:rPr>
+                                    </m:ctrlPr>
+                                  </m:accPr>
+                                  <m:e>
+                                    <m:r>
+                                      <a:rPr lang="en-US" b="0" i="1" dirty="0" smtClean="0">
+                                        <a:latin typeface="Cambria Math" panose="02040503050406030204" pitchFamily="18" charset="0"/>
+                                      </a:rPr>
+                                      <m:t>𝑝</m:t>
+                                    </m:r>
+                                  </m:e>
+                                </m:acc>
+                              </m:e>
+                              <m:sub>
+                                <m:r>
+                                  <a:rPr lang="en-US" b="0" i="1" dirty="0" smtClean="0">
+                                    <a:latin typeface="Cambria Math" panose="02040503050406030204" pitchFamily="18" charset="0"/>
+                                  </a:rPr>
+                                  <m:t>𝑚𝑘</m:t>
+                                </m:r>
+                              </m:sub>
+                            </m:sSub>
+                          </m:e>
+                        </m:func>
+                      </m:e>
+                    </m:nary>
+                  </m:oMath>
+                </a14:m>
+                <a:endParaRPr lang="en-US" dirty="0"/>
+              </a:p>
+              <a:p>
+                <a:r>
+                  <a:rPr lang="en-US" dirty="0"/>
+                  <a:t>The misclassification may be used for pruning (but is </a:t>
+                </a:r>
+                <a:r>
+                  <a:rPr lang="en-US"/>
+                  <a:t>less advised for growth)</a:t>
+                </a:r>
+                <a:endParaRPr lang="en-IL" dirty="0"/>
+              </a:p>
+            </p:txBody>
+          </p:sp>
+        </mc:Choice>
+        <mc:Fallback>
+          <p:sp>
+            <p:nvSpPr>
+              <p:cNvPr id="3" name="Content Placeholder 2">
+                <a:extLst>
+                  <a:ext uri="{FF2B5EF4-FFF2-40B4-BE49-F238E27FC236}">
+                    <a16:creationId xmlns:a16="http://schemas.microsoft.com/office/drawing/2014/main" id="{BF915407-7AC9-4664-B0FC-070C03A344DA}"/>
+                  </a:ext>
+                </a:extLst>
+              </p:cNvPr>
+              <p:cNvSpPr>
+                <a:spLocks noGrp="1" noRot="1" noChangeAspect="1" noMove="1" noResize="1" noEditPoints="1" noAdjustHandles="1" noChangeArrowheads="1" noChangeShapeType="1" noTextEdit="1"/>
+              </p:cNvSpPr>
+              <p:nvPr>
+                <p:ph idx="1"/>
+              </p:nvPr>
+            </p:nvSpPr>
+            <p:spPr>
+              <a:blipFill>
+                <a:blip r:embed="rId3"/>
+                <a:stretch>
+                  <a:fillRect l="-667"/>
+                </a:stretch>
+              </a:blipFill>
+            </p:spPr>
+            <p:txBody>
+              <a:bodyPr/>
+              <a:lstStyle/>
+              <a:p>
+                <a:r>
+                  <a:rPr lang="en-IL">
+                    <a:noFill/>
+                  </a:rPr>
+                  <a:t> </a:t>
+                </a:r>
+              </a:p>
+            </p:txBody>
+          </p:sp>
+        </mc:Fallback>
+      </mc:AlternateContent>
+      <p:sp>
+        <p:nvSpPr>
+          <p:cNvPr id="4" name="Footer Placeholder 3">
+            <a:extLst>
+              <a:ext uri="{FF2B5EF4-FFF2-40B4-BE49-F238E27FC236}">
+                <a16:creationId xmlns:a16="http://schemas.microsoft.com/office/drawing/2014/main" id="{B67F66D6-C93D-463E-B5E9-AA3EF650882E}"/>
+              </a:ext>
+            </a:extLst>
+          </p:cNvPr>
+          <p:cNvSpPr>
+            <a:spLocks noGrp="1"/>
+          </p:cNvSpPr>
+          <p:nvPr>
+            <p:ph type="ftr" sz="quarter" idx="11"/>
+          </p:nvPr>
+        </p:nvSpPr>
+        <p:spPr/>
+        <p:txBody>
+          <a:bodyPr/>
+          <a:lstStyle/>
+          <a:p>
+            <a:r>
+              <a:rPr lang="en-US"/>
+              <a:t>Materials by Adi Sarid https://adisarid.github.io and http://www.sarid-ins.com</a:t>
+            </a:r>
+            <a:endParaRPr lang="en-US" dirty="0"/>
+          </a:p>
+        </p:txBody>
+      </p:sp>
+      <p:sp>
+        <p:nvSpPr>
+          <p:cNvPr id="5" name="Slide Number Placeholder 4">
+            <a:extLst>
+              <a:ext uri="{FF2B5EF4-FFF2-40B4-BE49-F238E27FC236}">
+                <a16:creationId xmlns:a16="http://schemas.microsoft.com/office/drawing/2014/main" id="{559F37C9-9246-406F-8882-12BD8F038ADF}"/>
+              </a:ext>
+            </a:extLst>
+          </p:cNvPr>
+          <p:cNvSpPr>
+            <a:spLocks noGrp="1"/>
+          </p:cNvSpPr>
+          <p:nvPr>
+            <p:ph type="sldNum" sz="quarter" idx="12"/>
+          </p:nvPr>
+        </p:nvSpPr>
+        <p:spPr/>
+        <p:txBody>
+          <a:bodyPr/>
+          <a:lstStyle/>
+          <a:p>
+            <a:fld id="{4FAB73BC-B049-4115-A692-8D63A059BFB8}" type="slidenum">
+              <a:rPr lang="en-US" smtClean="0"/>
+              <a:t>25</a:t>
+            </a:fld>
+            <a:endParaRPr lang="en-US" dirty="0"/>
+          </a:p>
+        </p:txBody>
+      </p:sp>
+    </p:spTree>
+    <p:extLst>
+      <p:ext uri="{BB962C8B-B14F-4D97-AF65-F5344CB8AC3E}">
+        <p14:creationId xmlns:p14="http://schemas.microsoft.com/office/powerpoint/2010/main" val="228237063"/>
+      </p:ext>
+    </p:extLst>
+  </p:cSld>
+  <p:clrMapOvr>
+    <a:masterClrMapping/>
+  </p:clrMapOvr>
+</p:sld>
+</file>
+
 <file path=ppt/slides/slide3.xml><?xml version="1.0" encoding="utf-8"?>
 <p:sld xmlns:a="http://schemas.openxmlformats.org/drawingml/2006/main" xmlns:r="http://schemas.openxmlformats.org/officeDocument/2006/relationships" xmlns:p="http://schemas.openxmlformats.org/presentationml/2006/main">
   <p:cSld>

</xml_diff>

<commit_message>
minor updates to presentation contents slide
</commit_message>
<xml_diff>
--- a/presentation/pptx/03-Classification_methods_part2_SVMs_and_Cross_Validation.pptx
+++ b/presentation/pptx/03-Classification_methods_part2_SVMs_and_Cross_Validation.pptx
@@ -5,11 +5,11 @@
     <p:sldMasterId id="2147483840" r:id="rId1"/>
   </p:sldMasterIdLst>
   <p:notesMasterIdLst>
-    <p:notesMasterId r:id="rId27"/>
+    <p:notesMasterId r:id="rId29"/>
   </p:notesMasterIdLst>
   <p:sldIdLst>
     <p:sldId id="256" r:id="rId2"/>
-    <p:sldId id="273" r:id="rId3"/>
+    <p:sldId id="298" r:id="rId3"/>
     <p:sldId id="274" r:id="rId4"/>
     <p:sldId id="275" r:id="rId5"/>
     <p:sldId id="276" r:id="rId6"/>
@@ -22,17 +22,19 @@
     <p:sldId id="285" r:id="rId13"/>
     <p:sldId id="288" r:id="rId14"/>
     <p:sldId id="281" r:id="rId15"/>
-    <p:sldId id="286" r:id="rId16"/>
-    <p:sldId id="289" r:id="rId17"/>
-    <p:sldId id="290" r:id="rId18"/>
-    <p:sldId id="291" r:id="rId19"/>
-    <p:sldId id="292" r:id="rId20"/>
-    <p:sldId id="287" r:id="rId21"/>
-    <p:sldId id="293" r:id="rId22"/>
-    <p:sldId id="294" r:id="rId23"/>
-    <p:sldId id="295" r:id="rId24"/>
-    <p:sldId id="296" r:id="rId25"/>
-    <p:sldId id="297" r:id="rId26"/>
+    <p:sldId id="299" r:id="rId16"/>
+    <p:sldId id="286" r:id="rId17"/>
+    <p:sldId id="289" r:id="rId18"/>
+    <p:sldId id="290" r:id="rId19"/>
+    <p:sldId id="291" r:id="rId20"/>
+    <p:sldId id="292" r:id="rId21"/>
+    <p:sldId id="273" r:id="rId22"/>
+    <p:sldId id="287" r:id="rId23"/>
+    <p:sldId id="293" r:id="rId24"/>
+    <p:sldId id="294" r:id="rId25"/>
+    <p:sldId id="295" r:id="rId26"/>
+    <p:sldId id="296" r:id="rId27"/>
+    <p:sldId id="297" r:id="rId28"/>
   </p:sldIdLst>
   <p:sldSz cx="12192000" cy="6858000"/>
   <p:notesSz cx="6858000" cy="9144000"/>
@@ -144,7 +146,7 @@
             <a:srgbClr val="A4A3A4"/>
           </p15:clr>
         </p15:guide>
-        <p15:guide id="3" orient="horz" pos="2409" userDrawn="1">
+        <p15:guide id="3" orient="horz" pos="2387" userDrawn="1">
           <p15:clr>
             <a:srgbClr val="A4A3A4"/>
           </p15:clr>
@@ -237,7 +239,7 @@
           <a:p>
             <a:fld id="{5C93CA8F-50F8-44B5-B48F-4C4452AC4FCB}" type="datetimeFigureOut">
               <a:rPr lang="he-IL" smtClean="0"/>
-              <a:t>ו'/אב/תשע"ט</a:t>
+              <a:t>ז'/אב/תשע"ט</a:t>
             </a:fld>
             <a:endParaRPr lang="he-IL"/>
           </a:p>
@@ -579,7 +581,7 @@
     </p:spTree>
     <p:extLst>
       <p:ext uri="{BB962C8B-B14F-4D97-AF65-F5344CB8AC3E}">
-        <p14:creationId xmlns:p14="http://schemas.microsoft.com/office/powerpoint/2010/main" val="3332590928"/>
+        <p14:creationId xmlns:p14="http://schemas.microsoft.com/office/powerpoint/2010/main" val="72330202"/>
       </p:ext>
     </p:extLst>
   </p:cSld>
@@ -938,14 +940,6 @@
           <a:bodyPr/>
           <a:lstStyle/>
           <a:p>
-            <a:r>
-              <a:rPr lang="en-US" dirty="0"/>
-              <a:t>The explanation</a:t>
-            </a:r>
-            <a:r>
-              <a:rPr lang="en-US" baseline="0" dirty="0"/>
-              <a:t> here of bias-variance tradeoff of the test set error is somewhat “hand waving”. If you’re interested, it is also explained in pages 183-184 in ISLR.</a:t>
-            </a:r>
             <a:endParaRPr lang="he-IL" dirty="0"/>
           </a:p>
         </p:txBody>
@@ -967,7 +961,7 @@
           <a:p>
             <a:fld id="{C4276747-8356-4D8F-84BF-3C530C5DAF39}" type="slidenum">
               <a:rPr lang="he-IL" smtClean="0"/>
-              <a:t>17</a:t>
+              <a:t>15</a:t>
             </a:fld>
             <a:endParaRPr lang="he-IL"/>
           </a:p>
@@ -976,7 +970,7 @@
     </p:spTree>
     <p:extLst>
       <p:ext uri="{BB962C8B-B14F-4D97-AF65-F5344CB8AC3E}">
-        <p14:creationId xmlns:p14="http://schemas.microsoft.com/office/powerpoint/2010/main" val="2463563639"/>
+        <p14:creationId xmlns:p14="http://schemas.microsoft.com/office/powerpoint/2010/main" val="3410525098"/>
       </p:ext>
     </p:extLst>
   </p:cSld>
@@ -1032,6 +1026,182 @@
           <a:p>
             <a:r>
               <a:rPr lang="en-US" dirty="0"/>
+              <a:t>The explanation</a:t>
+            </a:r>
+            <a:r>
+              <a:rPr lang="en-US" baseline="0" dirty="0"/>
+              <a:t> here of bias-variance tradeoff of the test set error is somewhat “hand waving”. If you’re interested, it is also explained in pages 183-184 in ISLR.</a:t>
+            </a:r>
+            <a:endParaRPr lang="he-IL" dirty="0"/>
+          </a:p>
+        </p:txBody>
+      </p:sp>
+      <p:sp>
+        <p:nvSpPr>
+          <p:cNvPr id="4" name="Slide Number Placeholder 3"/>
+          <p:cNvSpPr>
+            <a:spLocks noGrp="1"/>
+          </p:cNvSpPr>
+          <p:nvPr>
+            <p:ph type="sldNum" sz="quarter" idx="10"/>
+          </p:nvPr>
+        </p:nvSpPr>
+        <p:spPr/>
+        <p:txBody>
+          <a:bodyPr/>
+          <a:lstStyle/>
+          <a:p>
+            <a:fld id="{C4276747-8356-4D8F-84BF-3C530C5DAF39}" type="slidenum">
+              <a:rPr lang="he-IL" smtClean="0"/>
+              <a:t>18</a:t>
+            </a:fld>
+            <a:endParaRPr lang="he-IL"/>
+          </a:p>
+        </p:txBody>
+      </p:sp>
+    </p:spTree>
+    <p:extLst>
+      <p:ext uri="{BB962C8B-B14F-4D97-AF65-F5344CB8AC3E}">
+        <p14:creationId xmlns:p14="http://schemas.microsoft.com/office/powerpoint/2010/main" val="2463563639"/>
+      </p:ext>
+    </p:extLst>
+  </p:cSld>
+  <p:clrMapOvr>
+    <a:masterClrMapping/>
+  </p:clrMapOvr>
+</p:notes>
+</file>
+
+<file path=ppt/notesSlides/notesSlide7.xml><?xml version="1.0" encoding="utf-8"?>
+<p:notes xmlns:a="http://schemas.openxmlformats.org/drawingml/2006/main" xmlns:r="http://schemas.openxmlformats.org/officeDocument/2006/relationships" xmlns:p="http://schemas.openxmlformats.org/presentationml/2006/main">
+  <p:cSld>
+    <p:spTree>
+      <p:nvGrpSpPr>
+        <p:cNvPr id="1" name=""/>
+        <p:cNvGrpSpPr/>
+        <p:nvPr/>
+      </p:nvGrpSpPr>
+      <p:grpSpPr>
+        <a:xfrm>
+          <a:off x="0" y="0"/>
+          <a:ext cx="0" cy="0"/>
+          <a:chOff x="0" y="0"/>
+          <a:chExt cx="0" cy="0"/>
+        </a:xfrm>
+      </p:grpSpPr>
+      <p:sp>
+        <p:nvSpPr>
+          <p:cNvPr id="2" name="Slide Image Placeholder 1"/>
+          <p:cNvSpPr>
+            <a:spLocks noGrp="1" noRot="1" noChangeAspect="1"/>
+          </p:cNvSpPr>
+          <p:nvPr>
+            <p:ph type="sldImg"/>
+          </p:nvPr>
+        </p:nvSpPr>
+        <p:spPr/>
+      </p:sp>
+      <p:sp>
+        <p:nvSpPr>
+          <p:cNvPr id="3" name="Notes Placeholder 2"/>
+          <p:cNvSpPr>
+            <a:spLocks noGrp="1"/>
+          </p:cNvSpPr>
+          <p:nvPr>
+            <p:ph type="body" idx="1"/>
+          </p:nvPr>
+        </p:nvSpPr>
+        <p:spPr/>
+        <p:txBody>
+          <a:bodyPr/>
+          <a:lstStyle/>
+          <a:p>
+            <a:endParaRPr lang="he-IL" dirty="0"/>
+          </a:p>
+        </p:txBody>
+      </p:sp>
+      <p:sp>
+        <p:nvSpPr>
+          <p:cNvPr id="4" name="Slide Number Placeholder 3"/>
+          <p:cNvSpPr>
+            <a:spLocks noGrp="1"/>
+          </p:cNvSpPr>
+          <p:nvPr>
+            <p:ph type="sldNum" sz="quarter" idx="10"/>
+          </p:nvPr>
+        </p:nvSpPr>
+        <p:spPr/>
+        <p:txBody>
+          <a:bodyPr/>
+          <a:lstStyle/>
+          <a:p>
+            <a:fld id="{C4276747-8356-4D8F-84BF-3C530C5DAF39}" type="slidenum">
+              <a:rPr lang="he-IL" smtClean="0"/>
+              <a:t>21</a:t>
+            </a:fld>
+            <a:endParaRPr lang="he-IL"/>
+          </a:p>
+        </p:txBody>
+      </p:sp>
+    </p:spTree>
+    <p:extLst>
+      <p:ext uri="{BB962C8B-B14F-4D97-AF65-F5344CB8AC3E}">
+        <p14:creationId xmlns:p14="http://schemas.microsoft.com/office/powerpoint/2010/main" val="3332590928"/>
+      </p:ext>
+    </p:extLst>
+  </p:cSld>
+  <p:clrMapOvr>
+    <a:masterClrMapping/>
+  </p:clrMapOvr>
+</p:notes>
+</file>
+
+<file path=ppt/notesSlides/notesSlide8.xml><?xml version="1.0" encoding="utf-8"?>
+<p:notes xmlns:a="http://schemas.openxmlformats.org/drawingml/2006/main" xmlns:r="http://schemas.openxmlformats.org/officeDocument/2006/relationships" xmlns:p="http://schemas.openxmlformats.org/presentationml/2006/main">
+  <p:cSld>
+    <p:spTree>
+      <p:nvGrpSpPr>
+        <p:cNvPr id="1" name=""/>
+        <p:cNvGrpSpPr/>
+        <p:nvPr/>
+      </p:nvGrpSpPr>
+      <p:grpSpPr>
+        <a:xfrm>
+          <a:off x="0" y="0"/>
+          <a:ext cx="0" cy="0"/>
+          <a:chOff x="0" y="0"/>
+          <a:chExt cx="0" cy="0"/>
+        </a:xfrm>
+      </p:grpSpPr>
+      <p:sp>
+        <p:nvSpPr>
+          <p:cNvPr id="2" name="Slide Image Placeholder 1"/>
+          <p:cNvSpPr>
+            <a:spLocks noGrp="1" noRot="1" noChangeAspect="1"/>
+          </p:cNvSpPr>
+          <p:nvPr>
+            <p:ph type="sldImg"/>
+          </p:nvPr>
+        </p:nvSpPr>
+        <p:spPr/>
+      </p:sp>
+      <p:sp>
+        <p:nvSpPr>
+          <p:cNvPr id="3" name="Notes Placeholder 2"/>
+          <p:cNvSpPr>
+            <a:spLocks noGrp="1"/>
+          </p:cNvSpPr>
+          <p:nvPr>
+            <p:ph type="body" idx="1"/>
+          </p:nvPr>
+        </p:nvSpPr>
+        <p:spPr/>
+        <p:txBody>
+          <a:bodyPr/>
+          <a:lstStyle/>
+          <a:p>
+            <a:r>
+              <a:rPr lang="en-US" dirty="0"/>
               <a:t>For details about measures and why misclassification is not that advised, see ESLII pages 309-310.</a:t>
             </a:r>
             <a:endParaRPr lang="en-IL" dirty="0"/>
@@ -1055,7 +1225,7 @@
           <a:p>
             <a:fld id="{C4276747-8356-4D8F-84BF-3C530C5DAF39}" type="slidenum">
               <a:rPr lang="he-IL" smtClean="0"/>
-              <a:t>25</a:t>
+              <a:t>27</a:t>
             </a:fld>
             <a:endParaRPr lang="he-IL"/>
           </a:p>
@@ -8425,6 +8595,1375 @@
       </p:grpSpPr>
       <p:sp>
         <p:nvSpPr>
+          <p:cNvPr id="2" name="Title 1"/>
+          <p:cNvSpPr>
+            <a:spLocks noGrp="1"/>
+          </p:cNvSpPr>
+          <p:nvPr>
+            <p:ph type="title"/>
+          </p:nvPr>
+        </p:nvSpPr>
+        <p:spPr/>
+        <p:txBody>
+          <a:bodyPr>
+            <a:normAutofit/>
+          </a:bodyPr>
+          <a:lstStyle/>
+          <a:p>
+            <a:r>
+              <a:rPr lang="en-US" dirty="0"/>
+              <a:t>Contents for today</a:t>
+            </a:r>
+            <a:endParaRPr lang="he-IL" dirty="0"/>
+          </a:p>
+        </p:txBody>
+      </p:sp>
+      <p:sp>
+        <p:nvSpPr>
+          <p:cNvPr id="4" name="Footer Placeholder 3"/>
+          <p:cNvSpPr>
+            <a:spLocks noGrp="1"/>
+          </p:cNvSpPr>
+          <p:nvPr>
+            <p:ph type="ftr" sz="quarter" idx="11"/>
+          </p:nvPr>
+        </p:nvSpPr>
+        <p:spPr/>
+        <p:txBody>
+          <a:bodyPr/>
+          <a:lstStyle/>
+          <a:p>
+            <a:r>
+              <a:rPr lang="en-US" dirty="0"/>
+              <a:t>Materials by Adi Sarid https://adisarid.github.io and http://www.sarid-ins.com</a:t>
+            </a:r>
+          </a:p>
+        </p:txBody>
+      </p:sp>
+      <p:sp>
+        <p:nvSpPr>
+          <p:cNvPr id="5" name="Slide Number Placeholder 4"/>
+          <p:cNvSpPr>
+            <a:spLocks noGrp="1"/>
+          </p:cNvSpPr>
+          <p:nvPr>
+            <p:ph type="sldNum" sz="quarter" idx="12"/>
+          </p:nvPr>
+        </p:nvSpPr>
+        <p:spPr>
+          <a:xfrm>
+            <a:off x="11784467" y="6272784"/>
+            <a:ext cx="640080" cy="365125"/>
+          </a:xfrm>
+        </p:spPr>
+        <p:txBody>
+          <a:bodyPr/>
+          <a:lstStyle/>
+          <a:p>
+            <a:fld id="{4FAB73BC-B049-4115-A692-8D63A059BFB8}" type="slidenum">
+              <a:rPr lang="en-US" smtClean="0"/>
+              <a:t>15</a:t>
+            </a:fld>
+            <a:endParaRPr lang="en-US" dirty="0"/>
+          </a:p>
+        </p:txBody>
+      </p:sp>
+      <p:sp>
+        <p:nvSpPr>
+          <p:cNvPr id="6" name="Rounded Rectangle 5"/>
+          <p:cNvSpPr/>
+          <p:nvPr/>
+        </p:nvSpPr>
+        <p:spPr>
+          <a:xfrm>
+            <a:off x="3377903" y="2000920"/>
+            <a:ext cx="1775012" cy="623943"/>
+          </a:xfrm>
+          <a:prstGeom prst="roundRect">
+            <a:avLst/>
+          </a:prstGeom>
+        </p:spPr>
+        <p:style>
+          <a:lnRef idx="3">
+            <a:schemeClr val="lt1"/>
+          </a:lnRef>
+          <a:fillRef idx="1">
+            <a:schemeClr val="accent2"/>
+          </a:fillRef>
+          <a:effectRef idx="1">
+            <a:schemeClr val="accent2"/>
+          </a:effectRef>
+          <a:fontRef idx="minor">
+            <a:schemeClr val="lt1"/>
+          </a:fontRef>
+        </p:style>
+        <p:txBody>
+          <a:bodyPr rtlCol="1" anchor="ctr"/>
+          <a:lstStyle/>
+          <a:p>
+            <a:pPr algn="ctr"/>
+            <a:r>
+              <a:rPr lang="en-US" dirty="0"/>
+              <a:t>Supervised learning</a:t>
+            </a:r>
+            <a:endParaRPr lang="he-IL" dirty="0"/>
+          </a:p>
+        </p:txBody>
+      </p:sp>
+      <p:sp>
+        <p:nvSpPr>
+          <p:cNvPr id="7" name="Rounded Rectangle 6"/>
+          <p:cNvSpPr/>
+          <p:nvPr/>
+        </p:nvSpPr>
+        <p:spPr>
+          <a:xfrm>
+            <a:off x="441065" y="2000920"/>
+            <a:ext cx="1775012" cy="623943"/>
+          </a:xfrm>
+          <a:prstGeom prst="roundRect">
+            <a:avLst/>
+          </a:prstGeom>
+          <a:ln>
+            <a:headEnd type="none" w="med" len="med"/>
+            <a:tailEnd type="none" w="med" len="med"/>
+          </a:ln>
+        </p:spPr>
+        <p:style>
+          <a:lnRef idx="2">
+            <a:schemeClr val="accent2"/>
+          </a:lnRef>
+          <a:fillRef idx="1">
+            <a:schemeClr val="lt1"/>
+          </a:fillRef>
+          <a:effectRef idx="0">
+            <a:schemeClr val="accent2"/>
+          </a:effectRef>
+          <a:fontRef idx="minor">
+            <a:schemeClr val="dk1"/>
+          </a:fontRef>
+        </p:style>
+        <p:txBody>
+          <a:bodyPr rtlCol="1" anchor="ctr"/>
+          <a:lstStyle/>
+          <a:p>
+            <a:pPr algn="ctr"/>
+            <a:r>
+              <a:rPr lang="en-US" dirty="0"/>
+              <a:t>Unsupervised learning</a:t>
+            </a:r>
+          </a:p>
+        </p:txBody>
+      </p:sp>
+      <p:sp>
+        <p:nvSpPr>
+          <p:cNvPr id="8" name="Rounded Rectangle 7"/>
+          <p:cNvSpPr/>
+          <p:nvPr/>
+        </p:nvSpPr>
+        <p:spPr>
+          <a:xfrm>
+            <a:off x="7888638" y="3973256"/>
+            <a:ext cx="1785765" cy="623943"/>
+          </a:xfrm>
+          <a:prstGeom prst="roundRect">
+            <a:avLst/>
+          </a:prstGeom>
+        </p:spPr>
+        <p:style>
+          <a:lnRef idx="3">
+            <a:schemeClr val="lt1"/>
+          </a:lnRef>
+          <a:fillRef idx="1">
+            <a:schemeClr val="accent2"/>
+          </a:fillRef>
+          <a:effectRef idx="1">
+            <a:schemeClr val="accent2"/>
+          </a:effectRef>
+          <a:fontRef idx="minor">
+            <a:schemeClr val="lt1"/>
+          </a:fontRef>
+        </p:style>
+        <p:txBody>
+          <a:bodyPr rtlCol="1" anchor="ctr"/>
+          <a:lstStyle/>
+          <a:p>
+            <a:pPr algn="ctr"/>
+            <a:r>
+              <a:rPr lang="en-US" dirty="0"/>
+              <a:t>Classification</a:t>
+            </a:r>
+            <a:endParaRPr lang="he-IL" dirty="0"/>
+          </a:p>
+        </p:txBody>
+      </p:sp>
+      <p:sp>
+        <p:nvSpPr>
+          <p:cNvPr id="13" name="Rounded Rectangle 12"/>
+          <p:cNvSpPr/>
+          <p:nvPr/>
+        </p:nvSpPr>
+        <p:spPr>
+          <a:xfrm>
+            <a:off x="217340" y="3824288"/>
+            <a:ext cx="1775012" cy="623943"/>
+          </a:xfrm>
+          <a:prstGeom prst="roundRect">
+            <a:avLst/>
+          </a:prstGeom>
+          <a:ln>
+            <a:headEnd type="none" w="med" len="med"/>
+            <a:tailEnd type="none" w="med" len="med"/>
+          </a:ln>
+        </p:spPr>
+        <p:style>
+          <a:lnRef idx="2">
+            <a:schemeClr val="accent2">
+              <a:shade val="50000"/>
+            </a:schemeClr>
+          </a:lnRef>
+          <a:fillRef idx="1">
+            <a:schemeClr val="accent2"/>
+          </a:fillRef>
+          <a:effectRef idx="0">
+            <a:schemeClr val="accent2"/>
+          </a:effectRef>
+          <a:fontRef idx="minor">
+            <a:schemeClr val="lt1"/>
+          </a:fontRef>
+        </p:style>
+        <p:txBody>
+          <a:bodyPr rtlCol="1" anchor="ctr"/>
+          <a:lstStyle/>
+          <a:p>
+            <a:pPr algn="ctr"/>
+            <a:r>
+              <a:rPr lang="en-US" dirty="0"/>
+              <a:t>Model evaluation</a:t>
+            </a:r>
+            <a:endParaRPr lang="he-IL" dirty="0"/>
+          </a:p>
+        </p:txBody>
+      </p:sp>
+      <p:sp>
+        <p:nvSpPr>
+          <p:cNvPr id="15" name="Rounded Rectangle 14"/>
+          <p:cNvSpPr/>
+          <p:nvPr/>
+        </p:nvSpPr>
+        <p:spPr>
+          <a:xfrm>
+            <a:off x="9981917" y="3973255"/>
+            <a:ext cx="1785765" cy="623943"/>
+          </a:xfrm>
+          <a:prstGeom prst="roundRect">
+            <a:avLst/>
+          </a:prstGeom>
+        </p:spPr>
+        <p:style>
+          <a:lnRef idx="2">
+            <a:schemeClr val="accent2"/>
+          </a:lnRef>
+          <a:fillRef idx="1">
+            <a:schemeClr val="lt1"/>
+          </a:fillRef>
+          <a:effectRef idx="0">
+            <a:schemeClr val="accent2"/>
+          </a:effectRef>
+          <a:fontRef idx="minor">
+            <a:schemeClr val="dk1"/>
+          </a:fontRef>
+        </p:style>
+        <p:txBody>
+          <a:bodyPr rtlCol="1" anchor="ctr"/>
+          <a:lstStyle/>
+          <a:p>
+            <a:pPr algn="ctr"/>
+            <a:r>
+              <a:rPr lang="en-US" dirty="0"/>
+              <a:t>Regression</a:t>
+            </a:r>
+            <a:endParaRPr lang="he-IL" dirty="0"/>
+          </a:p>
+        </p:txBody>
+      </p:sp>
+      <p:sp>
+        <p:nvSpPr>
+          <p:cNvPr id="16" name="Rounded Rectangle 15"/>
+          <p:cNvSpPr/>
+          <p:nvPr/>
+        </p:nvSpPr>
+        <p:spPr>
+          <a:xfrm>
+            <a:off x="8663210" y="2935269"/>
+            <a:ext cx="1785765" cy="623943"/>
+          </a:xfrm>
+          <a:prstGeom prst="roundRect">
+            <a:avLst/>
+          </a:prstGeom>
+        </p:spPr>
+        <p:style>
+          <a:lnRef idx="3">
+            <a:schemeClr val="lt1"/>
+          </a:lnRef>
+          <a:fillRef idx="1">
+            <a:schemeClr val="accent2"/>
+          </a:fillRef>
+          <a:effectRef idx="1">
+            <a:schemeClr val="accent2"/>
+          </a:effectRef>
+          <a:fontRef idx="minor">
+            <a:schemeClr val="lt1"/>
+          </a:fontRef>
+        </p:style>
+        <p:txBody>
+          <a:bodyPr rtlCol="1" anchor="ctr"/>
+          <a:lstStyle/>
+          <a:p>
+            <a:pPr algn="ctr"/>
+            <a:r>
+              <a:rPr lang="en-US" dirty="0"/>
+              <a:t>Models</a:t>
+            </a:r>
+            <a:endParaRPr lang="he-IL" dirty="0"/>
+          </a:p>
+        </p:txBody>
+      </p:sp>
+      <p:sp>
+        <p:nvSpPr>
+          <p:cNvPr id="17" name="Rounded Rectangle 16"/>
+          <p:cNvSpPr/>
+          <p:nvPr/>
+        </p:nvSpPr>
+        <p:spPr>
+          <a:xfrm>
+            <a:off x="1430005" y="2935269"/>
+            <a:ext cx="1785765" cy="623943"/>
+          </a:xfrm>
+          <a:prstGeom prst="roundRect">
+            <a:avLst/>
+          </a:prstGeom>
+        </p:spPr>
+        <p:style>
+          <a:lnRef idx="2">
+            <a:schemeClr val="accent2"/>
+          </a:lnRef>
+          <a:fillRef idx="1">
+            <a:schemeClr val="lt1"/>
+          </a:fillRef>
+          <a:effectRef idx="0">
+            <a:schemeClr val="accent2"/>
+          </a:effectRef>
+          <a:fontRef idx="minor">
+            <a:schemeClr val="dk1"/>
+          </a:fontRef>
+        </p:style>
+        <p:txBody>
+          <a:bodyPr rtlCol="1" anchor="ctr"/>
+          <a:lstStyle/>
+          <a:p>
+            <a:pPr algn="ctr"/>
+            <a:r>
+              <a:rPr lang="en-US" dirty="0"/>
+              <a:t>Methods</a:t>
+            </a:r>
+            <a:endParaRPr lang="he-IL" dirty="0"/>
+          </a:p>
+        </p:txBody>
+      </p:sp>
+      <p:cxnSp>
+        <p:nvCxnSpPr>
+          <p:cNvPr id="23" name="Straight Arrow Connector 22"/>
+          <p:cNvCxnSpPr>
+            <a:stCxn id="6" idx="2"/>
+            <a:endCxn id="16" idx="0"/>
+          </p:cNvCxnSpPr>
+          <p:nvPr/>
+        </p:nvCxnSpPr>
+        <p:spPr>
+          <a:xfrm>
+            <a:off x="4265409" y="2624863"/>
+            <a:ext cx="5290684" cy="310406"/>
+          </a:xfrm>
+          <a:prstGeom prst="straightConnector1">
+            <a:avLst/>
+          </a:prstGeom>
+          <a:ln>
+            <a:tailEnd type="triangle"/>
+          </a:ln>
+        </p:spPr>
+        <p:style>
+          <a:lnRef idx="2">
+            <a:schemeClr val="dk1"/>
+          </a:lnRef>
+          <a:fillRef idx="0">
+            <a:schemeClr val="dk1"/>
+          </a:fillRef>
+          <a:effectRef idx="1">
+            <a:schemeClr val="dk1"/>
+          </a:effectRef>
+          <a:fontRef idx="minor">
+            <a:schemeClr val="tx1"/>
+          </a:fontRef>
+        </p:style>
+      </p:cxnSp>
+      <p:cxnSp>
+        <p:nvCxnSpPr>
+          <p:cNvPr id="25" name="Straight Arrow Connector 24"/>
+          <p:cNvCxnSpPr>
+            <a:stCxn id="16" idx="2"/>
+            <a:endCxn id="15" idx="0"/>
+          </p:cNvCxnSpPr>
+          <p:nvPr/>
+        </p:nvCxnSpPr>
+        <p:spPr>
+          <a:xfrm>
+            <a:off x="9556093" y="3559212"/>
+            <a:ext cx="1318707" cy="414043"/>
+          </a:xfrm>
+          <a:prstGeom prst="straightConnector1">
+            <a:avLst/>
+          </a:prstGeom>
+          <a:ln>
+            <a:tailEnd type="triangle"/>
+          </a:ln>
+        </p:spPr>
+        <p:style>
+          <a:lnRef idx="2">
+            <a:schemeClr val="dk1"/>
+          </a:lnRef>
+          <a:fillRef idx="0">
+            <a:schemeClr val="dk1"/>
+          </a:fillRef>
+          <a:effectRef idx="1">
+            <a:schemeClr val="dk1"/>
+          </a:effectRef>
+          <a:fontRef idx="minor">
+            <a:schemeClr val="tx1"/>
+          </a:fontRef>
+        </p:style>
+      </p:cxnSp>
+      <p:cxnSp>
+        <p:nvCxnSpPr>
+          <p:cNvPr id="39" name="Straight Arrow Connector 38"/>
+          <p:cNvCxnSpPr>
+            <a:stCxn id="6" idx="2"/>
+            <a:endCxn id="17" idx="0"/>
+          </p:cNvCxnSpPr>
+          <p:nvPr/>
+        </p:nvCxnSpPr>
+        <p:spPr>
+          <a:xfrm flipH="1">
+            <a:off x="2322888" y="2624863"/>
+            <a:ext cx="1942521" cy="310406"/>
+          </a:xfrm>
+          <a:prstGeom prst="straightConnector1">
+            <a:avLst/>
+          </a:prstGeom>
+          <a:ln>
+            <a:tailEnd type="triangle"/>
+          </a:ln>
+        </p:spPr>
+        <p:style>
+          <a:lnRef idx="2">
+            <a:schemeClr val="dk1"/>
+          </a:lnRef>
+          <a:fillRef idx="0">
+            <a:schemeClr val="dk1"/>
+          </a:fillRef>
+          <a:effectRef idx="1">
+            <a:schemeClr val="dk1"/>
+          </a:effectRef>
+          <a:fontRef idx="minor">
+            <a:schemeClr val="tx1"/>
+          </a:fontRef>
+        </p:style>
+      </p:cxnSp>
+      <p:cxnSp>
+        <p:nvCxnSpPr>
+          <p:cNvPr id="43" name="Straight Arrow Connector 42"/>
+          <p:cNvCxnSpPr>
+            <a:stCxn id="16" idx="2"/>
+            <a:endCxn id="8" idx="0"/>
+          </p:cNvCxnSpPr>
+          <p:nvPr/>
+        </p:nvCxnSpPr>
+        <p:spPr>
+          <a:xfrm flipH="1">
+            <a:off x="8781521" y="3559212"/>
+            <a:ext cx="774572" cy="414044"/>
+          </a:xfrm>
+          <a:prstGeom prst="straightConnector1">
+            <a:avLst/>
+          </a:prstGeom>
+          <a:ln>
+            <a:tailEnd type="triangle"/>
+          </a:ln>
+        </p:spPr>
+        <p:style>
+          <a:lnRef idx="2">
+            <a:schemeClr val="dk1"/>
+          </a:lnRef>
+          <a:fillRef idx="0">
+            <a:schemeClr val="dk1"/>
+          </a:fillRef>
+          <a:effectRef idx="1">
+            <a:schemeClr val="dk1"/>
+          </a:effectRef>
+          <a:fontRef idx="minor">
+            <a:schemeClr val="tx1"/>
+          </a:fontRef>
+        </p:style>
+      </p:cxnSp>
+      <p:cxnSp>
+        <p:nvCxnSpPr>
+          <p:cNvPr id="45" name="Straight Arrow Connector 44"/>
+          <p:cNvCxnSpPr>
+            <a:stCxn id="17" idx="2"/>
+            <a:endCxn id="13" idx="0"/>
+          </p:cNvCxnSpPr>
+          <p:nvPr/>
+        </p:nvCxnSpPr>
+        <p:spPr>
+          <a:xfrm flipH="1">
+            <a:off x="1104846" y="3559212"/>
+            <a:ext cx="1218042" cy="265076"/>
+          </a:xfrm>
+          <a:prstGeom prst="straightConnector1">
+            <a:avLst/>
+          </a:prstGeom>
+          <a:ln>
+            <a:tailEnd type="triangle"/>
+          </a:ln>
+        </p:spPr>
+        <p:style>
+          <a:lnRef idx="2">
+            <a:schemeClr val="dk1"/>
+          </a:lnRef>
+          <a:fillRef idx="0">
+            <a:schemeClr val="dk1"/>
+          </a:fillRef>
+          <a:effectRef idx="1">
+            <a:schemeClr val="dk1"/>
+          </a:effectRef>
+          <a:fontRef idx="minor">
+            <a:schemeClr val="tx1"/>
+          </a:fontRef>
+        </p:style>
+      </p:cxnSp>
+      <p:sp>
+        <p:nvSpPr>
+          <p:cNvPr id="46" name="Rounded Rectangle 45"/>
+          <p:cNvSpPr/>
+          <p:nvPr/>
+        </p:nvSpPr>
+        <p:spPr>
+          <a:xfrm>
+            <a:off x="4877806" y="3973256"/>
+            <a:ext cx="1785765" cy="623943"/>
+          </a:xfrm>
+          <a:prstGeom prst="roundRect">
+            <a:avLst/>
+          </a:prstGeom>
+        </p:spPr>
+        <p:style>
+          <a:lnRef idx="2">
+            <a:schemeClr val="accent2"/>
+          </a:lnRef>
+          <a:fillRef idx="1">
+            <a:schemeClr val="lt1"/>
+          </a:fillRef>
+          <a:effectRef idx="0">
+            <a:schemeClr val="accent2"/>
+          </a:effectRef>
+          <a:fontRef idx="minor">
+            <a:schemeClr val="dk1"/>
+          </a:fontRef>
+        </p:style>
+        <p:txBody>
+          <a:bodyPr rtlCol="1" anchor="ctr"/>
+          <a:lstStyle/>
+          <a:p>
+            <a:pPr algn="ctr"/>
+            <a:r>
+              <a:rPr lang="en-US" dirty="0"/>
+              <a:t>Linear methods</a:t>
+            </a:r>
+            <a:endParaRPr lang="he-IL" dirty="0"/>
+          </a:p>
+        </p:txBody>
+      </p:sp>
+      <p:sp>
+        <p:nvSpPr>
+          <p:cNvPr id="48" name="Rounded Rectangle 47"/>
+          <p:cNvSpPr/>
+          <p:nvPr/>
+        </p:nvSpPr>
+        <p:spPr>
+          <a:xfrm>
+            <a:off x="5758750" y="5021472"/>
+            <a:ext cx="1785765" cy="623943"/>
+          </a:xfrm>
+          <a:prstGeom prst="roundRect">
+            <a:avLst/>
+          </a:prstGeom>
+        </p:spPr>
+        <p:style>
+          <a:lnRef idx="2">
+            <a:schemeClr val="accent2"/>
+          </a:lnRef>
+          <a:fillRef idx="1">
+            <a:schemeClr val="lt1"/>
+          </a:fillRef>
+          <a:effectRef idx="0">
+            <a:schemeClr val="accent2"/>
+          </a:effectRef>
+          <a:fontRef idx="minor">
+            <a:schemeClr val="dk1"/>
+          </a:fontRef>
+        </p:style>
+        <p:txBody>
+          <a:bodyPr rtlCol="1" anchor="ctr"/>
+          <a:lstStyle/>
+          <a:p>
+            <a:pPr algn="ctr"/>
+            <a:r>
+              <a:rPr lang="en-US" dirty="0"/>
+              <a:t>Logistic regression</a:t>
+            </a:r>
+            <a:endParaRPr lang="he-IL" dirty="0"/>
+          </a:p>
+        </p:txBody>
+      </p:sp>
+      <p:sp>
+        <p:nvSpPr>
+          <p:cNvPr id="49" name="Rounded Rectangle 48"/>
+          <p:cNvSpPr/>
+          <p:nvPr/>
+        </p:nvSpPr>
+        <p:spPr>
+          <a:xfrm>
+            <a:off x="3807288" y="5032624"/>
+            <a:ext cx="1785765" cy="623943"/>
+          </a:xfrm>
+          <a:prstGeom prst="roundRect">
+            <a:avLst/>
+          </a:prstGeom>
+        </p:spPr>
+        <p:style>
+          <a:lnRef idx="2">
+            <a:schemeClr val="accent2"/>
+          </a:lnRef>
+          <a:fillRef idx="1">
+            <a:schemeClr val="lt1"/>
+          </a:fillRef>
+          <a:effectRef idx="0">
+            <a:schemeClr val="accent2"/>
+          </a:effectRef>
+          <a:fontRef idx="minor">
+            <a:schemeClr val="dk1"/>
+          </a:fontRef>
+        </p:style>
+        <p:txBody>
+          <a:bodyPr rtlCol="1" anchor="ctr"/>
+          <a:lstStyle/>
+          <a:p>
+            <a:pPr algn="ctr"/>
+            <a:r>
+              <a:rPr lang="en-US" dirty="0"/>
+              <a:t>Discriminant Analysis</a:t>
+            </a:r>
+            <a:endParaRPr lang="he-IL" dirty="0"/>
+          </a:p>
+        </p:txBody>
+      </p:sp>
+      <p:sp>
+        <p:nvSpPr>
+          <p:cNvPr id="54" name="Rounded Rectangle 53"/>
+          <p:cNvSpPr/>
+          <p:nvPr/>
+        </p:nvSpPr>
+        <p:spPr>
+          <a:xfrm>
+            <a:off x="7866332" y="5021472"/>
+            <a:ext cx="2069405" cy="623943"/>
+          </a:xfrm>
+          <a:prstGeom prst="roundRect">
+            <a:avLst/>
+          </a:prstGeom>
+        </p:spPr>
+        <p:style>
+          <a:lnRef idx="3">
+            <a:schemeClr val="lt1"/>
+          </a:lnRef>
+          <a:fillRef idx="1">
+            <a:schemeClr val="accent5"/>
+          </a:fillRef>
+          <a:effectRef idx="1">
+            <a:schemeClr val="accent5"/>
+          </a:effectRef>
+          <a:fontRef idx="minor">
+            <a:schemeClr val="lt1"/>
+          </a:fontRef>
+        </p:style>
+        <p:txBody>
+          <a:bodyPr rtlCol="1" anchor="ctr"/>
+          <a:lstStyle/>
+          <a:p>
+            <a:pPr algn="ctr"/>
+            <a:r>
+              <a:rPr lang="en-US" dirty="0"/>
+              <a:t>Support Vector Machines (SVM)</a:t>
+            </a:r>
+            <a:endParaRPr lang="he-IL" dirty="0"/>
+          </a:p>
+        </p:txBody>
+      </p:sp>
+      <p:cxnSp>
+        <p:nvCxnSpPr>
+          <p:cNvPr id="53" name="Straight Arrow Connector 52"/>
+          <p:cNvCxnSpPr>
+            <a:stCxn id="8" idx="2"/>
+            <a:endCxn id="54" idx="0"/>
+          </p:cNvCxnSpPr>
+          <p:nvPr/>
+        </p:nvCxnSpPr>
+        <p:spPr>
+          <a:xfrm>
+            <a:off x="8781521" y="4597199"/>
+            <a:ext cx="119514" cy="424273"/>
+          </a:xfrm>
+          <a:prstGeom prst="straightConnector1">
+            <a:avLst/>
+          </a:prstGeom>
+          <a:ln>
+            <a:tailEnd type="triangle"/>
+          </a:ln>
+        </p:spPr>
+        <p:style>
+          <a:lnRef idx="2">
+            <a:schemeClr val="dk1"/>
+          </a:lnRef>
+          <a:fillRef idx="0">
+            <a:schemeClr val="dk1"/>
+          </a:fillRef>
+          <a:effectRef idx="1">
+            <a:schemeClr val="dk1"/>
+          </a:effectRef>
+          <a:fontRef idx="minor">
+            <a:schemeClr val="tx1"/>
+          </a:fontRef>
+        </p:style>
+      </p:cxnSp>
+      <p:cxnSp>
+        <p:nvCxnSpPr>
+          <p:cNvPr id="57" name="Straight Arrow Connector 56"/>
+          <p:cNvCxnSpPr>
+            <a:stCxn id="8" idx="1"/>
+            <a:endCxn id="46" idx="3"/>
+          </p:cNvCxnSpPr>
+          <p:nvPr/>
+        </p:nvCxnSpPr>
+        <p:spPr>
+          <a:xfrm flipH="1">
+            <a:off x="6663571" y="4285228"/>
+            <a:ext cx="1225067" cy="0"/>
+          </a:xfrm>
+          <a:prstGeom prst="straightConnector1">
+            <a:avLst/>
+          </a:prstGeom>
+          <a:ln>
+            <a:tailEnd type="triangle"/>
+          </a:ln>
+        </p:spPr>
+        <p:style>
+          <a:lnRef idx="2">
+            <a:schemeClr val="dk1"/>
+          </a:lnRef>
+          <a:fillRef idx="0">
+            <a:schemeClr val="dk1"/>
+          </a:fillRef>
+          <a:effectRef idx="1">
+            <a:schemeClr val="dk1"/>
+          </a:effectRef>
+          <a:fontRef idx="minor">
+            <a:schemeClr val="tx1"/>
+          </a:fontRef>
+        </p:style>
+      </p:cxnSp>
+      <p:cxnSp>
+        <p:nvCxnSpPr>
+          <p:cNvPr id="60" name="Straight Arrow Connector 59"/>
+          <p:cNvCxnSpPr>
+            <a:stCxn id="46" idx="2"/>
+            <a:endCxn id="48" idx="0"/>
+          </p:cNvCxnSpPr>
+          <p:nvPr/>
+        </p:nvCxnSpPr>
+        <p:spPr>
+          <a:xfrm>
+            <a:off x="5770689" y="4597199"/>
+            <a:ext cx="880944" cy="424273"/>
+          </a:xfrm>
+          <a:prstGeom prst="straightConnector1">
+            <a:avLst/>
+          </a:prstGeom>
+          <a:ln>
+            <a:tailEnd type="triangle"/>
+          </a:ln>
+        </p:spPr>
+        <p:style>
+          <a:lnRef idx="2">
+            <a:schemeClr val="dk1"/>
+          </a:lnRef>
+          <a:fillRef idx="0">
+            <a:schemeClr val="dk1"/>
+          </a:fillRef>
+          <a:effectRef idx="1">
+            <a:schemeClr val="dk1"/>
+          </a:effectRef>
+          <a:fontRef idx="minor">
+            <a:schemeClr val="tx1"/>
+          </a:fontRef>
+        </p:style>
+      </p:cxnSp>
+      <p:cxnSp>
+        <p:nvCxnSpPr>
+          <p:cNvPr id="63" name="Straight Arrow Connector 62"/>
+          <p:cNvCxnSpPr>
+            <a:stCxn id="46" idx="2"/>
+            <a:endCxn id="49" idx="0"/>
+          </p:cNvCxnSpPr>
+          <p:nvPr/>
+        </p:nvCxnSpPr>
+        <p:spPr>
+          <a:xfrm flipH="1">
+            <a:off x="4700171" y="4597199"/>
+            <a:ext cx="1070518" cy="435425"/>
+          </a:xfrm>
+          <a:prstGeom prst="straightConnector1">
+            <a:avLst/>
+          </a:prstGeom>
+          <a:ln>
+            <a:tailEnd type="triangle"/>
+          </a:ln>
+        </p:spPr>
+        <p:style>
+          <a:lnRef idx="2">
+            <a:schemeClr val="dk1"/>
+          </a:lnRef>
+          <a:fillRef idx="0">
+            <a:schemeClr val="dk1"/>
+          </a:fillRef>
+          <a:effectRef idx="1">
+            <a:schemeClr val="dk1"/>
+          </a:effectRef>
+          <a:fontRef idx="minor">
+            <a:schemeClr val="tx1"/>
+          </a:fontRef>
+        </p:style>
+      </p:cxnSp>
+      <p:cxnSp>
+        <p:nvCxnSpPr>
+          <p:cNvPr id="69" name="Elbow Connector 68"/>
+          <p:cNvCxnSpPr>
+            <a:stCxn id="49" idx="2"/>
+            <a:endCxn id="54" idx="2"/>
+          </p:cNvCxnSpPr>
+          <p:nvPr/>
+        </p:nvCxnSpPr>
+        <p:spPr>
+          <a:xfrm rot="5400000" flipH="1" flipV="1">
+            <a:off x="6795027" y="3550559"/>
+            <a:ext cx="11152" cy="4200864"/>
+          </a:xfrm>
+          <a:prstGeom prst="bentConnector3">
+            <a:avLst>
+              <a:gd name="adj1" fmla="val -3749740"/>
+            </a:avLst>
+          </a:prstGeom>
+          <a:ln w="9525" cap="flat" cmpd="sng" algn="ctr">
+            <a:solidFill>
+              <a:schemeClr val="dk1"/>
+            </a:solidFill>
+            <a:prstDash val="dash"/>
+            <a:round/>
+            <a:headEnd type="none" w="med" len="med"/>
+            <a:tailEnd type="arrow" w="med" len="med"/>
+          </a:ln>
+        </p:spPr>
+        <p:style>
+          <a:lnRef idx="0">
+            <a:scrgbClr r="0" g="0" b="0"/>
+          </a:lnRef>
+          <a:fillRef idx="0">
+            <a:scrgbClr r="0" g="0" b="0"/>
+          </a:fillRef>
+          <a:effectRef idx="0">
+            <a:scrgbClr r="0" g="0" b="0"/>
+          </a:effectRef>
+          <a:fontRef idx="minor">
+            <a:schemeClr val="tx1"/>
+          </a:fontRef>
+        </p:style>
+      </p:cxnSp>
+      <p:sp>
+        <p:nvSpPr>
+          <p:cNvPr id="31" name="Rounded Rectangle 30"/>
+          <p:cNvSpPr/>
+          <p:nvPr/>
+        </p:nvSpPr>
+        <p:spPr>
+          <a:xfrm>
+            <a:off x="2391828" y="3824288"/>
+            <a:ext cx="1775012" cy="623943"/>
+          </a:xfrm>
+          <a:prstGeom prst="roundRect">
+            <a:avLst/>
+          </a:prstGeom>
+          <a:ln>
+            <a:headEnd type="none" w="med" len="med"/>
+            <a:tailEnd type="none" w="med" len="med"/>
+          </a:ln>
+        </p:spPr>
+        <p:style>
+          <a:lnRef idx="2">
+            <a:schemeClr val="accent2"/>
+          </a:lnRef>
+          <a:fillRef idx="1">
+            <a:schemeClr val="lt1"/>
+          </a:fillRef>
+          <a:effectRef idx="0">
+            <a:schemeClr val="accent2"/>
+          </a:effectRef>
+          <a:fontRef idx="minor">
+            <a:schemeClr val="dk1"/>
+          </a:fontRef>
+        </p:style>
+        <p:txBody>
+          <a:bodyPr rtlCol="1" anchor="ctr"/>
+          <a:lstStyle/>
+          <a:p>
+            <a:pPr algn="ctr"/>
+            <a:r>
+              <a:rPr lang="en-US" dirty="0"/>
+              <a:t>ROC/AUC</a:t>
+            </a:r>
+            <a:endParaRPr lang="he-IL" dirty="0"/>
+          </a:p>
+        </p:txBody>
+      </p:sp>
+      <p:cxnSp>
+        <p:nvCxnSpPr>
+          <p:cNvPr id="10" name="Straight Arrow Connector 9"/>
+          <p:cNvCxnSpPr>
+            <a:stCxn id="13" idx="3"/>
+            <a:endCxn id="31" idx="1"/>
+          </p:cNvCxnSpPr>
+          <p:nvPr/>
+        </p:nvCxnSpPr>
+        <p:spPr>
+          <a:xfrm>
+            <a:off x="1992352" y="4136260"/>
+            <a:ext cx="399476" cy="0"/>
+          </a:xfrm>
+          <a:prstGeom prst="straightConnector1">
+            <a:avLst/>
+          </a:prstGeom>
+          <a:ln>
+            <a:tailEnd type="triangle"/>
+          </a:ln>
+        </p:spPr>
+        <p:style>
+          <a:lnRef idx="2">
+            <a:schemeClr val="dk1"/>
+          </a:lnRef>
+          <a:fillRef idx="0">
+            <a:schemeClr val="dk1"/>
+          </a:fillRef>
+          <a:effectRef idx="1">
+            <a:schemeClr val="dk1"/>
+          </a:effectRef>
+          <a:fontRef idx="minor">
+            <a:schemeClr val="tx1"/>
+          </a:fontRef>
+        </p:style>
+      </p:cxnSp>
+      <p:sp>
+        <p:nvSpPr>
+          <p:cNvPr id="36" name="Rounded Rectangle 35"/>
+          <p:cNvSpPr/>
+          <p:nvPr/>
+        </p:nvSpPr>
+        <p:spPr>
+          <a:xfrm>
+            <a:off x="10053949" y="5021472"/>
+            <a:ext cx="2069405" cy="623943"/>
+          </a:xfrm>
+          <a:prstGeom prst="roundRect">
+            <a:avLst/>
+          </a:prstGeom>
+        </p:spPr>
+        <p:style>
+          <a:lnRef idx="3">
+            <a:schemeClr val="lt1"/>
+          </a:lnRef>
+          <a:fillRef idx="1">
+            <a:schemeClr val="accent2"/>
+          </a:fillRef>
+          <a:effectRef idx="1">
+            <a:schemeClr val="accent2"/>
+          </a:effectRef>
+          <a:fontRef idx="minor">
+            <a:schemeClr val="lt1"/>
+          </a:fontRef>
+        </p:style>
+        <p:txBody>
+          <a:bodyPr rtlCol="1" anchor="ctr"/>
+          <a:lstStyle/>
+          <a:p>
+            <a:pPr algn="ctr"/>
+            <a:r>
+              <a:rPr lang="en-US" b="1" dirty="0"/>
+              <a:t>Trees</a:t>
+            </a:r>
+            <a:r>
+              <a:rPr lang="en-US" dirty="0"/>
+              <a:t>, </a:t>
+            </a:r>
+            <a:r>
+              <a:rPr lang="en-US" strike="sngStrike" dirty="0"/>
+              <a:t>Forests, Boosting, etc.</a:t>
+            </a:r>
+            <a:endParaRPr lang="he-IL" strike="sngStrike" dirty="0"/>
+          </a:p>
+        </p:txBody>
+      </p:sp>
+      <p:cxnSp>
+        <p:nvCxnSpPr>
+          <p:cNvPr id="18" name="Straight Arrow Connector 17"/>
+          <p:cNvCxnSpPr>
+            <a:stCxn id="8" idx="2"/>
+            <a:endCxn id="36" idx="0"/>
+          </p:cNvCxnSpPr>
+          <p:nvPr/>
+        </p:nvCxnSpPr>
+        <p:spPr>
+          <a:xfrm>
+            <a:off x="8781521" y="4597199"/>
+            <a:ext cx="2307131" cy="424273"/>
+          </a:xfrm>
+          <a:prstGeom prst="straightConnector1">
+            <a:avLst/>
+          </a:prstGeom>
+          <a:ln>
+            <a:tailEnd type="triangle"/>
+          </a:ln>
+        </p:spPr>
+        <p:style>
+          <a:lnRef idx="2">
+            <a:schemeClr val="dk1"/>
+          </a:lnRef>
+          <a:fillRef idx="0">
+            <a:schemeClr val="dk1"/>
+          </a:fillRef>
+          <a:effectRef idx="1">
+            <a:schemeClr val="dk1"/>
+          </a:effectRef>
+          <a:fontRef idx="minor">
+            <a:schemeClr val="tx1"/>
+          </a:fontRef>
+        </p:style>
+      </p:cxnSp>
+      <p:sp>
+        <p:nvSpPr>
+          <p:cNvPr id="37" name="Rounded Rectangle 36"/>
+          <p:cNvSpPr/>
+          <p:nvPr/>
+        </p:nvSpPr>
+        <p:spPr>
+          <a:xfrm>
+            <a:off x="217340" y="4756769"/>
+            <a:ext cx="1775012" cy="623943"/>
+          </a:xfrm>
+          <a:prstGeom prst="roundRect">
+            <a:avLst/>
+          </a:prstGeom>
+          <a:ln>
+            <a:headEnd type="none" w="med" len="med"/>
+            <a:tailEnd type="none" w="med" len="med"/>
+          </a:ln>
+        </p:spPr>
+        <p:style>
+          <a:lnRef idx="3">
+            <a:schemeClr val="lt1"/>
+          </a:lnRef>
+          <a:fillRef idx="1">
+            <a:schemeClr val="accent2"/>
+          </a:fillRef>
+          <a:effectRef idx="1">
+            <a:schemeClr val="accent2"/>
+          </a:effectRef>
+          <a:fontRef idx="minor">
+            <a:schemeClr val="lt1"/>
+          </a:fontRef>
+        </p:style>
+        <p:txBody>
+          <a:bodyPr rtlCol="1" anchor="ctr"/>
+          <a:lstStyle/>
+          <a:p>
+            <a:pPr algn="ctr"/>
+            <a:r>
+              <a:rPr lang="en-US" dirty="0"/>
+              <a:t>Cross validation</a:t>
+            </a:r>
+            <a:endParaRPr lang="he-IL" dirty="0"/>
+          </a:p>
+        </p:txBody>
+      </p:sp>
+      <p:cxnSp>
+        <p:nvCxnSpPr>
+          <p:cNvPr id="12" name="Straight Arrow Connector 11"/>
+          <p:cNvCxnSpPr>
+            <a:stCxn id="13" idx="2"/>
+            <a:endCxn id="37" idx="0"/>
+          </p:cNvCxnSpPr>
+          <p:nvPr/>
+        </p:nvCxnSpPr>
+        <p:spPr>
+          <a:xfrm>
+            <a:off x="1104846" y="4448231"/>
+            <a:ext cx="0" cy="308538"/>
+          </a:xfrm>
+          <a:prstGeom prst="straightConnector1">
+            <a:avLst/>
+          </a:prstGeom>
+          <a:ln>
+            <a:tailEnd type="triangle"/>
+          </a:ln>
+        </p:spPr>
+        <p:style>
+          <a:lnRef idx="2">
+            <a:schemeClr val="dk1"/>
+          </a:lnRef>
+          <a:fillRef idx="0">
+            <a:schemeClr val="dk1"/>
+          </a:fillRef>
+          <a:effectRef idx="1">
+            <a:schemeClr val="dk1"/>
+          </a:effectRef>
+          <a:fontRef idx="minor">
+            <a:schemeClr val="tx1"/>
+          </a:fontRef>
+        </p:style>
+      </p:cxnSp>
+      <p:sp>
+        <p:nvSpPr>
+          <p:cNvPr id="42" name="Rounded Rectangle 41"/>
+          <p:cNvSpPr/>
+          <p:nvPr/>
+        </p:nvSpPr>
+        <p:spPr>
+          <a:xfrm>
+            <a:off x="225579" y="5735170"/>
+            <a:ext cx="1183092" cy="492640"/>
+          </a:xfrm>
+          <a:prstGeom prst="roundRect">
+            <a:avLst/>
+          </a:prstGeom>
+          <a:ln>
+            <a:headEnd type="none" w="med" len="med"/>
+            <a:tailEnd type="none" w="med" len="med"/>
+          </a:ln>
+        </p:spPr>
+        <p:style>
+          <a:lnRef idx="3">
+            <a:schemeClr val="lt1"/>
+          </a:lnRef>
+          <a:fillRef idx="1">
+            <a:schemeClr val="accent2"/>
+          </a:fillRef>
+          <a:effectRef idx="1">
+            <a:schemeClr val="accent2"/>
+          </a:effectRef>
+          <a:fontRef idx="minor">
+            <a:schemeClr val="lt1"/>
+          </a:fontRef>
+        </p:style>
+        <p:txBody>
+          <a:bodyPr rtlCol="1" anchor="ctr"/>
+          <a:lstStyle/>
+          <a:p>
+            <a:pPr algn="ctr"/>
+            <a:r>
+              <a:rPr lang="en-US" sz="1400" dirty="0"/>
+              <a:t>k-fold </a:t>
+            </a:r>
+            <a:r>
+              <a:rPr lang="en-US" sz="1400" dirty="0" err="1"/>
+              <a:t>xval</a:t>
+            </a:r>
+            <a:endParaRPr lang="he-IL" sz="1400" dirty="0"/>
+          </a:p>
+        </p:txBody>
+      </p:sp>
+      <p:sp>
+        <p:nvSpPr>
+          <p:cNvPr id="44" name="Rounded Rectangle 43"/>
+          <p:cNvSpPr/>
+          <p:nvPr/>
+        </p:nvSpPr>
+        <p:spPr>
+          <a:xfrm>
+            <a:off x="1482811" y="5735170"/>
+            <a:ext cx="1466334" cy="492640"/>
+          </a:xfrm>
+          <a:prstGeom prst="roundRect">
+            <a:avLst/>
+          </a:prstGeom>
+          <a:ln>
+            <a:headEnd type="none" w="med" len="med"/>
+            <a:tailEnd type="none" w="med" len="med"/>
+          </a:ln>
+        </p:spPr>
+        <p:style>
+          <a:lnRef idx="3">
+            <a:schemeClr val="lt1"/>
+          </a:lnRef>
+          <a:fillRef idx="1">
+            <a:schemeClr val="accent2"/>
+          </a:fillRef>
+          <a:effectRef idx="1">
+            <a:schemeClr val="accent2"/>
+          </a:effectRef>
+          <a:fontRef idx="minor">
+            <a:schemeClr val="lt1"/>
+          </a:fontRef>
+        </p:style>
+        <p:txBody>
+          <a:bodyPr rtlCol="1" anchor="ctr"/>
+          <a:lstStyle/>
+          <a:p>
+            <a:pPr algn="ctr"/>
+            <a:r>
+              <a:rPr lang="en-US" sz="1400" dirty="0"/>
+              <a:t>Leave one out</a:t>
+            </a:r>
+            <a:endParaRPr lang="he-IL" sz="1400" dirty="0"/>
+          </a:p>
+        </p:txBody>
+      </p:sp>
+      <p:cxnSp>
+        <p:nvCxnSpPr>
+          <p:cNvPr id="24" name="Straight Arrow Connector 23"/>
+          <p:cNvCxnSpPr>
+            <a:stCxn id="37" idx="2"/>
+            <a:endCxn id="42" idx="0"/>
+          </p:cNvCxnSpPr>
+          <p:nvPr/>
+        </p:nvCxnSpPr>
+        <p:spPr>
+          <a:xfrm flipH="1">
+            <a:off x="817125" y="5380712"/>
+            <a:ext cx="287721" cy="354458"/>
+          </a:xfrm>
+          <a:prstGeom prst="straightConnector1">
+            <a:avLst/>
+          </a:prstGeom>
+          <a:ln>
+            <a:tailEnd type="triangle"/>
+          </a:ln>
+        </p:spPr>
+        <p:style>
+          <a:lnRef idx="2">
+            <a:schemeClr val="dk1"/>
+          </a:lnRef>
+          <a:fillRef idx="0">
+            <a:schemeClr val="dk1"/>
+          </a:fillRef>
+          <a:effectRef idx="1">
+            <a:schemeClr val="dk1"/>
+          </a:effectRef>
+          <a:fontRef idx="minor">
+            <a:schemeClr val="tx1"/>
+          </a:fontRef>
+        </p:style>
+      </p:cxnSp>
+      <p:cxnSp>
+        <p:nvCxnSpPr>
+          <p:cNvPr id="27" name="Straight Arrow Connector 26"/>
+          <p:cNvCxnSpPr>
+            <a:stCxn id="37" idx="2"/>
+            <a:endCxn id="44" idx="0"/>
+          </p:cNvCxnSpPr>
+          <p:nvPr/>
+        </p:nvCxnSpPr>
+        <p:spPr>
+          <a:xfrm>
+            <a:off x="1104846" y="5380712"/>
+            <a:ext cx="1111132" cy="354458"/>
+          </a:xfrm>
+          <a:prstGeom prst="straightConnector1">
+            <a:avLst/>
+          </a:prstGeom>
+          <a:ln>
+            <a:tailEnd type="triangle"/>
+          </a:ln>
+        </p:spPr>
+        <p:style>
+          <a:lnRef idx="2">
+            <a:schemeClr val="dk1"/>
+          </a:lnRef>
+          <a:fillRef idx="0">
+            <a:schemeClr val="dk1"/>
+          </a:fillRef>
+          <a:effectRef idx="1">
+            <a:schemeClr val="dk1"/>
+          </a:effectRef>
+          <a:fontRef idx="minor">
+            <a:schemeClr val="tx1"/>
+          </a:fontRef>
+        </p:style>
+      </p:cxnSp>
+    </p:spTree>
+    <p:extLst>
+      <p:ext uri="{BB962C8B-B14F-4D97-AF65-F5344CB8AC3E}">
+        <p14:creationId xmlns:p14="http://schemas.microsoft.com/office/powerpoint/2010/main" val="598188538"/>
+      </p:ext>
+    </p:extLst>
+  </p:cSld>
+  <p:clrMapOvr>
+    <a:masterClrMapping/>
+  </p:clrMapOvr>
+  <p:timing>
+    <p:tnLst>
+      <p:par>
+        <p:cTn id="1" dur="indefinite" restart="never" nodeType="tmRoot"/>
+      </p:par>
+    </p:tnLst>
+  </p:timing>
+</p:sld>
+</file>
+
+<file path=ppt/slides/slide16.xml><?xml version="1.0" encoding="utf-8"?>
+<p:sld xmlns:a="http://schemas.openxmlformats.org/drawingml/2006/main" xmlns:r="http://schemas.openxmlformats.org/officeDocument/2006/relationships" xmlns:p="http://schemas.openxmlformats.org/presentationml/2006/main">
+  <p:cSld>
+    <p:spTree>
+      <p:nvGrpSpPr>
+        <p:cNvPr id="1" name=""/>
+        <p:cNvGrpSpPr/>
+        <p:nvPr/>
+      </p:nvGrpSpPr>
+      <p:grpSpPr>
+        <a:xfrm>
+          <a:off x="0" y="0"/>
+          <a:ext cx="0" cy="0"/>
+          <a:chOff x="0" y="0"/>
+          <a:chExt cx="0" cy="0"/>
+        </a:xfrm>
+      </p:grpSpPr>
+      <p:sp>
+        <p:nvSpPr>
           <p:cNvPr id="6" name="Title 5"/>
           <p:cNvSpPr>
             <a:spLocks noGrp="1"/>
@@ -8505,7 +10044,7 @@
           <a:p>
             <a:fld id="{4FAB73BC-B049-4115-A692-8D63A059BFB8}" type="slidenum">
               <a:rPr lang="en-US" smtClean="0"/>
-              <a:t>15</a:t>
+              <a:t>16</a:t>
             </a:fld>
             <a:endParaRPr lang="en-US" dirty="0"/>
           </a:p>
@@ -8521,10 +10060,17 @@
   <p:clrMapOvr>
     <a:masterClrMapping/>
   </p:clrMapOvr>
+  <p:timing>
+    <p:tnLst>
+      <p:par>
+        <p:cTn id="1" dur="indefinite" restart="never" nodeType="tmRoot"/>
+      </p:par>
+    </p:tnLst>
+  </p:timing>
 </p:sld>
 </file>
 
-<file path=ppt/slides/slide16.xml><?xml version="1.0" encoding="utf-8"?>
+<file path=ppt/slides/slide17.xml><?xml version="1.0" encoding="utf-8"?>
 <p:sld xmlns:a="http://schemas.openxmlformats.org/drawingml/2006/main" xmlns:r="http://schemas.openxmlformats.org/officeDocument/2006/relationships" xmlns:p="http://schemas.openxmlformats.org/presentationml/2006/main">
   <p:cSld>
     <p:spTree>
@@ -8729,7 +10275,7 @@
             <a:fld id="{4FAB73BC-B049-4115-A692-8D63A059BFB8}" type="slidenum">
               <a:rPr lang="en-US" smtClean="0"/>
               <a:pPr/>
-              <a:t>16</a:t>
+              <a:t>17</a:t>
             </a:fld>
             <a:endParaRPr lang="en-US" dirty="0"/>
           </a:p>
@@ -8745,10 +10291,17 @@
   <p:clrMapOvr>
     <a:masterClrMapping/>
   </p:clrMapOvr>
+  <p:timing>
+    <p:tnLst>
+      <p:par>
+        <p:cTn id="1" dur="indefinite" restart="never" nodeType="tmRoot"/>
+      </p:par>
+    </p:tnLst>
+  </p:timing>
 </p:sld>
 </file>
 
-<file path=ppt/slides/slide17.xml><?xml version="1.0" encoding="utf-8"?>
+<file path=ppt/slides/slide18.xml><?xml version="1.0" encoding="utf-8"?>
 <p:sld xmlns:a="http://schemas.openxmlformats.org/drawingml/2006/main" xmlns:r="http://schemas.openxmlformats.org/officeDocument/2006/relationships" xmlns:p="http://schemas.openxmlformats.org/presentationml/2006/main">
   <p:cSld>
     <p:spTree>
@@ -9129,7 +10682,7 @@
           <a:p>
             <a:fld id="{4FAB73BC-B049-4115-A692-8D63A059BFB8}" type="slidenum">
               <a:rPr lang="en-US" smtClean="0"/>
-              <a:t>17</a:t>
+              <a:t>18</a:t>
             </a:fld>
             <a:endParaRPr lang="en-US" dirty="0"/>
           </a:p>
@@ -9524,7 +11077,7 @@
 </p:sld>
 </file>
 
-<file path=ppt/slides/slide18.xml><?xml version="1.0" encoding="utf-8"?>
+<file path=ppt/slides/slide19.xml><?xml version="1.0" encoding="utf-8"?>
 <p:sld xmlns:a="http://schemas.openxmlformats.org/drawingml/2006/main" xmlns:r="http://schemas.openxmlformats.org/officeDocument/2006/relationships" xmlns:p="http://schemas.openxmlformats.org/presentationml/2006/main">
   <p:cSld>
     <p:spTree>
@@ -9717,7 +11270,7 @@
           <a:p>
             <a:fld id="{4FAB73BC-B049-4115-A692-8D63A059BFB8}" type="slidenum">
               <a:rPr lang="en-US" smtClean="0"/>
-              <a:t>18</a:t>
+              <a:t>19</a:t>
             </a:fld>
             <a:endParaRPr lang="en-US" dirty="0"/>
           </a:p>
@@ -9757,128 +11310,6 @@
     <p:extLst>
       <p:ext uri="{BB962C8B-B14F-4D97-AF65-F5344CB8AC3E}">
         <p14:creationId xmlns:p14="http://schemas.microsoft.com/office/powerpoint/2010/main" val="4102354008"/>
-      </p:ext>
-    </p:extLst>
-  </p:cSld>
-  <p:clrMapOvr>
-    <a:masterClrMapping/>
-  </p:clrMapOvr>
-</p:sld>
-</file>
-
-<file path=ppt/slides/slide19.xml><?xml version="1.0" encoding="utf-8"?>
-<p:sld xmlns:a="http://schemas.openxmlformats.org/drawingml/2006/main" xmlns:r="http://schemas.openxmlformats.org/officeDocument/2006/relationships" xmlns:p="http://schemas.openxmlformats.org/presentationml/2006/main">
-  <p:cSld>
-    <p:spTree>
-      <p:nvGrpSpPr>
-        <p:cNvPr id="1" name=""/>
-        <p:cNvGrpSpPr/>
-        <p:nvPr/>
-      </p:nvGrpSpPr>
-      <p:grpSpPr>
-        <a:xfrm>
-          <a:off x="0" y="0"/>
-          <a:ext cx="0" cy="0"/>
-          <a:chOff x="0" y="0"/>
-          <a:chExt cx="0" cy="0"/>
-        </a:xfrm>
-      </p:grpSpPr>
-      <p:sp>
-        <p:nvSpPr>
-          <p:cNvPr id="2" name="Title 1"/>
-          <p:cNvSpPr>
-            <a:spLocks noGrp="1"/>
-          </p:cNvSpPr>
-          <p:nvPr>
-            <p:ph type="title"/>
-          </p:nvPr>
-        </p:nvSpPr>
-        <p:spPr/>
-        <p:txBody>
-          <a:bodyPr/>
-          <a:lstStyle/>
-          <a:p>
-            <a:r>
-              <a:rPr lang="en-US" dirty="0"/>
-              <a:t>Live Coding Example k-fold cv</a:t>
-            </a:r>
-            <a:endParaRPr lang="he-IL" dirty="0"/>
-          </a:p>
-        </p:txBody>
-      </p:sp>
-      <p:sp>
-        <p:nvSpPr>
-          <p:cNvPr id="3" name="Content Placeholder 2"/>
-          <p:cNvSpPr>
-            <a:spLocks noGrp="1"/>
-          </p:cNvSpPr>
-          <p:nvPr>
-            <p:ph idx="1"/>
-          </p:nvPr>
-        </p:nvSpPr>
-        <p:spPr/>
-        <p:txBody>
-          <a:bodyPr/>
-          <a:lstStyle/>
-          <a:p>
-            <a:r>
-              <a:rPr lang="en-US" dirty="0"/>
-              <a:t>/class code/03-cv_example.R</a:t>
-            </a:r>
-            <a:endParaRPr lang="he-IL" dirty="0"/>
-          </a:p>
-        </p:txBody>
-      </p:sp>
-      <p:sp>
-        <p:nvSpPr>
-          <p:cNvPr id="4" name="Footer Placeholder 3"/>
-          <p:cNvSpPr>
-            <a:spLocks noGrp="1"/>
-          </p:cNvSpPr>
-          <p:nvPr>
-            <p:ph type="ftr" sz="quarter" idx="11"/>
-          </p:nvPr>
-        </p:nvSpPr>
-        <p:spPr/>
-        <p:txBody>
-          <a:bodyPr/>
-          <a:lstStyle/>
-          <a:p>
-            <a:r>
-              <a:rPr lang="en-US"/>
-              <a:t>Materials by Adi Sarid https://adisarid.github.io and http://www.sarid-ins.com</a:t>
-            </a:r>
-            <a:endParaRPr lang="en-US" dirty="0"/>
-          </a:p>
-        </p:txBody>
-      </p:sp>
-      <p:sp>
-        <p:nvSpPr>
-          <p:cNvPr id="5" name="Slide Number Placeholder 4"/>
-          <p:cNvSpPr>
-            <a:spLocks noGrp="1"/>
-          </p:cNvSpPr>
-          <p:nvPr>
-            <p:ph type="sldNum" sz="quarter" idx="12"/>
-          </p:nvPr>
-        </p:nvSpPr>
-        <p:spPr/>
-        <p:txBody>
-          <a:bodyPr/>
-          <a:lstStyle/>
-          <a:p>
-            <a:fld id="{4FAB73BC-B049-4115-A692-8D63A059BFB8}" type="slidenum">
-              <a:rPr lang="en-US" smtClean="0"/>
-              <a:t>19</a:t>
-            </a:fld>
-            <a:endParaRPr lang="en-US" dirty="0"/>
-          </a:p>
-        </p:txBody>
-      </p:sp>
-    </p:spTree>
-    <p:extLst>
-      <p:ext uri="{BB962C8B-B14F-4D97-AF65-F5344CB8AC3E}">
-        <p14:creationId xmlns:p14="http://schemas.microsoft.com/office/powerpoint/2010/main" val="1860836206"/>
       </p:ext>
     </p:extLst>
   </p:cSld>
@@ -10479,17 +11910,17 @@
           </a:prstGeom>
         </p:spPr>
         <p:style>
-          <a:lnRef idx="3">
-            <a:schemeClr val="lt1"/>
+          <a:lnRef idx="2">
+            <a:schemeClr val="accent2"/>
           </a:lnRef>
           <a:fillRef idx="1">
-            <a:schemeClr val="accent2"/>
+            <a:schemeClr val="lt1"/>
           </a:fillRef>
-          <a:effectRef idx="1">
+          <a:effectRef idx="0">
             <a:schemeClr val="accent2"/>
           </a:effectRef>
           <a:fontRef idx="minor">
-            <a:schemeClr val="lt1"/>
+            <a:schemeClr val="dk1"/>
           </a:fontRef>
         </p:style>
         <p:txBody>
@@ -11240,13 +12671,20 @@
     </p:spTree>
     <p:extLst>
       <p:ext uri="{BB962C8B-B14F-4D97-AF65-F5344CB8AC3E}">
-        <p14:creationId xmlns:p14="http://schemas.microsoft.com/office/powerpoint/2010/main" val="601734684"/>
+        <p14:creationId xmlns:p14="http://schemas.microsoft.com/office/powerpoint/2010/main" val="2570557502"/>
       </p:ext>
     </p:extLst>
   </p:cSld>
   <p:clrMapOvr>
     <a:masterClrMapping/>
   </p:clrMapOvr>
+  <p:timing>
+    <p:tnLst>
+      <p:par>
+        <p:cTn id="1" dur="indefinite" restart="never" nodeType="tmRoot"/>
+      </p:par>
+    </p:tnLst>
+  </p:timing>
 </p:sld>
 </file>
 
@@ -11284,6 +12722,1497 @@
           <a:p>
             <a:r>
               <a:rPr lang="en-US" dirty="0"/>
+              <a:t>Live Coding Example k-fold cv</a:t>
+            </a:r>
+            <a:endParaRPr lang="he-IL" dirty="0"/>
+          </a:p>
+        </p:txBody>
+      </p:sp>
+      <p:sp>
+        <p:nvSpPr>
+          <p:cNvPr id="3" name="Content Placeholder 2"/>
+          <p:cNvSpPr>
+            <a:spLocks noGrp="1"/>
+          </p:cNvSpPr>
+          <p:nvPr>
+            <p:ph idx="1"/>
+          </p:nvPr>
+        </p:nvSpPr>
+        <p:spPr/>
+        <p:txBody>
+          <a:bodyPr/>
+          <a:lstStyle/>
+          <a:p>
+            <a:r>
+              <a:rPr lang="en-US" dirty="0"/>
+              <a:t>/class code/03-cv_example.R</a:t>
+            </a:r>
+            <a:endParaRPr lang="he-IL" dirty="0"/>
+          </a:p>
+        </p:txBody>
+      </p:sp>
+      <p:sp>
+        <p:nvSpPr>
+          <p:cNvPr id="4" name="Footer Placeholder 3"/>
+          <p:cNvSpPr>
+            <a:spLocks noGrp="1"/>
+          </p:cNvSpPr>
+          <p:nvPr>
+            <p:ph type="ftr" sz="quarter" idx="11"/>
+          </p:nvPr>
+        </p:nvSpPr>
+        <p:spPr/>
+        <p:txBody>
+          <a:bodyPr/>
+          <a:lstStyle/>
+          <a:p>
+            <a:r>
+              <a:rPr lang="en-US"/>
+              <a:t>Materials by Adi Sarid https://adisarid.github.io and http://www.sarid-ins.com</a:t>
+            </a:r>
+            <a:endParaRPr lang="en-US" dirty="0"/>
+          </a:p>
+        </p:txBody>
+      </p:sp>
+      <p:sp>
+        <p:nvSpPr>
+          <p:cNvPr id="5" name="Slide Number Placeholder 4"/>
+          <p:cNvSpPr>
+            <a:spLocks noGrp="1"/>
+          </p:cNvSpPr>
+          <p:nvPr>
+            <p:ph type="sldNum" sz="quarter" idx="12"/>
+          </p:nvPr>
+        </p:nvSpPr>
+        <p:spPr/>
+        <p:txBody>
+          <a:bodyPr/>
+          <a:lstStyle/>
+          <a:p>
+            <a:fld id="{4FAB73BC-B049-4115-A692-8D63A059BFB8}" type="slidenum">
+              <a:rPr lang="en-US" smtClean="0"/>
+              <a:t>20</a:t>
+            </a:fld>
+            <a:endParaRPr lang="en-US" dirty="0"/>
+          </a:p>
+        </p:txBody>
+      </p:sp>
+    </p:spTree>
+    <p:extLst>
+      <p:ext uri="{BB962C8B-B14F-4D97-AF65-F5344CB8AC3E}">
+        <p14:creationId xmlns:p14="http://schemas.microsoft.com/office/powerpoint/2010/main" val="1860836206"/>
+      </p:ext>
+    </p:extLst>
+  </p:cSld>
+  <p:clrMapOvr>
+    <a:masterClrMapping/>
+  </p:clrMapOvr>
+</p:sld>
+</file>
+
+<file path=ppt/slides/slide21.xml><?xml version="1.0" encoding="utf-8"?>
+<p:sld xmlns:a="http://schemas.openxmlformats.org/drawingml/2006/main" xmlns:r="http://schemas.openxmlformats.org/officeDocument/2006/relationships" xmlns:p="http://schemas.openxmlformats.org/presentationml/2006/main">
+  <p:cSld>
+    <p:spTree>
+      <p:nvGrpSpPr>
+        <p:cNvPr id="1" name=""/>
+        <p:cNvGrpSpPr/>
+        <p:nvPr/>
+      </p:nvGrpSpPr>
+      <p:grpSpPr>
+        <a:xfrm>
+          <a:off x="0" y="0"/>
+          <a:ext cx="0" cy="0"/>
+          <a:chOff x="0" y="0"/>
+          <a:chExt cx="0" cy="0"/>
+        </a:xfrm>
+      </p:grpSpPr>
+      <p:sp>
+        <p:nvSpPr>
+          <p:cNvPr id="2" name="Title 1"/>
+          <p:cNvSpPr>
+            <a:spLocks noGrp="1"/>
+          </p:cNvSpPr>
+          <p:nvPr>
+            <p:ph type="title"/>
+          </p:nvPr>
+        </p:nvSpPr>
+        <p:spPr/>
+        <p:txBody>
+          <a:bodyPr>
+            <a:normAutofit/>
+          </a:bodyPr>
+          <a:lstStyle/>
+          <a:p>
+            <a:r>
+              <a:rPr lang="en-US" dirty="0"/>
+              <a:t>Contents for today</a:t>
+            </a:r>
+            <a:endParaRPr lang="he-IL" dirty="0"/>
+          </a:p>
+        </p:txBody>
+      </p:sp>
+      <p:sp>
+        <p:nvSpPr>
+          <p:cNvPr id="4" name="Footer Placeholder 3"/>
+          <p:cNvSpPr>
+            <a:spLocks noGrp="1"/>
+          </p:cNvSpPr>
+          <p:nvPr>
+            <p:ph type="ftr" sz="quarter" idx="11"/>
+          </p:nvPr>
+        </p:nvSpPr>
+        <p:spPr/>
+        <p:txBody>
+          <a:bodyPr/>
+          <a:lstStyle/>
+          <a:p>
+            <a:r>
+              <a:rPr lang="en-US" dirty="0"/>
+              <a:t>Materials by Adi Sarid https://adisarid.github.io and http://www.sarid-ins.com</a:t>
+            </a:r>
+          </a:p>
+        </p:txBody>
+      </p:sp>
+      <p:sp>
+        <p:nvSpPr>
+          <p:cNvPr id="5" name="Slide Number Placeholder 4"/>
+          <p:cNvSpPr>
+            <a:spLocks noGrp="1"/>
+          </p:cNvSpPr>
+          <p:nvPr>
+            <p:ph type="sldNum" sz="quarter" idx="12"/>
+          </p:nvPr>
+        </p:nvSpPr>
+        <p:spPr>
+          <a:xfrm>
+            <a:off x="11784467" y="6272784"/>
+            <a:ext cx="640080" cy="365125"/>
+          </a:xfrm>
+        </p:spPr>
+        <p:txBody>
+          <a:bodyPr/>
+          <a:lstStyle/>
+          <a:p>
+            <a:fld id="{4FAB73BC-B049-4115-A692-8D63A059BFB8}" type="slidenum">
+              <a:rPr lang="en-US" smtClean="0"/>
+              <a:t>21</a:t>
+            </a:fld>
+            <a:endParaRPr lang="en-US" dirty="0"/>
+          </a:p>
+        </p:txBody>
+      </p:sp>
+      <p:sp>
+        <p:nvSpPr>
+          <p:cNvPr id="6" name="Rounded Rectangle 5"/>
+          <p:cNvSpPr/>
+          <p:nvPr/>
+        </p:nvSpPr>
+        <p:spPr>
+          <a:xfrm>
+            <a:off x="3377903" y="2000920"/>
+            <a:ext cx="1775012" cy="623943"/>
+          </a:xfrm>
+          <a:prstGeom prst="roundRect">
+            <a:avLst/>
+          </a:prstGeom>
+        </p:spPr>
+        <p:style>
+          <a:lnRef idx="3">
+            <a:schemeClr val="lt1"/>
+          </a:lnRef>
+          <a:fillRef idx="1">
+            <a:schemeClr val="accent2"/>
+          </a:fillRef>
+          <a:effectRef idx="1">
+            <a:schemeClr val="accent2"/>
+          </a:effectRef>
+          <a:fontRef idx="minor">
+            <a:schemeClr val="lt1"/>
+          </a:fontRef>
+        </p:style>
+        <p:txBody>
+          <a:bodyPr rtlCol="1" anchor="ctr"/>
+          <a:lstStyle/>
+          <a:p>
+            <a:pPr algn="ctr"/>
+            <a:r>
+              <a:rPr lang="en-US" dirty="0"/>
+              <a:t>Supervised learning</a:t>
+            </a:r>
+            <a:endParaRPr lang="he-IL" dirty="0"/>
+          </a:p>
+        </p:txBody>
+      </p:sp>
+      <p:sp>
+        <p:nvSpPr>
+          <p:cNvPr id="7" name="Rounded Rectangle 6"/>
+          <p:cNvSpPr/>
+          <p:nvPr/>
+        </p:nvSpPr>
+        <p:spPr>
+          <a:xfrm>
+            <a:off x="441065" y="2000920"/>
+            <a:ext cx="1775012" cy="623943"/>
+          </a:xfrm>
+          <a:prstGeom prst="roundRect">
+            <a:avLst/>
+          </a:prstGeom>
+          <a:ln>
+            <a:headEnd type="none" w="med" len="med"/>
+            <a:tailEnd type="none" w="med" len="med"/>
+          </a:ln>
+        </p:spPr>
+        <p:style>
+          <a:lnRef idx="2">
+            <a:schemeClr val="accent2"/>
+          </a:lnRef>
+          <a:fillRef idx="1">
+            <a:schemeClr val="lt1"/>
+          </a:fillRef>
+          <a:effectRef idx="0">
+            <a:schemeClr val="accent2"/>
+          </a:effectRef>
+          <a:fontRef idx="minor">
+            <a:schemeClr val="dk1"/>
+          </a:fontRef>
+        </p:style>
+        <p:txBody>
+          <a:bodyPr rtlCol="1" anchor="ctr"/>
+          <a:lstStyle/>
+          <a:p>
+            <a:pPr algn="ctr"/>
+            <a:r>
+              <a:rPr lang="en-US" dirty="0"/>
+              <a:t>Unsupervised learning</a:t>
+            </a:r>
+          </a:p>
+        </p:txBody>
+      </p:sp>
+      <p:sp>
+        <p:nvSpPr>
+          <p:cNvPr id="8" name="Rounded Rectangle 7"/>
+          <p:cNvSpPr/>
+          <p:nvPr/>
+        </p:nvSpPr>
+        <p:spPr>
+          <a:xfrm>
+            <a:off x="7888638" y="3973256"/>
+            <a:ext cx="1785765" cy="623943"/>
+          </a:xfrm>
+          <a:prstGeom prst="roundRect">
+            <a:avLst/>
+          </a:prstGeom>
+        </p:spPr>
+        <p:style>
+          <a:lnRef idx="3">
+            <a:schemeClr val="lt1"/>
+          </a:lnRef>
+          <a:fillRef idx="1">
+            <a:schemeClr val="accent2"/>
+          </a:fillRef>
+          <a:effectRef idx="1">
+            <a:schemeClr val="accent2"/>
+          </a:effectRef>
+          <a:fontRef idx="minor">
+            <a:schemeClr val="lt1"/>
+          </a:fontRef>
+        </p:style>
+        <p:txBody>
+          <a:bodyPr rtlCol="1" anchor="ctr"/>
+          <a:lstStyle/>
+          <a:p>
+            <a:pPr algn="ctr"/>
+            <a:r>
+              <a:rPr lang="en-US" dirty="0"/>
+              <a:t>Classification</a:t>
+            </a:r>
+            <a:endParaRPr lang="he-IL" dirty="0"/>
+          </a:p>
+        </p:txBody>
+      </p:sp>
+      <p:sp>
+        <p:nvSpPr>
+          <p:cNvPr id="13" name="Rounded Rectangle 12"/>
+          <p:cNvSpPr/>
+          <p:nvPr/>
+        </p:nvSpPr>
+        <p:spPr>
+          <a:xfrm>
+            <a:off x="217340" y="3824288"/>
+            <a:ext cx="1775012" cy="623943"/>
+          </a:xfrm>
+          <a:prstGeom prst="roundRect">
+            <a:avLst/>
+          </a:prstGeom>
+          <a:ln>
+            <a:headEnd type="none" w="med" len="med"/>
+            <a:tailEnd type="none" w="med" len="med"/>
+          </a:ln>
+        </p:spPr>
+        <p:style>
+          <a:lnRef idx="2">
+            <a:schemeClr val="accent2">
+              <a:shade val="50000"/>
+            </a:schemeClr>
+          </a:lnRef>
+          <a:fillRef idx="1">
+            <a:schemeClr val="accent2"/>
+          </a:fillRef>
+          <a:effectRef idx="0">
+            <a:schemeClr val="accent2"/>
+          </a:effectRef>
+          <a:fontRef idx="minor">
+            <a:schemeClr val="lt1"/>
+          </a:fontRef>
+        </p:style>
+        <p:txBody>
+          <a:bodyPr rtlCol="1" anchor="ctr"/>
+          <a:lstStyle/>
+          <a:p>
+            <a:pPr algn="ctr"/>
+            <a:r>
+              <a:rPr lang="en-US" dirty="0"/>
+              <a:t>Model evaluation</a:t>
+            </a:r>
+            <a:endParaRPr lang="he-IL" dirty="0"/>
+          </a:p>
+        </p:txBody>
+      </p:sp>
+      <p:sp>
+        <p:nvSpPr>
+          <p:cNvPr id="15" name="Rounded Rectangle 14"/>
+          <p:cNvSpPr/>
+          <p:nvPr/>
+        </p:nvSpPr>
+        <p:spPr>
+          <a:xfrm>
+            <a:off x="9981917" y="3973255"/>
+            <a:ext cx="1785765" cy="623943"/>
+          </a:xfrm>
+          <a:prstGeom prst="roundRect">
+            <a:avLst/>
+          </a:prstGeom>
+        </p:spPr>
+        <p:style>
+          <a:lnRef idx="2">
+            <a:schemeClr val="accent2"/>
+          </a:lnRef>
+          <a:fillRef idx="1">
+            <a:schemeClr val="lt1"/>
+          </a:fillRef>
+          <a:effectRef idx="0">
+            <a:schemeClr val="accent2"/>
+          </a:effectRef>
+          <a:fontRef idx="minor">
+            <a:schemeClr val="dk1"/>
+          </a:fontRef>
+        </p:style>
+        <p:txBody>
+          <a:bodyPr rtlCol="1" anchor="ctr"/>
+          <a:lstStyle/>
+          <a:p>
+            <a:pPr algn="ctr"/>
+            <a:r>
+              <a:rPr lang="en-US" dirty="0"/>
+              <a:t>Regression</a:t>
+            </a:r>
+            <a:endParaRPr lang="he-IL" dirty="0"/>
+          </a:p>
+        </p:txBody>
+      </p:sp>
+      <p:sp>
+        <p:nvSpPr>
+          <p:cNvPr id="16" name="Rounded Rectangle 15"/>
+          <p:cNvSpPr/>
+          <p:nvPr/>
+        </p:nvSpPr>
+        <p:spPr>
+          <a:xfrm>
+            <a:off x="8663210" y="2935269"/>
+            <a:ext cx="1785765" cy="623943"/>
+          </a:xfrm>
+          <a:prstGeom prst="roundRect">
+            <a:avLst/>
+          </a:prstGeom>
+        </p:spPr>
+        <p:style>
+          <a:lnRef idx="3">
+            <a:schemeClr val="lt1"/>
+          </a:lnRef>
+          <a:fillRef idx="1">
+            <a:schemeClr val="accent2"/>
+          </a:fillRef>
+          <a:effectRef idx="1">
+            <a:schemeClr val="accent2"/>
+          </a:effectRef>
+          <a:fontRef idx="minor">
+            <a:schemeClr val="lt1"/>
+          </a:fontRef>
+        </p:style>
+        <p:txBody>
+          <a:bodyPr rtlCol="1" anchor="ctr"/>
+          <a:lstStyle/>
+          <a:p>
+            <a:pPr algn="ctr"/>
+            <a:r>
+              <a:rPr lang="en-US" dirty="0"/>
+              <a:t>Models</a:t>
+            </a:r>
+            <a:endParaRPr lang="he-IL" dirty="0"/>
+          </a:p>
+        </p:txBody>
+      </p:sp>
+      <p:sp>
+        <p:nvSpPr>
+          <p:cNvPr id="17" name="Rounded Rectangle 16"/>
+          <p:cNvSpPr/>
+          <p:nvPr/>
+        </p:nvSpPr>
+        <p:spPr>
+          <a:xfrm>
+            <a:off x="1430005" y="2935269"/>
+            <a:ext cx="1785765" cy="623943"/>
+          </a:xfrm>
+          <a:prstGeom prst="roundRect">
+            <a:avLst/>
+          </a:prstGeom>
+        </p:spPr>
+        <p:style>
+          <a:lnRef idx="2">
+            <a:schemeClr val="accent2"/>
+          </a:lnRef>
+          <a:fillRef idx="1">
+            <a:schemeClr val="lt1"/>
+          </a:fillRef>
+          <a:effectRef idx="0">
+            <a:schemeClr val="accent2"/>
+          </a:effectRef>
+          <a:fontRef idx="minor">
+            <a:schemeClr val="dk1"/>
+          </a:fontRef>
+        </p:style>
+        <p:txBody>
+          <a:bodyPr rtlCol="1" anchor="ctr"/>
+          <a:lstStyle/>
+          <a:p>
+            <a:pPr algn="ctr"/>
+            <a:r>
+              <a:rPr lang="en-US" dirty="0"/>
+              <a:t>Methods</a:t>
+            </a:r>
+            <a:endParaRPr lang="he-IL" dirty="0"/>
+          </a:p>
+        </p:txBody>
+      </p:sp>
+      <p:cxnSp>
+        <p:nvCxnSpPr>
+          <p:cNvPr id="23" name="Straight Arrow Connector 22"/>
+          <p:cNvCxnSpPr>
+            <a:stCxn id="6" idx="2"/>
+            <a:endCxn id="16" idx="0"/>
+          </p:cNvCxnSpPr>
+          <p:nvPr/>
+        </p:nvCxnSpPr>
+        <p:spPr>
+          <a:xfrm>
+            <a:off x="4265409" y="2624863"/>
+            <a:ext cx="5290684" cy="310406"/>
+          </a:xfrm>
+          <a:prstGeom prst="straightConnector1">
+            <a:avLst/>
+          </a:prstGeom>
+          <a:ln>
+            <a:tailEnd type="triangle"/>
+          </a:ln>
+        </p:spPr>
+        <p:style>
+          <a:lnRef idx="2">
+            <a:schemeClr val="dk1"/>
+          </a:lnRef>
+          <a:fillRef idx="0">
+            <a:schemeClr val="dk1"/>
+          </a:fillRef>
+          <a:effectRef idx="1">
+            <a:schemeClr val="dk1"/>
+          </a:effectRef>
+          <a:fontRef idx="minor">
+            <a:schemeClr val="tx1"/>
+          </a:fontRef>
+        </p:style>
+      </p:cxnSp>
+      <p:cxnSp>
+        <p:nvCxnSpPr>
+          <p:cNvPr id="25" name="Straight Arrow Connector 24"/>
+          <p:cNvCxnSpPr>
+            <a:stCxn id="16" idx="2"/>
+            <a:endCxn id="15" idx="0"/>
+          </p:cNvCxnSpPr>
+          <p:nvPr/>
+        </p:nvCxnSpPr>
+        <p:spPr>
+          <a:xfrm>
+            <a:off x="9556093" y="3559212"/>
+            <a:ext cx="1318707" cy="414043"/>
+          </a:xfrm>
+          <a:prstGeom prst="straightConnector1">
+            <a:avLst/>
+          </a:prstGeom>
+          <a:ln>
+            <a:tailEnd type="triangle"/>
+          </a:ln>
+        </p:spPr>
+        <p:style>
+          <a:lnRef idx="2">
+            <a:schemeClr val="dk1"/>
+          </a:lnRef>
+          <a:fillRef idx="0">
+            <a:schemeClr val="dk1"/>
+          </a:fillRef>
+          <a:effectRef idx="1">
+            <a:schemeClr val="dk1"/>
+          </a:effectRef>
+          <a:fontRef idx="minor">
+            <a:schemeClr val="tx1"/>
+          </a:fontRef>
+        </p:style>
+      </p:cxnSp>
+      <p:cxnSp>
+        <p:nvCxnSpPr>
+          <p:cNvPr id="39" name="Straight Arrow Connector 38"/>
+          <p:cNvCxnSpPr>
+            <a:stCxn id="6" idx="2"/>
+            <a:endCxn id="17" idx="0"/>
+          </p:cNvCxnSpPr>
+          <p:nvPr/>
+        </p:nvCxnSpPr>
+        <p:spPr>
+          <a:xfrm flipH="1">
+            <a:off x="2322888" y="2624863"/>
+            <a:ext cx="1942521" cy="310406"/>
+          </a:xfrm>
+          <a:prstGeom prst="straightConnector1">
+            <a:avLst/>
+          </a:prstGeom>
+          <a:ln>
+            <a:tailEnd type="triangle"/>
+          </a:ln>
+        </p:spPr>
+        <p:style>
+          <a:lnRef idx="2">
+            <a:schemeClr val="dk1"/>
+          </a:lnRef>
+          <a:fillRef idx="0">
+            <a:schemeClr val="dk1"/>
+          </a:fillRef>
+          <a:effectRef idx="1">
+            <a:schemeClr val="dk1"/>
+          </a:effectRef>
+          <a:fontRef idx="minor">
+            <a:schemeClr val="tx1"/>
+          </a:fontRef>
+        </p:style>
+      </p:cxnSp>
+      <p:cxnSp>
+        <p:nvCxnSpPr>
+          <p:cNvPr id="43" name="Straight Arrow Connector 42"/>
+          <p:cNvCxnSpPr>
+            <a:stCxn id="16" idx="2"/>
+            <a:endCxn id="8" idx="0"/>
+          </p:cNvCxnSpPr>
+          <p:nvPr/>
+        </p:nvCxnSpPr>
+        <p:spPr>
+          <a:xfrm flipH="1">
+            <a:off x="8781521" y="3559212"/>
+            <a:ext cx="774572" cy="414044"/>
+          </a:xfrm>
+          <a:prstGeom prst="straightConnector1">
+            <a:avLst/>
+          </a:prstGeom>
+          <a:ln>
+            <a:tailEnd type="triangle"/>
+          </a:ln>
+        </p:spPr>
+        <p:style>
+          <a:lnRef idx="2">
+            <a:schemeClr val="dk1"/>
+          </a:lnRef>
+          <a:fillRef idx="0">
+            <a:schemeClr val="dk1"/>
+          </a:fillRef>
+          <a:effectRef idx="1">
+            <a:schemeClr val="dk1"/>
+          </a:effectRef>
+          <a:fontRef idx="minor">
+            <a:schemeClr val="tx1"/>
+          </a:fontRef>
+        </p:style>
+      </p:cxnSp>
+      <p:cxnSp>
+        <p:nvCxnSpPr>
+          <p:cNvPr id="45" name="Straight Arrow Connector 44"/>
+          <p:cNvCxnSpPr>
+            <a:stCxn id="17" idx="2"/>
+            <a:endCxn id="13" idx="0"/>
+          </p:cNvCxnSpPr>
+          <p:nvPr/>
+        </p:nvCxnSpPr>
+        <p:spPr>
+          <a:xfrm flipH="1">
+            <a:off x="1104846" y="3559212"/>
+            <a:ext cx="1218042" cy="265076"/>
+          </a:xfrm>
+          <a:prstGeom prst="straightConnector1">
+            <a:avLst/>
+          </a:prstGeom>
+          <a:ln>
+            <a:tailEnd type="triangle"/>
+          </a:ln>
+        </p:spPr>
+        <p:style>
+          <a:lnRef idx="2">
+            <a:schemeClr val="dk1"/>
+          </a:lnRef>
+          <a:fillRef idx="0">
+            <a:schemeClr val="dk1"/>
+          </a:fillRef>
+          <a:effectRef idx="1">
+            <a:schemeClr val="dk1"/>
+          </a:effectRef>
+          <a:fontRef idx="minor">
+            <a:schemeClr val="tx1"/>
+          </a:fontRef>
+        </p:style>
+      </p:cxnSp>
+      <p:sp>
+        <p:nvSpPr>
+          <p:cNvPr id="46" name="Rounded Rectangle 45"/>
+          <p:cNvSpPr/>
+          <p:nvPr/>
+        </p:nvSpPr>
+        <p:spPr>
+          <a:xfrm>
+            <a:off x="4877806" y="3973256"/>
+            <a:ext cx="1785765" cy="623943"/>
+          </a:xfrm>
+          <a:prstGeom prst="roundRect">
+            <a:avLst/>
+          </a:prstGeom>
+        </p:spPr>
+        <p:style>
+          <a:lnRef idx="2">
+            <a:schemeClr val="accent2"/>
+          </a:lnRef>
+          <a:fillRef idx="1">
+            <a:schemeClr val="lt1"/>
+          </a:fillRef>
+          <a:effectRef idx="0">
+            <a:schemeClr val="accent2"/>
+          </a:effectRef>
+          <a:fontRef idx="minor">
+            <a:schemeClr val="dk1"/>
+          </a:fontRef>
+        </p:style>
+        <p:txBody>
+          <a:bodyPr rtlCol="1" anchor="ctr"/>
+          <a:lstStyle/>
+          <a:p>
+            <a:pPr algn="ctr"/>
+            <a:r>
+              <a:rPr lang="en-US" dirty="0"/>
+              <a:t>Linear methods</a:t>
+            </a:r>
+            <a:endParaRPr lang="he-IL" dirty="0"/>
+          </a:p>
+        </p:txBody>
+      </p:sp>
+      <p:sp>
+        <p:nvSpPr>
+          <p:cNvPr id="48" name="Rounded Rectangle 47"/>
+          <p:cNvSpPr/>
+          <p:nvPr/>
+        </p:nvSpPr>
+        <p:spPr>
+          <a:xfrm>
+            <a:off x="5758750" y="5021472"/>
+            <a:ext cx="1785765" cy="623943"/>
+          </a:xfrm>
+          <a:prstGeom prst="roundRect">
+            <a:avLst/>
+          </a:prstGeom>
+        </p:spPr>
+        <p:style>
+          <a:lnRef idx="2">
+            <a:schemeClr val="accent2"/>
+          </a:lnRef>
+          <a:fillRef idx="1">
+            <a:schemeClr val="lt1"/>
+          </a:fillRef>
+          <a:effectRef idx="0">
+            <a:schemeClr val="accent2"/>
+          </a:effectRef>
+          <a:fontRef idx="minor">
+            <a:schemeClr val="dk1"/>
+          </a:fontRef>
+        </p:style>
+        <p:txBody>
+          <a:bodyPr rtlCol="1" anchor="ctr"/>
+          <a:lstStyle/>
+          <a:p>
+            <a:pPr algn="ctr"/>
+            <a:r>
+              <a:rPr lang="en-US" dirty="0"/>
+              <a:t>Logistic regression</a:t>
+            </a:r>
+            <a:endParaRPr lang="he-IL" dirty="0"/>
+          </a:p>
+        </p:txBody>
+      </p:sp>
+      <p:sp>
+        <p:nvSpPr>
+          <p:cNvPr id="49" name="Rounded Rectangle 48"/>
+          <p:cNvSpPr/>
+          <p:nvPr/>
+        </p:nvSpPr>
+        <p:spPr>
+          <a:xfrm>
+            <a:off x="3807288" y="5032624"/>
+            <a:ext cx="1785765" cy="623943"/>
+          </a:xfrm>
+          <a:prstGeom prst="roundRect">
+            <a:avLst/>
+          </a:prstGeom>
+        </p:spPr>
+        <p:style>
+          <a:lnRef idx="2">
+            <a:schemeClr val="accent2"/>
+          </a:lnRef>
+          <a:fillRef idx="1">
+            <a:schemeClr val="lt1"/>
+          </a:fillRef>
+          <a:effectRef idx="0">
+            <a:schemeClr val="accent2"/>
+          </a:effectRef>
+          <a:fontRef idx="minor">
+            <a:schemeClr val="dk1"/>
+          </a:fontRef>
+        </p:style>
+        <p:txBody>
+          <a:bodyPr rtlCol="1" anchor="ctr"/>
+          <a:lstStyle/>
+          <a:p>
+            <a:pPr algn="ctr"/>
+            <a:r>
+              <a:rPr lang="en-US" dirty="0"/>
+              <a:t>Discriminant Analysis</a:t>
+            </a:r>
+            <a:endParaRPr lang="he-IL" dirty="0"/>
+          </a:p>
+        </p:txBody>
+      </p:sp>
+      <p:sp>
+        <p:nvSpPr>
+          <p:cNvPr id="54" name="Rounded Rectangle 53"/>
+          <p:cNvSpPr/>
+          <p:nvPr/>
+        </p:nvSpPr>
+        <p:spPr>
+          <a:xfrm>
+            <a:off x="7866332" y="5021472"/>
+            <a:ext cx="2069405" cy="623943"/>
+          </a:xfrm>
+          <a:prstGeom prst="roundRect">
+            <a:avLst/>
+          </a:prstGeom>
+        </p:spPr>
+        <p:style>
+          <a:lnRef idx="3">
+            <a:schemeClr val="lt1"/>
+          </a:lnRef>
+          <a:fillRef idx="1">
+            <a:schemeClr val="accent5"/>
+          </a:fillRef>
+          <a:effectRef idx="1">
+            <a:schemeClr val="accent5"/>
+          </a:effectRef>
+          <a:fontRef idx="minor">
+            <a:schemeClr val="lt1"/>
+          </a:fontRef>
+        </p:style>
+        <p:txBody>
+          <a:bodyPr rtlCol="1" anchor="ctr"/>
+          <a:lstStyle/>
+          <a:p>
+            <a:pPr algn="ctr"/>
+            <a:r>
+              <a:rPr lang="en-US" dirty="0"/>
+              <a:t>Support Vector Machines (SVM)</a:t>
+            </a:r>
+            <a:endParaRPr lang="he-IL" dirty="0"/>
+          </a:p>
+        </p:txBody>
+      </p:sp>
+      <p:cxnSp>
+        <p:nvCxnSpPr>
+          <p:cNvPr id="53" name="Straight Arrow Connector 52"/>
+          <p:cNvCxnSpPr>
+            <a:stCxn id="8" idx="2"/>
+            <a:endCxn id="54" idx="0"/>
+          </p:cNvCxnSpPr>
+          <p:nvPr/>
+        </p:nvCxnSpPr>
+        <p:spPr>
+          <a:xfrm>
+            <a:off x="8781521" y="4597199"/>
+            <a:ext cx="119514" cy="424273"/>
+          </a:xfrm>
+          <a:prstGeom prst="straightConnector1">
+            <a:avLst/>
+          </a:prstGeom>
+          <a:ln>
+            <a:tailEnd type="triangle"/>
+          </a:ln>
+        </p:spPr>
+        <p:style>
+          <a:lnRef idx="2">
+            <a:schemeClr val="dk1"/>
+          </a:lnRef>
+          <a:fillRef idx="0">
+            <a:schemeClr val="dk1"/>
+          </a:fillRef>
+          <a:effectRef idx="1">
+            <a:schemeClr val="dk1"/>
+          </a:effectRef>
+          <a:fontRef idx="minor">
+            <a:schemeClr val="tx1"/>
+          </a:fontRef>
+        </p:style>
+      </p:cxnSp>
+      <p:cxnSp>
+        <p:nvCxnSpPr>
+          <p:cNvPr id="57" name="Straight Arrow Connector 56"/>
+          <p:cNvCxnSpPr>
+            <a:stCxn id="8" idx="1"/>
+            <a:endCxn id="46" idx="3"/>
+          </p:cNvCxnSpPr>
+          <p:nvPr/>
+        </p:nvCxnSpPr>
+        <p:spPr>
+          <a:xfrm flipH="1">
+            <a:off x="6663571" y="4285228"/>
+            <a:ext cx="1225067" cy="0"/>
+          </a:xfrm>
+          <a:prstGeom prst="straightConnector1">
+            <a:avLst/>
+          </a:prstGeom>
+          <a:ln>
+            <a:tailEnd type="triangle"/>
+          </a:ln>
+        </p:spPr>
+        <p:style>
+          <a:lnRef idx="2">
+            <a:schemeClr val="dk1"/>
+          </a:lnRef>
+          <a:fillRef idx="0">
+            <a:schemeClr val="dk1"/>
+          </a:fillRef>
+          <a:effectRef idx="1">
+            <a:schemeClr val="dk1"/>
+          </a:effectRef>
+          <a:fontRef idx="minor">
+            <a:schemeClr val="tx1"/>
+          </a:fontRef>
+        </p:style>
+      </p:cxnSp>
+      <p:cxnSp>
+        <p:nvCxnSpPr>
+          <p:cNvPr id="60" name="Straight Arrow Connector 59"/>
+          <p:cNvCxnSpPr>
+            <a:stCxn id="46" idx="2"/>
+            <a:endCxn id="48" idx="0"/>
+          </p:cNvCxnSpPr>
+          <p:nvPr/>
+        </p:nvCxnSpPr>
+        <p:spPr>
+          <a:xfrm>
+            <a:off x="5770689" y="4597199"/>
+            <a:ext cx="880944" cy="424273"/>
+          </a:xfrm>
+          <a:prstGeom prst="straightConnector1">
+            <a:avLst/>
+          </a:prstGeom>
+          <a:ln>
+            <a:tailEnd type="triangle"/>
+          </a:ln>
+        </p:spPr>
+        <p:style>
+          <a:lnRef idx="2">
+            <a:schemeClr val="dk1"/>
+          </a:lnRef>
+          <a:fillRef idx="0">
+            <a:schemeClr val="dk1"/>
+          </a:fillRef>
+          <a:effectRef idx="1">
+            <a:schemeClr val="dk1"/>
+          </a:effectRef>
+          <a:fontRef idx="minor">
+            <a:schemeClr val="tx1"/>
+          </a:fontRef>
+        </p:style>
+      </p:cxnSp>
+      <p:cxnSp>
+        <p:nvCxnSpPr>
+          <p:cNvPr id="63" name="Straight Arrow Connector 62"/>
+          <p:cNvCxnSpPr>
+            <a:stCxn id="46" idx="2"/>
+            <a:endCxn id="49" idx="0"/>
+          </p:cNvCxnSpPr>
+          <p:nvPr/>
+        </p:nvCxnSpPr>
+        <p:spPr>
+          <a:xfrm flipH="1">
+            <a:off x="4700171" y="4597199"/>
+            <a:ext cx="1070518" cy="435425"/>
+          </a:xfrm>
+          <a:prstGeom prst="straightConnector1">
+            <a:avLst/>
+          </a:prstGeom>
+          <a:ln>
+            <a:tailEnd type="triangle"/>
+          </a:ln>
+        </p:spPr>
+        <p:style>
+          <a:lnRef idx="2">
+            <a:schemeClr val="dk1"/>
+          </a:lnRef>
+          <a:fillRef idx="0">
+            <a:schemeClr val="dk1"/>
+          </a:fillRef>
+          <a:effectRef idx="1">
+            <a:schemeClr val="dk1"/>
+          </a:effectRef>
+          <a:fontRef idx="minor">
+            <a:schemeClr val="tx1"/>
+          </a:fontRef>
+        </p:style>
+      </p:cxnSp>
+      <p:cxnSp>
+        <p:nvCxnSpPr>
+          <p:cNvPr id="69" name="Elbow Connector 68"/>
+          <p:cNvCxnSpPr>
+            <a:stCxn id="49" idx="2"/>
+            <a:endCxn id="54" idx="2"/>
+          </p:cNvCxnSpPr>
+          <p:nvPr/>
+        </p:nvCxnSpPr>
+        <p:spPr>
+          <a:xfrm rot="5400000" flipH="1" flipV="1">
+            <a:off x="6795027" y="3550559"/>
+            <a:ext cx="11152" cy="4200864"/>
+          </a:xfrm>
+          <a:prstGeom prst="bentConnector3">
+            <a:avLst>
+              <a:gd name="adj1" fmla="val -3749740"/>
+            </a:avLst>
+          </a:prstGeom>
+          <a:ln w="9525" cap="flat" cmpd="sng" algn="ctr">
+            <a:solidFill>
+              <a:schemeClr val="dk1"/>
+            </a:solidFill>
+            <a:prstDash val="dash"/>
+            <a:round/>
+            <a:headEnd type="none" w="med" len="med"/>
+            <a:tailEnd type="arrow" w="med" len="med"/>
+          </a:ln>
+        </p:spPr>
+        <p:style>
+          <a:lnRef idx="0">
+            <a:scrgbClr r="0" g="0" b="0"/>
+          </a:lnRef>
+          <a:fillRef idx="0">
+            <a:scrgbClr r="0" g="0" b="0"/>
+          </a:fillRef>
+          <a:effectRef idx="0">
+            <a:scrgbClr r="0" g="0" b="0"/>
+          </a:effectRef>
+          <a:fontRef idx="minor">
+            <a:schemeClr val="tx1"/>
+          </a:fontRef>
+        </p:style>
+      </p:cxnSp>
+      <p:sp>
+        <p:nvSpPr>
+          <p:cNvPr id="31" name="Rounded Rectangle 30"/>
+          <p:cNvSpPr/>
+          <p:nvPr/>
+        </p:nvSpPr>
+        <p:spPr>
+          <a:xfrm>
+            <a:off x="2391828" y="3824288"/>
+            <a:ext cx="1775012" cy="623943"/>
+          </a:xfrm>
+          <a:prstGeom prst="roundRect">
+            <a:avLst/>
+          </a:prstGeom>
+          <a:ln>
+            <a:headEnd type="none" w="med" len="med"/>
+            <a:tailEnd type="none" w="med" len="med"/>
+          </a:ln>
+        </p:spPr>
+        <p:style>
+          <a:lnRef idx="2">
+            <a:schemeClr val="accent2"/>
+          </a:lnRef>
+          <a:fillRef idx="1">
+            <a:schemeClr val="lt1"/>
+          </a:fillRef>
+          <a:effectRef idx="0">
+            <a:schemeClr val="accent2"/>
+          </a:effectRef>
+          <a:fontRef idx="minor">
+            <a:schemeClr val="dk1"/>
+          </a:fontRef>
+        </p:style>
+        <p:txBody>
+          <a:bodyPr rtlCol="1" anchor="ctr"/>
+          <a:lstStyle/>
+          <a:p>
+            <a:pPr algn="ctr"/>
+            <a:r>
+              <a:rPr lang="en-US" dirty="0"/>
+              <a:t>ROC/AUC</a:t>
+            </a:r>
+            <a:endParaRPr lang="he-IL" dirty="0"/>
+          </a:p>
+        </p:txBody>
+      </p:sp>
+      <p:cxnSp>
+        <p:nvCxnSpPr>
+          <p:cNvPr id="10" name="Straight Arrow Connector 9"/>
+          <p:cNvCxnSpPr>
+            <a:stCxn id="13" idx="3"/>
+            <a:endCxn id="31" idx="1"/>
+          </p:cNvCxnSpPr>
+          <p:nvPr/>
+        </p:nvCxnSpPr>
+        <p:spPr>
+          <a:xfrm>
+            <a:off x="1992352" y="4136260"/>
+            <a:ext cx="399476" cy="0"/>
+          </a:xfrm>
+          <a:prstGeom prst="straightConnector1">
+            <a:avLst/>
+          </a:prstGeom>
+          <a:ln>
+            <a:tailEnd type="triangle"/>
+          </a:ln>
+        </p:spPr>
+        <p:style>
+          <a:lnRef idx="2">
+            <a:schemeClr val="dk1"/>
+          </a:lnRef>
+          <a:fillRef idx="0">
+            <a:schemeClr val="dk1"/>
+          </a:fillRef>
+          <a:effectRef idx="1">
+            <a:schemeClr val="dk1"/>
+          </a:effectRef>
+          <a:fontRef idx="minor">
+            <a:schemeClr val="tx1"/>
+          </a:fontRef>
+        </p:style>
+      </p:cxnSp>
+      <p:sp>
+        <p:nvSpPr>
+          <p:cNvPr id="36" name="Rounded Rectangle 35"/>
+          <p:cNvSpPr/>
+          <p:nvPr/>
+        </p:nvSpPr>
+        <p:spPr>
+          <a:xfrm>
+            <a:off x="10053949" y="5021472"/>
+            <a:ext cx="2069405" cy="623943"/>
+          </a:xfrm>
+          <a:prstGeom prst="roundRect">
+            <a:avLst/>
+          </a:prstGeom>
+        </p:spPr>
+        <p:style>
+          <a:lnRef idx="3">
+            <a:schemeClr val="lt1"/>
+          </a:lnRef>
+          <a:fillRef idx="1">
+            <a:schemeClr val="accent2"/>
+          </a:fillRef>
+          <a:effectRef idx="1">
+            <a:schemeClr val="accent2"/>
+          </a:effectRef>
+          <a:fontRef idx="minor">
+            <a:schemeClr val="lt1"/>
+          </a:fontRef>
+        </p:style>
+        <p:txBody>
+          <a:bodyPr rtlCol="1" anchor="ctr"/>
+          <a:lstStyle/>
+          <a:p>
+            <a:pPr algn="ctr"/>
+            <a:r>
+              <a:rPr lang="en-US" b="1" dirty="0"/>
+              <a:t>Trees</a:t>
+            </a:r>
+            <a:r>
+              <a:rPr lang="en-US" dirty="0"/>
+              <a:t>, </a:t>
+            </a:r>
+            <a:r>
+              <a:rPr lang="en-US" strike="sngStrike" dirty="0"/>
+              <a:t>Forests, Boosting, etc.</a:t>
+            </a:r>
+            <a:endParaRPr lang="he-IL" strike="sngStrike" dirty="0"/>
+          </a:p>
+        </p:txBody>
+      </p:sp>
+      <p:cxnSp>
+        <p:nvCxnSpPr>
+          <p:cNvPr id="18" name="Straight Arrow Connector 17"/>
+          <p:cNvCxnSpPr>
+            <a:stCxn id="8" idx="2"/>
+            <a:endCxn id="36" idx="0"/>
+          </p:cNvCxnSpPr>
+          <p:nvPr/>
+        </p:nvCxnSpPr>
+        <p:spPr>
+          <a:xfrm>
+            <a:off x="8781521" y="4597199"/>
+            <a:ext cx="2307131" cy="424273"/>
+          </a:xfrm>
+          <a:prstGeom prst="straightConnector1">
+            <a:avLst/>
+          </a:prstGeom>
+          <a:ln>
+            <a:tailEnd type="triangle"/>
+          </a:ln>
+        </p:spPr>
+        <p:style>
+          <a:lnRef idx="2">
+            <a:schemeClr val="dk1"/>
+          </a:lnRef>
+          <a:fillRef idx="0">
+            <a:schemeClr val="dk1"/>
+          </a:fillRef>
+          <a:effectRef idx="1">
+            <a:schemeClr val="dk1"/>
+          </a:effectRef>
+          <a:fontRef idx="minor">
+            <a:schemeClr val="tx1"/>
+          </a:fontRef>
+        </p:style>
+      </p:cxnSp>
+      <p:sp>
+        <p:nvSpPr>
+          <p:cNvPr id="37" name="Rounded Rectangle 36"/>
+          <p:cNvSpPr/>
+          <p:nvPr/>
+        </p:nvSpPr>
+        <p:spPr>
+          <a:xfrm>
+            <a:off x="217340" y="4756769"/>
+            <a:ext cx="1775012" cy="623943"/>
+          </a:xfrm>
+          <a:prstGeom prst="roundRect">
+            <a:avLst/>
+          </a:prstGeom>
+          <a:ln>
+            <a:headEnd type="none" w="med" len="med"/>
+            <a:tailEnd type="none" w="med" len="med"/>
+          </a:ln>
+        </p:spPr>
+        <p:style>
+          <a:lnRef idx="3">
+            <a:schemeClr val="lt1"/>
+          </a:lnRef>
+          <a:fillRef idx="1">
+            <a:schemeClr val="accent5"/>
+          </a:fillRef>
+          <a:effectRef idx="1">
+            <a:schemeClr val="accent5"/>
+          </a:effectRef>
+          <a:fontRef idx="minor">
+            <a:schemeClr val="lt1"/>
+          </a:fontRef>
+        </p:style>
+        <p:txBody>
+          <a:bodyPr rtlCol="1" anchor="ctr"/>
+          <a:lstStyle/>
+          <a:p>
+            <a:pPr algn="ctr"/>
+            <a:r>
+              <a:rPr lang="en-US" dirty="0"/>
+              <a:t>Cross validation</a:t>
+            </a:r>
+            <a:endParaRPr lang="he-IL" dirty="0"/>
+          </a:p>
+        </p:txBody>
+      </p:sp>
+      <p:cxnSp>
+        <p:nvCxnSpPr>
+          <p:cNvPr id="12" name="Straight Arrow Connector 11"/>
+          <p:cNvCxnSpPr>
+            <a:stCxn id="13" idx="2"/>
+            <a:endCxn id="37" idx="0"/>
+          </p:cNvCxnSpPr>
+          <p:nvPr/>
+        </p:nvCxnSpPr>
+        <p:spPr>
+          <a:xfrm>
+            <a:off x="1104846" y="4448231"/>
+            <a:ext cx="0" cy="308538"/>
+          </a:xfrm>
+          <a:prstGeom prst="straightConnector1">
+            <a:avLst/>
+          </a:prstGeom>
+          <a:ln>
+            <a:tailEnd type="triangle"/>
+          </a:ln>
+        </p:spPr>
+        <p:style>
+          <a:lnRef idx="2">
+            <a:schemeClr val="dk1"/>
+          </a:lnRef>
+          <a:fillRef idx="0">
+            <a:schemeClr val="dk1"/>
+          </a:fillRef>
+          <a:effectRef idx="1">
+            <a:schemeClr val="dk1"/>
+          </a:effectRef>
+          <a:fontRef idx="minor">
+            <a:schemeClr val="tx1"/>
+          </a:fontRef>
+        </p:style>
+      </p:cxnSp>
+      <p:sp>
+        <p:nvSpPr>
+          <p:cNvPr id="42" name="Rounded Rectangle 41"/>
+          <p:cNvSpPr/>
+          <p:nvPr/>
+        </p:nvSpPr>
+        <p:spPr>
+          <a:xfrm>
+            <a:off x="225579" y="5735170"/>
+            <a:ext cx="1183092" cy="492640"/>
+          </a:xfrm>
+          <a:prstGeom prst="roundRect">
+            <a:avLst/>
+          </a:prstGeom>
+          <a:ln>
+            <a:headEnd type="none" w="med" len="med"/>
+            <a:tailEnd type="none" w="med" len="med"/>
+          </a:ln>
+        </p:spPr>
+        <p:style>
+          <a:lnRef idx="3">
+            <a:schemeClr val="lt1"/>
+          </a:lnRef>
+          <a:fillRef idx="1">
+            <a:schemeClr val="accent5"/>
+          </a:fillRef>
+          <a:effectRef idx="1">
+            <a:schemeClr val="accent5"/>
+          </a:effectRef>
+          <a:fontRef idx="minor">
+            <a:schemeClr val="lt1"/>
+          </a:fontRef>
+        </p:style>
+        <p:txBody>
+          <a:bodyPr rtlCol="1" anchor="ctr"/>
+          <a:lstStyle/>
+          <a:p>
+            <a:pPr algn="ctr"/>
+            <a:r>
+              <a:rPr lang="en-US" sz="1400" dirty="0"/>
+              <a:t>k-fold </a:t>
+            </a:r>
+            <a:r>
+              <a:rPr lang="en-US" sz="1400" dirty="0" err="1"/>
+              <a:t>xval</a:t>
+            </a:r>
+            <a:endParaRPr lang="he-IL" sz="1400" dirty="0"/>
+          </a:p>
+        </p:txBody>
+      </p:sp>
+      <p:sp>
+        <p:nvSpPr>
+          <p:cNvPr id="44" name="Rounded Rectangle 43"/>
+          <p:cNvSpPr/>
+          <p:nvPr/>
+        </p:nvSpPr>
+        <p:spPr>
+          <a:xfrm>
+            <a:off x="1482811" y="5735170"/>
+            <a:ext cx="1466334" cy="492640"/>
+          </a:xfrm>
+          <a:prstGeom prst="roundRect">
+            <a:avLst/>
+          </a:prstGeom>
+          <a:ln>
+            <a:headEnd type="none" w="med" len="med"/>
+            <a:tailEnd type="none" w="med" len="med"/>
+          </a:ln>
+        </p:spPr>
+        <p:style>
+          <a:lnRef idx="3">
+            <a:schemeClr val="lt1"/>
+          </a:lnRef>
+          <a:fillRef idx="1">
+            <a:schemeClr val="accent5"/>
+          </a:fillRef>
+          <a:effectRef idx="1">
+            <a:schemeClr val="accent5"/>
+          </a:effectRef>
+          <a:fontRef idx="minor">
+            <a:schemeClr val="lt1"/>
+          </a:fontRef>
+        </p:style>
+        <p:txBody>
+          <a:bodyPr rtlCol="1" anchor="ctr"/>
+          <a:lstStyle/>
+          <a:p>
+            <a:pPr algn="ctr"/>
+            <a:r>
+              <a:rPr lang="en-US" sz="1400" dirty="0"/>
+              <a:t>Leave one out</a:t>
+            </a:r>
+            <a:endParaRPr lang="he-IL" sz="1400" dirty="0"/>
+          </a:p>
+        </p:txBody>
+      </p:sp>
+      <p:cxnSp>
+        <p:nvCxnSpPr>
+          <p:cNvPr id="24" name="Straight Arrow Connector 23"/>
+          <p:cNvCxnSpPr>
+            <a:stCxn id="37" idx="2"/>
+            <a:endCxn id="42" idx="0"/>
+          </p:cNvCxnSpPr>
+          <p:nvPr/>
+        </p:nvCxnSpPr>
+        <p:spPr>
+          <a:xfrm flipH="1">
+            <a:off x="817125" y="5380712"/>
+            <a:ext cx="287721" cy="354458"/>
+          </a:xfrm>
+          <a:prstGeom prst="straightConnector1">
+            <a:avLst/>
+          </a:prstGeom>
+          <a:ln>
+            <a:tailEnd type="triangle"/>
+          </a:ln>
+        </p:spPr>
+        <p:style>
+          <a:lnRef idx="2">
+            <a:schemeClr val="dk1"/>
+          </a:lnRef>
+          <a:fillRef idx="0">
+            <a:schemeClr val="dk1"/>
+          </a:fillRef>
+          <a:effectRef idx="1">
+            <a:schemeClr val="dk1"/>
+          </a:effectRef>
+          <a:fontRef idx="minor">
+            <a:schemeClr val="tx1"/>
+          </a:fontRef>
+        </p:style>
+      </p:cxnSp>
+      <p:cxnSp>
+        <p:nvCxnSpPr>
+          <p:cNvPr id="27" name="Straight Arrow Connector 26"/>
+          <p:cNvCxnSpPr>
+            <a:stCxn id="37" idx="2"/>
+            <a:endCxn id="44" idx="0"/>
+          </p:cNvCxnSpPr>
+          <p:nvPr/>
+        </p:nvCxnSpPr>
+        <p:spPr>
+          <a:xfrm>
+            <a:off x="1104846" y="5380712"/>
+            <a:ext cx="1111132" cy="354458"/>
+          </a:xfrm>
+          <a:prstGeom prst="straightConnector1">
+            <a:avLst/>
+          </a:prstGeom>
+          <a:ln>
+            <a:tailEnd type="triangle"/>
+          </a:ln>
+        </p:spPr>
+        <p:style>
+          <a:lnRef idx="2">
+            <a:schemeClr val="dk1"/>
+          </a:lnRef>
+          <a:fillRef idx="0">
+            <a:schemeClr val="dk1"/>
+          </a:fillRef>
+          <a:effectRef idx="1">
+            <a:schemeClr val="dk1"/>
+          </a:effectRef>
+          <a:fontRef idx="minor">
+            <a:schemeClr val="tx1"/>
+          </a:fontRef>
+        </p:style>
+      </p:cxnSp>
+    </p:spTree>
+    <p:extLst>
+      <p:ext uri="{BB962C8B-B14F-4D97-AF65-F5344CB8AC3E}">
+        <p14:creationId xmlns:p14="http://schemas.microsoft.com/office/powerpoint/2010/main" val="601734684"/>
+      </p:ext>
+    </p:extLst>
+  </p:cSld>
+  <p:clrMapOvr>
+    <a:masterClrMapping/>
+  </p:clrMapOvr>
+  <p:timing>
+    <p:tnLst>
+      <p:par>
+        <p:cTn id="1" dur="indefinite" restart="never" nodeType="tmRoot"/>
+      </p:par>
+    </p:tnLst>
+  </p:timing>
+</p:sld>
+</file>
+
+<file path=ppt/slides/slide22.xml><?xml version="1.0" encoding="utf-8"?>
+<p:sld xmlns:a="http://schemas.openxmlformats.org/drawingml/2006/main" xmlns:r="http://schemas.openxmlformats.org/officeDocument/2006/relationships" xmlns:p="http://schemas.openxmlformats.org/presentationml/2006/main">
+  <p:cSld>
+    <p:spTree>
+      <p:nvGrpSpPr>
+        <p:cNvPr id="1" name=""/>
+        <p:cNvGrpSpPr/>
+        <p:nvPr/>
+      </p:nvGrpSpPr>
+      <p:grpSpPr>
+        <a:xfrm>
+          <a:off x="0" y="0"/>
+          <a:ext cx="0" cy="0"/>
+          <a:chOff x="0" y="0"/>
+          <a:chExt cx="0" cy="0"/>
+        </a:xfrm>
+      </p:grpSpPr>
+      <p:sp>
+        <p:nvSpPr>
+          <p:cNvPr id="2" name="Title 1"/>
+          <p:cNvSpPr>
+            <a:spLocks noGrp="1"/>
+          </p:cNvSpPr>
+          <p:nvPr>
+            <p:ph type="title"/>
+          </p:nvPr>
+        </p:nvSpPr>
+        <p:spPr/>
+        <p:txBody>
+          <a:bodyPr/>
+          <a:lstStyle/>
+          <a:p>
+            <a:r>
+              <a:rPr lang="en-US" dirty="0"/>
               <a:t>Classification and Regression Trees</a:t>
             </a:r>
             <a:endParaRPr lang="he-IL" dirty="0"/>
@@ -11350,7 +14279,7 @@
             <a:fld id="{4FAB73BC-B049-4115-A692-8D63A059BFB8}" type="slidenum">
               <a:rPr lang="en-US" smtClean="0"/>
               <a:pPr/>
-              <a:t>20</a:t>
+              <a:t>22</a:t>
             </a:fld>
             <a:endParaRPr lang="en-US" dirty="0"/>
           </a:p>
@@ -11369,7 +14298,7 @@
 </p:sld>
 </file>
 
-<file path=ppt/slides/slide21.xml><?xml version="1.0" encoding="utf-8"?>
+<file path=ppt/slides/slide23.xml><?xml version="1.0" encoding="utf-8"?>
 <p:sld xmlns:a="http://schemas.openxmlformats.org/drawingml/2006/main" xmlns:r="http://schemas.openxmlformats.org/officeDocument/2006/relationships" xmlns:p="http://schemas.openxmlformats.org/presentationml/2006/main">
   <p:cSld>
     <p:spTree>
@@ -11534,7 +14463,7 @@
             <a:fld id="{4FAB73BC-B049-4115-A692-8D63A059BFB8}" type="slidenum">
               <a:rPr lang="en-US" smtClean="0"/>
               <a:pPr/>
-              <a:t>21</a:t>
+              <a:t>23</a:t>
             </a:fld>
             <a:endParaRPr lang="en-US" dirty="0"/>
           </a:p>
@@ -11553,7 +14482,7 @@
 </p:sld>
 </file>
 
-<file path=ppt/slides/slide22.xml><?xml version="1.0" encoding="utf-8"?>
+<file path=ppt/slides/slide24.xml><?xml version="1.0" encoding="utf-8"?>
 <p:sld xmlns:a="http://schemas.openxmlformats.org/drawingml/2006/main" xmlns:r="http://schemas.openxmlformats.org/officeDocument/2006/relationships" xmlns:p="http://schemas.openxmlformats.org/presentationml/2006/main">
   <p:cSld>
     <p:spTree>
@@ -11651,7 +14580,7 @@
           <a:p>
             <a:fld id="{4FAB73BC-B049-4115-A692-8D63A059BFB8}" type="slidenum">
               <a:rPr lang="en-US" smtClean="0"/>
-              <a:t>22</a:t>
+              <a:t>24</a:t>
             </a:fld>
             <a:endParaRPr lang="en-US" dirty="0"/>
           </a:p>
@@ -11701,8 +14630,8 @@
           </a:p>
         </p:txBody>
       </p:sp>
-      <mc:AlternateContent xmlns:mc="http://schemas.openxmlformats.org/markup-compatibility/2006">
-        <mc:Choice xmlns:a14="http://schemas.microsoft.com/office/drawing/2010/main" Requires="a14">
+      <mc:AlternateContent xmlns:mc="http://schemas.openxmlformats.org/markup-compatibility/2006" xmlns:a14="http://schemas.microsoft.com/office/drawing/2010/main">
+        <mc:Choice Requires="a14">
           <p:sp>
             <p:nvSpPr>
               <p:cNvPr id="7" name="TextBox 6">
@@ -11766,7 +14695,7 @@
             </p:txBody>
           </p:sp>
         </mc:Choice>
-        <mc:Fallback>
+        <mc:Fallback xmlns="">
           <p:sp>
             <p:nvSpPr>
               <p:cNvPr id="7" name="TextBox 6">
@@ -11847,8 +14776,8 @@
           </a:p>
         </p:txBody>
       </p:sp>
-      <mc:AlternateContent xmlns:mc="http://schemas.openxmlformats.org/markup-compatibility/2006">
-        <mc:Choice xmlns:a14="http://schemas.microsoft.com/office/drawing/2010/main" Requires="a14">
+      <mc:AlternateContent xmlns:mc="http://schemas.openxmlformats.org/markup-compatibility/2006" xmlns:a14="http://schemas.microsoft.com/office/drawing/2010/main">
+        <mc:Choice Requires="a14">
           <p:sp>
             <p:nvSpPr>
               <p:cNvPr id="9" name="TextBox 8">
@@ -11877,6 +14806,7 @@
               </a:bodyPr>
               <a:lstStyle/>
               <a:p>
+                <a:pPr/>
                 <a14:m>
                   <m:oMathPara xmlns:m="http://schemas.openxmlformats.org/officeDocument/2006/math">
                     <m:oMathParaPr>
@@ -11916,7 +14846,7 @@
             </p:txBody>
           </p:sp>
         </mc:Choice>
-        <mc:Fallback>
+        <mc:Fallback xmlns="">
           <p:sp>
             <p:nvSpPr>
               <p:cNvPr id="9" name="TextBox 8">
@@ -11961,8 +14891,8 @@
           </p:sp>
         </mc:Fallback>
       </mc:AlternateContent>
-      <mc:AlternateContent xmlns:mc="http://schemas.openxmlformats.org/markup-compatibility/2006">
-        <mc:Choice xmlns:a14="http://schemas.microsoft.com/office/drawing/2010/main" Requires="a14">
+      <mc:AlternateContent xmlns:mc="http://schemas.openxmlformats.org/markup-compatibility/2006" xmlns:a14="http://schemas.microsoft.com/office/drawing/2010/main">
+        <mc:Choice Requires="a14">
           <p:sp>
             <p:nvSpPr>
               <p:cNvPr id="10" name="TextBox 9">
@@ -11991,6 +14921,7 @@
               </a:bodyPr>
               <a:lstStyle/>
               <a:p>
+                <a:pPr/>
                 <a14:m>
                   <m:oMathPara xmlns:m="http://schemas.openxmlformats.org/officeDocument/2006/math">
                     <m:oMathParaPr>
@@ -12030,7 +14961,7 @@
             </p:txBody>
           </p:sp>
         </mc:Choice>
-        <mc:Fallback>
+        <mc:Fallback xmlns="">
           <p:sp>
             <p:nvSpPr>
               <p:cNvPr id="10" name="TextBox 9">
@@ -12693,8 +15624,8 @@
             <a:chExt cx="4830941" cy="369332"/>
           </a:xfrm>
         </p:grpSpPr>
-        <mc:AlternateContent xmlns:mc="http://schemas.openxmlformats.org/markup-compatibility/2006">
-          <mc:Choice xmlns:a14="http://schemas.microsoft.com/office/drawing/2010/main" Requires="a14">
+        <mc:AlternateContent xmlns:mc="http://schemas.openxmlformats.org/markup-compatibility/2006" xmlns:a14="http://schemas.microsoft.com/office/drawing/2010/main">
+          <mc:Choice Requires="a14">
             <p:sp>
               <p:nvSpPr>
                 <p:cNvPr id="24" name="TextBox 23">
@@ -12723,6 +15654,7 @@
                 </a:bodyPr>
                 <a:lstStyle/>
                 <a:p>
+                  <a:pPr/>
                   <a14:m>
                     <m:oMathPara xmlns:m="http://schemas.openxmlformats.org/officeDocument/2006/math">
                       <m:oMathParaPr>
@@ -12762,7 +15694,7 @@
               </p:txBody>
             </p:sp>
           </mc:Choice>
-          <mc:Fallback>
+          <mc:Fallback xmlns="">
             <p:sp>
               <p:nvSpPr>
                 <p:cNvPr id="24" name="TextBox 23">
@@ -12871,8 +15803,8 @@
             <a:chExt cx="453714" cy="3728264"/>
           </a:xfrm>
         </p:grpSpPr>
-        <mc:AlternateContent xmlns:mc="http://schemas.openxmlformats.org/markup-compatibility/2006">
-          <mc:Choice xmlns:a14="http://schemas.microsoft.com/office/drawing/2010/main" Requires="a14">
+        <mc:AlternateContent xmlns:mc="http://schemas.openxmlformats.org/markup-compatibility/2006" xmlns:a14="http://schemas.microsoft.com/office/drawing/2010/main">
+          <mc:Choice Requires="a14">
             <p:sp>
               <p:nvSpPr>
                 <p:cNvPr id="25" name="TextBox 24">
@@ -12901,6 +15833,7 @@
                 </a:bodyPr>
                 <a:lstStyle/>
                 <a:p>
+                  <a:pPr/>
                   <a14:m>
                     <m:oMathPara xmlns:m="http://schemas.openxmlformats.org/officeDocument/2006/math">
                       <m:oMathParaPr>
@@ -12940,7 +15873,7 @@
               </p:txBody>
             </p:sp>
           </mc:Choice>
-          <mc:Fallback>
+          <mc:Fallback xmlns="">
             <p:sp>
               <p:nvSpPr>
                 <p:cNvPr id="25" name="TextBox 24">
@@ -13047,8 +15980,8 @@
             <a:chExt cx="453714" cy="3728264"/>
           </a:xfrm>
         </p:grpSpPr>
-        <mc:AlternateContent xmlns:mc="http://schemas.openxmlformats.org/markup-compatibility/2006">
-          <mc:Choice xmlns:a14="http://schemas.microsoft.com/office/drawing/2010/main" Requires="a14">
+        <mc:AlternateContent xmlns:mc="http://schemas.openxmlformats.org/markup-compatibility/2006" xmlns:a14="http://schemas.microsoft.com/office/drawing/2010/main">
+          <mc:Choice Requires="a14">
             <p:sp>
               <p:nvSpPr>
                 <p:cNvPr id="26" name="TextBox 25">
@@ -13077,6 +16010,7 @@
                 </a:bodyPr>
                 <a:lstStyle/>
                 <a:p>
+                  <a:pPr/>
                   <a14:m>
                     <m:oMathPara xmlns:m="http://schemas.openxmlformats.org/officeDocument/2006/math">
                       <m:oMathParaPr>
@@ -13116,7 +16050,7 @@
               </p:txBody>
             </p:sp>
           </mc:Choice>
-          <mc:Fallback>
+          <mc:Fallback xmlns="">
             <p:sp>
               <p:nvSpPr>
                 <p:cNvPr id="26" name="TextBox 25">
@@ -13389,8 +16323,8 @@
             <a:chExt cx="2573079" cy="841755"/>
           </a:xfrm>
         </p:grpSpPr>
-        <mc:AlternateContent xmlns:mc="http://schemas.openxmlformats.org/markup-compatibility/2006">
-          <mc:Choice xmlns:a14="http://schemas.microsoft.com/office/drawing/2010/main" Requires="a14">
+        <mc:AlternateContent xmlns:mc="http://schemas.openxmlformats.org/markup-compatibility/2006" xmlns:a14="http://schemas.microsoft.com/office/drawing/2010/main">
+          <mc:Choice Requires="a14">
             <p:sp>
               <p:nvSpPr>
                 <p:cNvPr id="41" name="TextBox 40">
@@ -13419,6 +16353,7 @@
                 </a:bodyPr>
                 <a:lstStyle/>
                 <a:p>
+                  <a:pPr/>
                   <a14:m>
                     <m:oMathPara xmlns:m="http://schemas.openxmlformats.org/officeDocument/2006/math">
                       <m:oMathParaPr>
@@ -13489,7 +16424,7 @@
               </p:txBody>
             </p:sp>
           </mc:Choice>
-          <mc:Fallback>
+          <mc:Fallback xmlns="">
             <p:sp>
               <p:nvSpPr>
                 <p:cNvPr id="41" name="TextBox 40">
@@ -14046,8 +16981,8 @@
             <a:chExt cx="1535613" cy="853548"/>
           </a:xfrm>
         </p:grpSpPr>
-        <mc:AlternateContent xmlns:mc="http://schemas.openxmlformats.org/markup-compatibility/2006">
-          <mc:Choice xmlns:a14="http://schemas.microsoft.com/office/drawing/2010/main" Requires="a14">
+        <mc:AlternateContent xmlns:mc="http://schemas.openxmlformats.org/markup-compatibility/2006" xmlns:a14="http://schemas.microsoft.com/office/drawing/2010/main">
+          <mc:Choice Requires="a14">
             <p:sp>
               <p:nvSpPr>
                 <p:cNvPr id="58" name="TextBox 57">
@@ -14076,6 +17011,7 @@
                 </a:bodyPr>
                 <a:lstStyle/>
                 <a:p>
+                  <a:pPr/>
                   <a14:m>
                     <m:oMathPara xmlns:m="http://schemas.openxmlformats.org/officeDocument/2006/math">
                       <m:oMathParaPr>
@@ -14146,7 +17082,7 @@
               </p:txBody>
             </p:sp>
           </mc:Choice>
-          <mc:Fallback>
+          <mc:Fallback xmlns="">
             <p:sp>
               <p:nvSpPr>
                 <p:cNvPr id="58" name="TextBox 57">
@@ -14702,8 +17638,8 @@
             <a:chExt cx="1713180" cy="730867"/>
           </a:xfrm>
         </p:grpSpPr>
-        <mc:AlternateContent xmlns:mc="http://schemas.openxmlformats.org/markup-compatibility/2006">
-          <mc:Choice xmlns:a14="http://schemas.microsoft.com/office/drawing/2010/main" Requires="a14">
+        <mc:AlternateContent xmlns:mc="http://schemas.openxmlformats.org/markup-compatibility/2006" xmlns:a14="http://schemas.microsoft.com/office/drawing/2010/main">
+          <mc:Choice Requires="a14">
             <p:sp>
               <p:nvSpPr>
                 <p:cNvPr id="75" name="TextBox 74">
@@ -14732,6 +17668,7 @@
                 </a:bodyPr>
                 <a:lstStyle/>
                 <a:p>
+                  <a:pPr/>
                   <a14:m>
                     <m:oMathPara xmlns:m="http://schemas.openxmlformats.org/officeDocument/2006/math">
                       <m:oMathParaPr>
@@ -14802,7 +17739,7 @@
               </p:txBody>
             </p:sp>
           </mc:Choice>
-          <mc:Fallback>
+          <mc:Fallback xmlns="">
             <p:sp>
               <p:nvSpPr>
                 <p:cNvPr id="75" name="TextBox 74">
@@ -16265,7 +19202,7 @@
 </p:sld>
 </file>
 
-<file path=ppt/slides/slide23.xml><?xml version="1.0" encoding="utf-8"?>
+<file path=ppt/slides/slide25.xml><?xml version="1.0" encoding="utf-8"?>
 <p:sld xmlns:a="http://schemas.openxmlformats.org/drawingml/2006/main" xmlns:r="http://schemas.openxmlformats.org/officeDocument/2006/relationships" xmlns:p="http://schemas.openxmlformats.org/presentationml/2006/main">
   <p:cSld>
     <p:spTree>
@@ -16311,8 +19248,8 @@
           </a:p>
         </p:txBody>
       </p:sp>
-      <mc:AlternateContent xmlns:mc="http://schemas.openxmlformats.org/markup-compatibility/2006">
-        <mc:Choice xmlns:a14="http://schemas.microsoft.com/office/drawing/2010/main" Requires="a14">
+      <mc:AlternateContent xmlns:mc="http://schemas.openxmlformats.org/markup-compatibility/2006" xmlns:a14="http://schemas.microsoft.com/office/drawing/2010/main">
+        <mc:Choice Requires="a14">
           <p:sp>
             <p:nvSpPr>
               <p:cNvPr id="3" name="Content Placeholder 2">
@@ -17216,7 +20153,7 @@
             </p:txBody>
           </p:sp>
         </mc:Choice>
-        <mc:Fallback>
+        <mc:Fallback xmlns="">
           <p:sp>
             <p:nvSpPr>
               <p:cNvPr id="3" name="Content Placeholder 2">
@@ -17308,7 +20245,7 @@
           <a:p>
             <a:fld id="{4FAB73BC-B049-4115-A692-8D63A059BFB8}" type="slidenum">
               <a:rPr lang="en-US" smtClean="0"/>
-              <a:t>23</a:t>
+              <a:t>25</a:t>
             </a:fld>
             <a:endParaRPr lang="en-US" dirty="0"/>
           </a:p>
@@ -17425,7 +20362,7 @@
 </p:sld>
 </file>
 
-<file path=ppt/slides/slide24.xml><?xml version="1.0" encoding="utf-8"?>
+<file path=ppt/slides/slide26.xml><?xml version="1.0" encoding="utf-8"?>
 <p:sld xmlns:a="http://schemas.openxmlformats.org/drawingml/2006/main" xmlns:r="http://schemas.openxmlformats.org/officeDocument/2006/relationships" xmlns:p="http://schemas.openxmlformats.org/presentationml/2006/main">
   <p:cSld>
     <p:spTree>
@@ -17471,8 +20408,8 @@
           </a:p>
         </p:txBody>
       </p:sp>
-      <mc:AlternateContent xmlns:mc="http://schemas.openxmlformats.org/markup-compatibility/2006">
-        <mc:Choice xmlns:a14="http://schemas.microsoft.com/office/drawing/2010/main" Requires="a14">
+      <mc:AlternateContent xmlns:mc="http://schemas.openxmlformats.org/markup-compatibility/2006" xmlns:a14="http://schemas.microsoft.com/office/drawing/2010/main">
+        <mc:Choice Requires="a14">
           <p:sp>
             <p:nvSpPr>
               <p:cNvPr id="3" name="Content Placeholder 2">
@@ -17875,7 +20812,7 @@
             </p:txBody>
           </p:sp>
         </mc:Choice>
-        <mc:Fallback>
+        <mc:Fallback xmlns="">
           <p:sp>
             <p:nvSpPr>
               <p:cNvPr id="3" name="Content Placeholder 2">
@@ -17967,7 +20904,7 @@
           <a:p>
             <a:fld id="{4FAB73BC-B049-4115-A692-8D63A059BFB8}" type="slidenum">
               <a:rPr lang="en-US" smtClean="0"/>
-              <a:t>24</a:t>
+              <a:t>26</a:t>
             </a:fld>
             <a:endParaRPr lang="en-US" dirty="0"/>
           </a:p>
@@ -17986,7 +20923,7 @@
 </p:sld>
 </file>
 
-<file path=ppt/slides/slide25.xml><?xml version="1.0" encoding="utf-8"?>
+<file path=ppt/slides/slide27.xml><?xml version="1.0" encoding="utf-8"?>
 <p:sld xmlns:a="http://schemas.openxmlformats.org/drawingml/2006/main" xmlns:r="http://schemas.openxmlformats.org/officeDocument/2006/relationships" xmlns:p="http://schemas.openxmlformats.org/presentationml/2006/main">
   <p:cSld>
     <p:spTree>
@@ -18032,8 +20969,8 @@
           </a:p>
         </p:txBody>
       </p:sp>
-      <mc:AlternateContent xmlns:mc="http://schemas.openxmlformats.org/markup-compatibility/2006">
-        <mc:Choice xmlns:a14="http://schemas.microsoft.com/office/drawing/2010/main" Requires="a14">
+      <mc:AlternateContent xmlns:mc="http://schemas.openxmlformats.org/markup-compatibility/2006" xmlns:a14="http://schemas.microsoft.com/office/drawing/2010/main">
+        <mc:Choice Requires="a14">
           <p:sp>
             <p:nvSpPr>
               <p:cNvPr id="3" name="Content Placeholder 2">
@@ -18421,7 +21358,7 @@
             </p:txBody>
           </p:sp>
         </mc:Choice>
-        <mc:Fallback>
+        <mc:Fallback xmlns="">
           <p:sp>
             <p:nvSpPr>
               <p:cNvPr id="3" name="Content Placeholder 2">
@@ -18513,7 +21450,7 @@
           <a:p>
             <a:fld id="{4FAB73BC-B049-4115-A692-8D63A059BFB8}" type="slidenum">
               <a:rPr lang="en-US" smtClean="0"/>
-              <a:t>25</a:t>
+              <a:t>27</a:t>
             </a:fld>
             <a:endParaRPr lang="en-US" dirty="0"/>
           </a:p>

</xml_diff>